<commit_message>
Revise Quarto template slides
</commit_message>
<xml_diff>
--- a/_site/materials/OS-template-module/OS-template-slides.pptx
+++ b/_site/materials/OS-template-module/OS-template-slides.pptx
@@ -5,7 +5,7 @@
     <p:sldMasterId id="2147483648" r:id="rId1"/>
   </p:sldMasterIdLst>
   <p:notesMasterIdLst>
-    <p:notesMasterId r:id="rId51"/>
+    <p:notesMasterId r:id="rId52"/>
   </p:notesMasterIdLst>
   <p:sldIdLst>
     <p:sldId id="256" r:id="rId2"/>
@@ -57,6 +57,7 @@
     <p:sldId id="302" r:id="rId48"/>
     <p:sldId id="303" r:id="rId49"/>
     <p:sldId id="304" r:id="rId50"/>
+    <p:sldId id="305" r:id="rId51"/>
   </p:sldIdLst>
   <p:sldSz cx="9144000" cy="5143500" type="screen16x9"/>
   <p:notesSz cx="6858000" cy="9144000"/>
@@ -571,8 +572,12 @@
               <a:buNone/>
             </a:pPr>
             <a:r>
-              <a:rPr/>
-              <a:t>These are the </a:t>
+              <a:rPr i="1"/>
+              <a:t>Speaker Notes</a:t>
+            </a:r>
+            <a:r>
+              <a:rPr/>
+              <a:t> These are the </a:t>
             </a:r>
             <a:r>
               <a:rPr b="1"/>
@@ -593,8 +598,12 @@
               <a:buNone/>
             </a:pPr>
             <a:r>
-              <a:rPr/>
-              <a:t>There are also </a:t>
+              <a:rPr i="1"/>
+              <a:t>Instructor Notes</a:t>
+            </a:r>
+            <a:r>
+              <a:rPr/>
+              <a:t> There are also </a:t>
             </a:r>
             <a:r>
               <a:rPr b="1"/>
@@ -624,7 +633,867 @@
           <a:p>
             <a:fld id="{18BDFEC3-8487-43E8-A154-7C12CBC1FFF2}" type="slidenum">
               <a:rPr lang="en-US"/>
-              <a:t>3</a:t>
+              <a:t>2</a:t>
+            </a:fld>
+            <a:endParaRPr lang="en-US"/>
+          </a:p>
+        </p:txBody>
+      </p:sp>
+    </p:spTree>
+  </p:cSld>
+</p:notes>
+</file>
+
+<file path=ppt/notesSlides/notesSlide10.xml><?xml version="1.0" encoding="utf-8"?>
+<p:notes xmlns:a="http://schemas.openxmlformats.org/drawingml/2006/main" xmlns:r="http://schemas.openxmlformats.org/officeDocument/2006/relationships" xmlns:p="http://schemas.openxmlformats.org/presentationml/2006/main">
+  <p:cSld>
+    <p:spTree>
+      <p:nvGrpSpPr>
+        <p:cNvPr id="1" name=""/>
+        <p:cNvGrpSpPr/>
+        <p:nvPr/>
+      </p:nvGrpSpPr>
+      <p:grpSpPr>
+        <a:xfrm>
+          <a:off x="0" y="0"/>
+          <a:ext cx="0" cy="0"/>
+          <a:chOff x="0" y="0"/>
+          <a:chExt cx="0" cy="0"/>
+        </a:xfrm>
+      </p:grpSpPr>
+      <p:sp>
+        <p:nvSpPr>
+          <p:cNvPr id="2" name="Slide Image Placeholder 1"/>
+          <p:cNvSpPr>
+            <a:spLocks noGrp="1" noRot="1" noChangeAspect="1"/>
+          </p:cNvSpPr>
+          <p:nvPr>
+            <p:ph type="sldImg"/>
+          </p:nvPr>
+        </p:nvSpPr>
+        <p:spPr/>
+      </p:sp>
+      <p:sp>
+        <p:nvSpPr>
+          <p:cNvPr id="3" name="Notes Placeholder 2"/>
+          <p:cNvSpPr>
+            <a:spLocks noGrp="1"/>
+          </p:cNvSpPr>
+          <p:nvPr>
+            <p:ph type="body" idx="1"/>
+          </p:nvPr>
+        </p:nvSpPr>
+        <p:spPr/>
+        <p:txBody>
+          <a:bodyPr/>
+          <a:lstStyle/>
+          <a:p>
+            <a:pPr lvl="0" indent="0" marL="0">
+              <a:buNone/>
+            </a:pPr>
+            <a:r>
+              <a:rPr i="1"/>
+              <a:t>Speaker notes</a:t>
+            </a:r>
+            <a:r>
+              <a:rPr/>
+              <a:t> For a 90-minute lesson, the instructor should try to “lecture” for only 20 minutes, students should work in groups/pairs/on their own for at least 55 minutes of the lesson (+ a 15 minute break).</a:t>
+            </a:r>
+          </a:p>
+        </p:txBody>
+      </p:sp>
+      <p:sp>
+        <p:nvSpPr>
+          <p:cNvPr id="4" name="Slide Number Placeholder 3"/>
+          <p:cNvSpPr>
+            <a:spLocks noGrp="1"/>
+          </p:cNvSpPr>
+          <p:nvPr>
+            <p:ph type="sldNum" sz="quarter" idx="10"/>
+          </p:nvPr>
+        </p:nvSpPr>
+        <p:spPr/>
+        <p:txBody>
+          <a:bodyPr/>
+          <a:lstStyle/>
+          <a:p>
+            <a:fld id="{18BDFEC3-8487-43E8-A154-7C12CBC1FFF2}" type="slidenum">
+              <a:rPr lang="en-US"/>
+              <a:t>14</a:t>
+            </a:fld>
+            <a:endParaRPr lang="en-US"/>
+          </a:p>
+        </p:txBody>
+      </p:sp>
+    </p:spTree>
+  </p:cSld>
+</p:notes>
+</file>
+
+<file path=ppt/notesSlides/notesSlide11.xml><?xml version="1.0" encoding="utf-8"?>
+<p:notes xmlns:a="http://schemas.openxmlformats.org/drawingml/2006/main" xmlns:r="http://schemas.openxmlformats.org/officeDocument/2006/relationships" xmlns:p="http://schemas.openxmlformats.org/presentationml/2006/main">
+  <p:cSld>
+    <p:spTree>
+      <p:nvGrpSpPr>
+        <p:cNvPr id="1" name=""/>
+        <p:cNvGrpSpPr/>
+        <p:nvPr/>
+      </p:nvGrpSpPr>
+      <p:grpSpPr>
+        <a:xfrm>
+          <a:off x="0" y="0"/>
+          <a:ext cx="0" cy="0"/>
+          <a:chOff x="0" y="0"/>
+          <a:chExt cx="0" cy="0"/>
+        </a:xfrm>
+      </p:grpSpPr>
+      <p:sp>
+        <p:nvSpPr>
+          <p:cNvPr id="2" name="Slide Image Placeholder 1"/>
+          <p:cNvSpPr>
+            <a:spLocks noGrp="1" noRot="1" noChangeAspect="1"/>
+          </p:cNvSpPr>
+          <p:nvPr>
+            <p:ph type="sldImg"/>
+          </p:nvPr>
+        </p:nvSpPr>
+        <p:spPr/>
+      </p:sp>
+      <p:sp>
+        <p:nvSpPr>
+          <p:cNvPr id="3" name="Notes Placeholder 2"/>
+          <p:cNvSpPr>
+            <a:spLocks noGrp="1"/>
+          </p:cNvSpPr>
+          <p:nvPr>
+            <p:ph type="body" idx="1"/>
+          </p:nvPr>
+        </p:nvSpPr>
+        <p:spPr/>
+        <p:txBody>
+          <a:bodyPr/>
+          <a:lstStyle/>
+          <a:p>
+            <a:pPr lvl="0" indent="0" marL="0">
+              <a:buNone/>
+            </a:pPr>
+            <a:r>
+              <a:rPr i="1"/>
+              <a:t>Speaker Notes</a:t>
+            </a:r>
+            <a:r>
+              <a:rPr/>
+              <a:t> Script for the presentation here.</a:t>
+            </a:r>
+          </a:p>
+        </p:txBody>
+      </p:sp>
+      <p:sp>
+        <p:nvSpPr>
+          <p:cNvPr id="4" name="Slide Number Placeholder 3"/>
+          <p:cNvSpPr>
+            <a:spLocks noGrp="1"/>
+          </p:cNvSpPr>
+          <p:nvPr>
+            <p:ph type="sldNum" sz="quarter" idx="10"/>
+          </p:nvPr>
+        </p:nvSpPr>
+        <p:spPr/>
+        <p:txBody>
+          <a:bodyPr/>
+          <a:lstStyle/>
+          <a:p>
+            <a:fld id="{18BDFEC3-8487-43E8-A154-7C12CBC1FFF2}" type="slidenum">
+              <a:rPr lang="en-US"/>
+              <a:t>15</a:t>
+            </a:fld>
+            <a:endParaRPr lang="en-US"/>
+          </a:p>
+        </p:txBody>
+      </p:sp>
+    </p:spTree>
+  </p:cSld>
+</p:notes>
+</file>
+
+<file path=ppt/notesSlides/notesSlide12.xml><?xml version="1.0" encoding="utf-8"?>
+<p:notes xmlns:a="http://schemas.openxmlformats.org/drawingml/2006/main" xmlns:r="http://schemas.openxmlformats.org/officeDocument/2006/relationships" xmlns:p="http://schemas.openxmlformats.org/presentationml/2006/main">
+  <p:cSld>
+    <p:spTree>
+      <p:nvGrpSpPr>
+        <p:cNvPr id="1" name=""/>
+        <p:cNvGrpSpPr/>
+        <p:nvPr/>
+      </p:nvGrpSpPr>
+      <p:grpSpPr>
+        <a:xfrm>
+          <a:off x="0" y="0"/>
+          <a:ext cx="0" cy="0"/>
+          <a:chOff x="0" y="0"/>
+          <a:chExt cx="0" cy="0"/>
+        </a:xfrm>
+      </p:grpSpPr>
+      <p:sp>
+        <p:nvSpPr>
+          <p:cNvPr id="2" name="Slide Image Placeholder 1"/>
+          <p:cNvSpPr>
+            <a:spLocks noGrp="1" noRot="1" noChangeAspect="1"/>
+          </p:cNvSpPr>
+          <p:nvPr>
+            <p:ph type="sldImg"/>
+          </p:nvPr>
+        </p:nvSpPr>
+        <p:spPr/>
+      </p:sp>
+      <p:sp>
+        <p:nvSpPr>
+          <p:cNvPr id="3" name="Notes Placeholder 2"/>
+          <p:cNvSpPr>
+            <a:spLocks noGrp="1"/>
+          </p:cNvSpPr>
+          <p:nvPr>
+            <p:ph type="body" idx="1"/>
+          </p:nvPr>
+        </p:nvSpPr>
+        <p:spPr/>
+        <p:txBody>
+          <a:bodyPr/>
+          <a:lstStyle/>
+          <a:p>
+            <a:pPr lvl="0" indent="0" marL="0">
+              <a:buNone/>
+            </a:pPr>
+            <a:r>
+              <a:rPr i="1"/>
+              <a:t>Speaker Notes</a:t>
+            </a:r>
+            <a:r>
+              <a:rPr/>
+              <a:t> Script for the presentation here.</a:t>
+            </a:r>
+          </a:p>
+        </p:txBody>
+      </p:sp>
+      <p:sp>
+        <p:nvSpPr>
+          <p:cNvPr id="4" name="Slide Number Placeholder 3"/>
+          <p:cNvSpPr>
+            <a:spLocks noGrp="1"/>
+          </p:cNvSpPr>
+          <p:nvPr>
+            <p:ph type="sldNum" sz="quarter" idx="10"/>
+          </p:nvPr>
+        </p:nvSpPr>
+        <p:spPr/>
+        <p:txBody>
+          <a:bodyPr/>
+          <a:lstStyle/>
+          <a:p>
+            <a:fld id="{18BDFEC3-8487-43E8-A154-7C12CBC1FFF2}" type="slidenum">
+              <a:rPr lang="en-US"/>
+              <a:t>16</a:t>
+            </a:fld>
+            <a:endParaRPr lang="en-US"/>
+          </a:p>
+        </p:txBody>
+      </p:sp>
+    </p:spTree>
+  </p:cSld>
+</p:notes>
+</file>
+
+<file path=ppt/notesSlides/notesSlide13.xml><?xml version="1.0" encoding="utf-8"?>
+<p:notes xmlns:a="http://schemas.openxmlformats.org/drawingml/2006/main" xmlns:r="http://schemas.openxmlformats.org/officeDocument/2006/relationships" xmlns:p="http://schemas.openxmlformats.org/presentationml/2006/main">
+  <p:cSld>
+    <p:spTree>
+      <p:nvGrpSpPr>
+        <p:cNvPr id="1" name=""/>
+        <p:cNvGrpSpPr/>
+        <p:nvPr/>
+      </p:nvGrpSpPr>
+      <p:grpSpPr>
+        <a:xfrm>
+          <a:off x="0" y="0"/>
+          <a:ext cx="0" cy="0"/>
+          <a:chOff x="0" y="0"/>
+          <a:chExt cx="0" cy="0"/>
+        </a:xfrm>
+      </p:grpSpPr>
+      <p:sp>
+        <p:nvSpPr>
+          <p:cNvPr id="2" name="Slide Image Placeholder 1"/>
+          <p:cNvSpPr>
+            <a:spLocks noGrp="1" noRot="1" noChangeAspect="1"/>
+          </p:cNvSpPr>
+          <p:nvPr>
+            <p:ph type="sldImg"/>
+          </p:nvPr>
+        </p:nvSpPr>
+        <p:spPr/>
+      </p:sp>
+      <p:sp>
+        <p:nvSpPr>
+          <p:cNvPr id="3" name="Notes Placeholder 2"/>
+          <p:cNvSpPr>
+            <a:spLocks noGrp="1"/>
+          </p:cNvSpPr>
+          <p:nvPr>
+            <p:ph type="body" idx="1"/>
+          </p:nvPr>
+        </p:nvSpPr>
+        <p:spPr/>
+        <p:txBody>
+          <a:bodyPr/>
+          <a:lstStyle/>
+          <a:p>
+            <a:pPr lvl="0" indent="0" marL="0">
+              <a:buNone/>
+            </a:pPr>
+            <a:r>
+              <a:rPr i="1"/>
+              <a:t>Speaker Notes</a:t>
+            </a:r>
+            <a:r>
+              <a:rPr/>
+              <a:t> Script for the presentation here.</a:t>
+            </a:r>
+          </a:p>
+        </p:txBody>
+      </p:sp>
+      <p:sp>
+        <p:nvSpPr>
+          <p:cNvPr id="4" name="Slide Number Placeholder 3"/>
+          <p:cNvSpPr>
+            <a:spLocks noGrp="1"/>
+          </p:cNvSpPr>
+          <p:nvPr>
+            <p:ph type="sldNum" sz="quarter" idx="10"/>
+          </p:nvPr>
+        </p:nvSpPr>
+        <p:spPr/>
+        <p:txBody>
+          <a:bodyPr/>
+          <a:lstStyle/>
+          <a:p>
+            <a:fld id="{18BDFEC3-8487-43E8-A154-7C12CBC1FFF2}" type="slidenum">
+              <a:rPr lang="en-US"/>
+              <a:t>17</a:t>
+            </a:fld>
+            <a:endParaRPr lang="en-US"/>
+          </a:p>
+        </p:txBody>
+      </p:sp>
+    </p:spTree>
+  </p:cSld>
+</p:notes>
+</file>
+
+<file path=ppt/notesSlides/notesSlide14.xml><?xml version="1.0" encoding="utf-8"?>
+<p:notes xmlns:a="http://schemas.openxmlformats.org/drawingml/2006/main" xmlns:r="http://schemas.openxmlformats.org/officeDocument/2006/relationships" xmlns:p="http://schemas.openxmlformats.org/presentationml/2006/main">
+  <p:cSld>
+    <p:spTree>
+      <p:nvGrpSpPr>
+        <p:cNvPr id="1" name=""/>
+        <p:cNvGrpSpPr/>
+        <p:nvPr/>
+      </p:nvGrpSpPr>
+      <p:grpSpPr>
+        <a:xfrm>
+          <a:off x="0" y="0"/>
+          <a:ext cx="0" cy="0"/>
+          <a:chOff x="0" y="0"/>
+          <a:chExt cx="0" cy="0"/>
+        </a:xfrm>
+      </p:grpSpPr>
+      <p:sp>
+        <p:nvSpPr>
+          <p:cNvPr id="2" name="Slide Image Placeholder 1"/>
+          <p:cNvSpPr>
+            <a:spLocks noGrp="1" noRot="1" noChangeAspect="1"/>
+          </p:cNvSpPr>
+          <p:nvPr>
+            <p:ph type="sldImg"/>
+          </p:nvPr>
+        </p:nvSpPr>
+        <p:spPr/>
+      </p:sp>
+      <p:sp>
+        <p:nvSpPr>
+          <p:cNvPr id="3" name="Notes Placeholder 2"/>
+          <p:cNvSpPr>
+            <a:spLocks noGrp="1"/>
+          </p:cNvSpPr>
+          <p:nvPr>
+            <p:ph type="body" idx="1"/>
+          </p:nvPr>
+        </p:nvSpPr>
+        <p:spPr/>
+        <p:txBody>
+          <a:bodyPr/>
+          <a:lstStyle/>
+          <a:p>
+            <a:pPr lvl="0" indent="0" marL="0">
+              <a:buNone/>
+            </a:pPr>
+            <a:r>
+              <a:rPr i="1"/>
+              <a:t>Speaker Notes</a:t>
+            </a:r>
+            <a:r>
+              <a:rPr/>
+              <a:t> Script for the presentation here.</a:t>
+            </a:r>
+          </a:p>
+        </p:txBody>
+      </p:sp>
+      <p:sp>
+        <p:nvSpPr>
+          <p:cNvPr id="4" name="Slide Number Placeholder 3"/>
+          <p:cNvSpPr>
+            <a:spLocks noGrp="1"/>
+          </p:cNvSpPr>
+          <p:nvPr>
+            <p:ph type="sldNum" sz="quarter" idx="10"/>
+          </p:nvPr>
+        </p:nvSpPr>
+        <p:spPr/>
+        <p:txBody>
+          <a:bodyPr/>
+          <a:lstStyle/>
+          <a:p>
+            <a:fld id="{18BDFEC3-8487-43E8-A154-7C12CBC1FFF2}" type="slidenum">
+              <a:rPr lang="en-US"/>
+              <a:t>21</a:t>
+            </a:fld>
+            <a:endParaRPr lang="en-US"/>
+          </a:p>
+        </p:txBody>
+      </p:sp>
+    </p:spTree>
+  </p:cSld>
+</p:notes>
+</file>
+
+<file path=ppt/notesSlides/notesSlide15.xml><?xml version="1.0" encoding="utf-8"?>
+<p:notes xmlns:a="http://schemas.openxmlformats.org/drawingml/2006/main" xmlns:r="http://schemas.openxmlformats.org/officeDocument/2006/relationships" xmlns:p="http://schemas.openxmlformats.org/presentationml/2006/main">
+  <p:cSld>
+    <p:spTree>
+      <p:nvGrpSpPr>
+        <p:cNvPr id="1" name=""/>
+        <p:cNvGrpSpPr/>
+        <p:nvPr/>
+      </p:nvGrpSpPr>
+      <p:grpSpPr>
+        <a:xfrm>
+          <a:off x="0" y="0"/>
+          <a:ext cx="0" cy="0"/>
+          <a:chOff x="0" y="0"/>
+          <a:chExt cx="0" cy="0"/>
+        </a:xfrm>
+      </p:grpSpPr>
+      <p:sp>
+        <p:nvSpPr>
+          <p:cNvPr id="2" name="Slide Image Placeholder 1"/>
+          <p:cNvSpPr>
+            <a:spLocks noGrp="1" noRot="1" noChangeAspect="1"/>
+          </p:cNvSpPr>
+          <p:nvPr>
+            <p:ph type="sldImg"/>
+          </p:nvPr>
+        </p:nvSpPr>
+        <p:spPr/>
+      </p:sp>
+      <p:sp>
+        <p:nvSpPr>
+          <p:cNvPr id="3" name="Notes Placeholder 2"/>
+          <p:cNvSpPr>
+            <a:spLocks noGrp="1"/>
+          </p:cNvSpPr>
+          <p:nvPr>
+            <p:ph type="body" idx="1"/>
+          </p:nvPr>
+        </p:nvSpPr>
+        <p:spPr/>
+        <p:txBody>
+          <a:bodyPr/>
+          <a:lstStyle/>
+          <a:p>
+            <a:pPr lvl="0" indent="0" marL="0">
+              <a:buNone/>
+            </a:pPr>
+            <a:r>
+              <a:rPr i="1"/>
+              <a:t>Speaker notes</a:t>
+            </a:r>
+            <a:r>
+              <a:rPr/>
+              <a:t> For students who advance faster: Prepare extra exercises.</a:t>
+            </a:r>
+          </a:p>
+        </p:txBody>
+      </p:sp>
+      <p:sp>
+        <p:nvSpPr>
+          <p:cNvPr id="4" name="Slide Number Placeholder 3"/>
+          <p:cNvSpPr>
+            <a:spLocks noGrp="1"/>
+          </p:cNvSpPr>
+          <p:nvPr>
+            <p:ph type="sldNum" sz="quarter" idx="10"/>
+          </p:nvPr>
+        </p:nvSpPr>
+        <p:spPr/>
+        <p:txBody>
+          <a:bodyPr/>
+          <a:lstStyle/>
+          <a:p>
+            <a:fld id="{18BDFEC3-8487-43E8-A154-7C12CBC1FFF2}" type="slidenum">
+              <a:rPr lang="en-US"/>
+              <a:t>22</a:t>
+            </a:fld>
+            <a:endParaRPr lang="en-US"/>
+          </a:p>
+        </p:txBody>
+      </p:sp>
+    </p:spTree>
+  </p:cSld>
+</p:notes>
+</file>
+
+<file path=ppt/notesSlides/notesSlide16.xml><?xml version="1.0" encoding="utf-8"?>
+<p:notes xmlns:a="http://schemas.openxmlformats.org/drawingml/2006/main" xmlns:r="http://schemas.openxmlformats.org/officeDocument/2006/relationships" xmlns:p="http://schemas.openxmlformats.org/presentationml/2006/main">
+  <p:cSld>
+    <p:spTree>
+      <p:nvGrpSpPr>
+        <p:cNvPr id="1" name=""/>
+        <p:cNvGrpSpPr/>
+        <p:nvPr/>
+      </p:nvGrpSpPr>
+      <p:grpSpPr>
+        <a:xfrm>
+          <a:off x="0" y="0"/>
+          <a:ext cx="0" cy="0"/>
+          <a:chOff x="0" y="0"/>
+          <a:chExt cx="0" cy="0"/>
+        </a:xfrm>
+      </p:grpSpPr>
+      <p:sp>
+        <p:nvSpPr>
+          <p:cNvPr id="2" name="Slide Image Placeholder 1"/>
+          <p:cNvSpPr>
+            <a:spLocks noGrp="1" noRot="1" noChangeAspect="1"/>
+          </p:cNvSpPr>
+          <p:nvPr>
+            <p:ph type="sldImg"/>
+          </p:nvPr>
+        </p:nvSpPr>
+        <p:spPr/>
+      </p:sp>
+      <p:sp>
+        <p:nvSpPr>
+          <p:cNvPr id="3" name="Notes Placeholder 2"/>
+          <p:cNvSpPr>
+            <a:spLocks noGrp="1"/>
+          </p:cNvSpPr>
+          <p:nvPr>
+            <p:ph type="body" idx="1"/>
+          </p:nvPr>
+        </p:nvSpPr>
+        <p:spPr/>
+        <p:txBody>
+          <a:bodyPr/>
+          <a:lstStyle/>
+          <a:p>
+            <a:pPr lvl="0" indent="0" marL="0">
+              <a:buNone/>
+            </a:pPr>
+            <a:r>
+              <a:rPr i="1"/>
+              <a:t>Speaker Notes</a:t>
+            </a:r>
+            <a:r>
+              <a:rPr/>
+              <a:t> Script for the presentation here.</a:t>
+            </a:r>
+          </a:p>
+        </p:txBody>
+      </p:sp>
+      <p:sp>
+        <p:nvSpPr>
+          <p:cNvPr id="4" name="Slide Number Placeholder 3"/>
+          <p:cNvSpPr>
+            <a:spLocks noGrp="1"/>
+          </p:cNvSpPr>
+          <p:nvPr>
+            <p:ph type="sldNum" sz="quarter" idx="10"/>
+          </p:nvPr>
+        </p:nvSpPr>
+        <p:spPr/>
+        <p:txBody>
+          <a:bodyPr/>
+          <a:lstStyle/>
+          <a:p>
+            <a:fld id="{18BDFEC3-8487-43E8-A154-7C12CBC1FFF2}" type="slidenum">
+              <a:rPr lang="en-US"/>
+              <a:t>23</a:t>
+            </a:fld>
+            <a:endParaRPr lang="en-US"/>
+          </a:p>
+        </p:txBody>
+      </p:sp>
+    </p:spTree>
+  </p:cSld>
+</p:notes>
+</file>
+
+<file path=ppt/notesSlides/notesSlide17.xml><?xml version="1.0" encoding="utf-8"?>
+<p:notes xmlns:a="http://schemas.openxmlformats.org/drawingml/2006/main" xmlns:r="http://schemas.openxmlformats.org/officeDocument/2006/relationships" xmlns:p="http://schemas.openxmlformats.org/presentationml/2006/main">
+  <p:cSld>
+    <p:spTree>
+      <p:nvGrpSpPr>
+        <p:cNvPr id="1" name=""/>
+        <p:cNvGrpSpPr/>
+        <p:nvPr/>
+      </p:nvGrpSpPr>
+      <p:grpSpPr>
+        <a:xfrm>
+          <a:off x="0" y="0"/>
+          <a:ext cx="0" cy="0"/>
+          <a:chOff x="0" y="0"/>
+          <a:chExt cx="0" cy="0"/>
+        </a:xfrm>
+      </p:grpSpPr>
+      <p:sp>
+        <p:nvSpPr>
+          <p:cNvPr id="2" name="Slide Image Placeholder 1"/>
+          <p:cNvSpPr>
+            <a:spLocks noGrp="1" noRot="1" noChangeAspect="1"/>
+          </p:cNvSpPr>
+          <p:nvPr>
+            <p:ph type="sldImg"/>
+          </p:nvPr>
+        </p:nvSpPr>
+        <p:spPr/>
+      </p:sp>
+      <p:sp>
+        <p:nvSpPr>
+          <p:cNvPr id="3" name="Notes Placeholder 2"/>
+          <p:cNvSpPr>
+            <a:spLocks noGrp="1"/>
+          </p:cNvSpPr>
+          <p:nvPr>
+            <p:ph type="body" idx="1"/>
+          </p:nvPr>
+        </p:nvSpPr>
+        <p:spPr/>
+        <p:txBody>
+          <a:bodyPr/>
+          <a:lstStyle/>
+          <a:p>
+            <a:pPr lvl="0" indent="0" marL="0">
+              <a:buNone/>
+            </a:pPr>
+            <a:r>
+              <a:rPr i="1"/>
+              <a:t>Speaker Notes</a:t>
+            </a:r>
+            <a:r>
+              <a:rPr/>
+              <a:t> Script for the presentation here.</a:t>
+            </a:r>
+          </a:p>
+        </p:txBody>
+      </p:sp>
+      <p:sp>
+        <p:nvSpPr>
+          <p:cNvPr id="4" name="Slide Number Placeholder 3"/>
+          <p:cNvSpPr>
+            <a:spLocks noGrp="1"/>
+          </p:cNvSpPr>
+          <p:nvPr>
+            <p:ph type="sldNum" sz="quarter" idx="10"/>
+          </p:nvPr>
+        </p:nvSpPr>
+        <p:spPr/>
+        <p:txBody>
+          <a:bodyPr/>
+          <a:lstStyle/>
+          <a:p>
+            <a:fld id="{18BDFEC3-8487-43E8-A154-7C12CBC1FFF2}" type="slidenum">
+              <a:rPr lang="en-US"/>
+              <a:t>24</a:t>
+            </a:fld>
+            <a:endParaRPr lang="en-US"/>
+          </a:p>
+        </p:txBody>
+      </p:sp>
+    </p:spTree>
+  </p:cSld>
+</p:notes>
+</file>
+
+<file path=ppt/notesSlides/notesSlide18.xml><?xml version="1.0" encoding="utf-8"?>
+<p:notes xmlns:a="http://schemas.openxmlformats.org/drawingml/2006/main" xmlns:r="http://schemas.openxmlformats.org/officeDocument/2006/relationships" xmlns:p="http://schemas.openxmlformats.org/presentationml/2006/main">
+  <p:cSld>
+    <p:spTree>
+      <p:nvGrpSpPr>
+        <p:cNvPr id="1" name=""/>
+        <p:cNvGrpSpPr/>
+        <p:nvPr/>
+      </p:nvGrpSpPr>
+      <p:grpSpPr>
+        <a:xfrm>
+          <a:off x="0" y="0"/>
+          <a:ext cx="0" cy="0"/>
+          <a:chOff x="0" y="0"/>
+          <a:chExt cx="0" cy="0"/>
+        </a:xfrm>
+      </p:grpSpPr>
+      <p:sp>
+        <p:nvSpPr>
+          <p:cNvPr id="2" name="Slide Image Placeholder 1"/>
+          <p:cNvSpPr>
+            <a:spLocks noGrp="1" noRot="1" noChangeAspect="1"/>
+          </p:cNvSpPr>
+          <p:nvPr>
+            <p:ph type="sldImg"/>
+          </p:nvPr>
+        </p:nvSpPr>
+        <p:spPr/>
+      </p:sp>
+      <p:sp>
+        <p:nvSpPr>
+          <p:cNvPr id="3" name="Notes Placeholder 2"/>
+          <p:cNvSpPr>
+            <a:spLocks noGrp="1"/>
+          </p:cNvSpPr>
+          <p:nvPr>
+            <p:ph type="body" idx="1"/>
+          </p:nvPr>
+        </p:nvSpPr>
+        <p:spPr/>
+        <p:txBody>
+          <a:bodyPr/>
+          <a:lstStyle/>
+          <a:p>
+            <a:pPr lvl="0" indent="0" marL="0">
+              <a:buNone/>
+            </a:pPr>
+            <a:r>
+              <a:rPr i="1"/>
+              <a:t>Speaker Notes</a:t>
+            </a:r>
+            <a:r>
+              <a:rPr/>
+              <a:t> Script for the presentation here.</a:t>
+            </a:r>
+          </a:p>
+        </p:txBody>
+      </p:sp>
+      <p:sp>
+        <p:nvSpPr>
+          <p:cNvPr id="4" name="Slide Number Placeholder 3"/>
+          <p:cNvSpPr>
+            <a:spLocks noGrp="1"/>
+          </p:cNvSpPr>
+          <p:nvPr>
+            <p:ph type="sldNum" sz="quarter" idx="10"/>
+          </p:nvPr>
+        </p:nvSpPr>
+        <p:spPr/>
+        <p:txBody>
+          <a:bodyPr/>
+          <a:lstStyle/>
+          <a:p>
+            <a:fld id="{18BDFEC3-8487-43E8-A154-7C12CBC1FFF2}" type="slidenum">
+              <a:rPr lang="en-US"/>
+              <a:t>25</a:t>
+            </a:fld>
+            <a:endParaRPr lang="en-US"/>
+          </a:p>
+        </p:txBody>
+      </p:sp>
+    </p:spTree>
+  </p:cSld>
+</p:notes>
+</file>
+
+<file path=ppt/notesSlides/notesSlide19.xml><?xml version="1.0" encoding="utf-8"?>
+<p:notes xmlns:a="http://schemas.openxmlformats.org/drawingml/2006/main" xmlns:r="http://schemas.openxmlformats.org/officeDocument/2006/relationships" xmlns:p="http://schemas.openxmlformats.org/presentationml/2006/main">
+  <p:cSld>
+    <p:spTree>
+      <p:nvGrpSpPr>
+        <p:cNvPr id="1" name=""/>
+        <p:cNvGrpSpPr/>
+        <p:nvPr/>
+      </p:nvGrpSpPr>
+      <p:grpSpPr>
+        <a:xfrm>
+          <a:off x="0" y="0"/>
+          <a:ext cx="0" cy="0"/>
+          <a:chOff x="0" y="0"/>
+          <a:chExt cx="0" cy="0"/>
+        </a:xfrm>
+      </p:grpSpPr>
+      <p:sp>
+        <p:nvSpPr>
+          <p:cNvPr id="2" name="Slide Image Placeholder 1"/>
+          <p:cNvSpPr>
+            <a:spLocks noGrp="1" noRot="1" noChangeAspect="1"/>
+          </p:cNvSpPr>
+          <p:nvPr>
+            <p:ph type="sldImg"/>
+          </p:nvPr>
+        </p:nvSpPr>
+        <p:spPr/>
+      </p:sp>
+      <p:sp>
+        <p:nvSpPr>
+          <p:cNvPr id="3" name="Notes Placeholder 2"/>
+          <p:cNvSpPr>
+            <a:spLocks noGrp="1"/>
+          </p:cNvSpPr>
+          <p:nvPr>
+            <p:ph type="body" idx="1"/>
+          </p:nvPr>
+        </p:nvSpPr>
+        <p:spPr/>
+        <p:txBody>
+          <a:bodyPr/>
+          <a:lstStyle/>
+          <a:p>
+            <a:pPr lvl="0" indent="0" marL="0">
+              <a:buNone/>
+            </a:pPr>
+            <a:r>
+              <a:rPr i="1"/>
+              <a:t>Speaker Notes</a:t>
+            </a:r>
+            <a:r>
+              <a:rPr/>
+              <a:t> Script for the presentation here.</a:t>
+            </a:r>
+          </a:p>
+        </p:txBody>
+      </p:sp>
+      <p:sp>
+        <p:nvSpPr>
+          <p:cNvPr id="4" name="Slide Number Placeholder 3"/>
+          <p:cNvSpPr>
+            <a:spLocks noGrp="1"/>
+          </p:cNvSpPr>
+          <p:nvPr>
+            <p:ph type="sldNum" sz="quarter" idx="10"/>
+          </p:nvPr>
+        </p:nvSpPr>
+        <p:spPr/>
+        <p:txBody>
+          <a:bodyPr/>
+          <a:lstStyle/>
+          <a:p>
+            <a:fld id="{18BDFEC3-8487-43E8-A154-7C12CBC1FFF2}" type="slidenum">
+              <a:rPr lang="en-US"/>
+              <a:t>26</a:t>
             </a:fld>
             <a:endParaRPr lang="en-US"/>
           </a:p>
@@ -683,8 +1552,12 @@
               <a:buNone/>
             </a:pPr>
             <a:r>
-              <a:rPr/>
-              <a:t>Make it clear to the group that there will be a similar post-submodule survey to examine understanding and learning progress.</a:t>
+              <a:rPr i="1"/>
+              <a:t>Speaker Notes</a:t>
+            </a:r>
+            <a:r>
+              <a:rPr/>
+              <a:t> Script for the presentation here.</a:t>
             </a:r>
           </a:p>
         </p:txBody>
@@ -706,7 +1579,179 @@
           <a:p>
             <a:fld id="{18BDFEC3-8487-43E8-A154-7C12CBC1FFF2}" type="slidenum">
               <a:rPr lang="en-US"/>
-              <a:t>9</a:t>
+              <a:t>3</a:t>
+            </a:fld>
+            <a:endParaRPr lang="en-US"/>
+          </a:p>
+        </p:txBody>
+      </p:sp>
+    </p:spTree>
+  </p:cSld>
+</p:notes>
+</file>
+
+<file path=ppt/notesSlides/notesSlide20.xml><?xml version="1.0" encoding="utf-8"?>
+<p:notes xmlns:a="http://schemas.openxmlformats.org/drawingml/2006/main" xmlns:r="http://schemas.openxmlformats.org/officeDocument/2006/relationships" xmlns:p="http://schemas.openxmlformats.org/presentationml/2006/main">
+  <p:cSld>
+    <p:spTree>
+      <p:nvGrpSpPr>
+        <p:cNvPr id="1" name=""/>
+        <p:cNvGrpSpPr/>
+        <p:nvPr/>
+      </p:nvGrpSpPr>
+      <p:grpSpPr>
+        <a:xfrm>
+          <a:off x="0" y="0"/>
+          <a:ext cx="0" cy="0"/>
+          <a:chOff x="0" y="0"/>
+          <a:chExt cx="0" cy="0"/>
+        </a:xfrm>
+      </p:grpSpPr>
+      <p:sp>
+        <p:nvSpPr>
+          <p:cNvPr id="2" name="Slide Image Placeholder 1"/>
+          <p:cNvSpPr>
+            <a:spLocks noGrp="1" noRot="1" noChangeAspect="1"/>
+          </p:cNvSpPr>
+          <p:nvPr>
+            <p:ph type="sldImg"/>
+          </p:nvPr>
+        </p:nvSpPr>
+        <p:spPr/>
+      </p:sp>
+      <p:sp>
+        <p:nvSpPr>
+          <p:cNvPr id="3" name="Notes Placeholder 2"/>
+          <p:cNvSpPr>
+            <a:spLocks noGrp="1"/>
+          </p:cNvSpPr>
+          <p:nvPr>
+            <p:ph type="body" idx="1"/>
+          </p:nvPr>
+        </p:nvSpPr>
+        <p:spPr/>
+        <p:txBody>
+          <a:bodyPr/>
+          <a:lstStyle/>
+          <a:p>
+            <a:pPr lvl="0" indent="0" marL="0">
+              <a:buNone/>
+            </a:pPr>
+            <a:r>
+              <a:rPr i="1"/>
+              <a:t>Speaker Notes</a:t>
+            </a:r>
+            <a:r>
+              <a:rPr/>
+              <a:t> Script for the presentation here.</a:t>
+            </a:r>
+          </a:p>
+        </p:txBody>
+      </p:sp>
+      <p:sp>
+        <p:nvSpPr>
+          <p:cNvPr id="4" name="Slide Number Placeholder 3"/>
+          <p:cNvSpPr>
+            <a:spLocks noGrp="1"/>
+          </p:cNvSpPr>
+          <p:nvPr>
+            <p:ph type="sldNum" sz="quarter" idx="10"/>
+          </p:nvPr>
+        </p:nvSpPr>
+        <p:spPr/>
+        <p:txBody>
+          <a:bodyPr/>
+          <a:lstStyle/>
+          <a:p>
+            <a:fld id="{18BDFEC3-8487-43E8-A154-7C12CBC1FFF2}" type="slidenum">
+              <a:rPr lang="en-US"/>
+              <a:t>30</a:t>
+            </a:fld>
+            <a:endParaRPr lang="en-US"/>
+          </a:p>
+        </p:txBody>
+      </p:sp>
+    </p:spTree>
+  </p:cSld>
+</p:notes>
+</file>
+
+<file path=ppt/notesSlides/notesSlide21.xml><?xml version="1.0" encoding="utf-8"?>
+<p:notes xmlns:a="http://schemas.openxmlformats.org/drawingml/2006/main" xmlns:r="http://schemas.openxmlformats.org/officeDocument/2006/relationships" xmlns:p="http://schemas.openxmlformats.org/presentationml/2006/main">
+  <p:cSld>
+    <p:spTree>
+      <p:nvGrpSpPr>
+        <p:cNvPr id="1" name=""/>
+        <p:cNvGrpSpPr/>
+        <p:nvPr/>
+      </p:nvGrpSpPr>
+      <p:grpSpPr>
+        <a:xfrm>
+          <a:off x="0" y="0"/>
+          <a:ext cx="0" cy="0"/>
+          <a:chOff x="0" y="0"/>
+          <a:chExt cx="0" cy="0"/>
+        </a:xfrm>
+      </p:grpSpPr>
+      <p:sp>
+        <p:nvSpPr>
+          <p:cNvPr id="2" name="Slide Image Placeholder 1"/>
+          <p:cNvSpPr>
+            <a:spLocks noGrp="1" noRot="1" noChangeAspect="1"/>
+          </p:cNvSpPr>
+          <p:nvPr>
+            <p:ph type="sldImg"/>
+          </p:nvPr>
+        </p:nvSpPr>
+        <p:spPr/>
+      </p:sp>
+      <p:sp>
+        <p:nvSpPr>
+          <p:cNvPr id="3" name="Notes Placeholder 2"/>
+          <p:cNvSpPr>
+            <a:spLocks noGrp="1"/>
+          </p:cNvSpPr>
+          <p:nvPr>
+            <p:ph type="body" idx="1"/>
+          </p:nvPr>
+        </p:nvSpPr>
+        <p:spPr/>
+        <p:txBody>
+          <a:bodyPr/>
+          <a:lstStyle/>
+          <a:p>
+            <a:pPr lvl="0" indent="0" marL="0">
+              <a:buNone/>
+            </a:pPr>
+            <a:r>
+              <a:rPr i="1"/>
+              <a:t>Speaker Notes</a:t>
+            </a:r>
+            <a:r>
+              <a:rPr/>
+              <a:t> Script for the presentation here.</a:t>
+            </a:r>
+          </a:p>
+        </p:txBody>
+      </p:sp>
+      <p:sp>
+        <p:nvSpPr>
+          <p:cNvPr id="4" name="Slide Number Placeholder 3"/>
+          <p:cNvSpPr>
+            <a:spLocks noGrp="1"/>
+          </p:cNvSpPr>
+          <p:nvPr>
+            <p:ph type="sldNum" sz="quarter" idx="10"/>
+          </p:nvPr>
+        </p:nvSpPr>
+        <p:spPr/>
+        <p:txBody>
+          <a:bodyPr/>
+          <a:lstStyle/>
+          <a:p>
+            <a:fld id="{18BDFEC3-8487-43E8-A154-7C12CBC1FFF2}" type="slidenum">
+              <a:rPr lang="en-US"/>
+              <a:t>31</a:t>
             </a:fld>
             <a:endParaRPr lang="en-US"/>
           </a:p>
@@ -765,8 +1810,12 @@
               <a:buNone/>
             </a:pPr>
             <a:r>
-              <a:rPr/>
-              <a:t>Base yourself on conceptual change theory and examine exisiting concepts in relation to some key terms. Re-examine formation of new concepts at the end of the lesson.</a:t>
+              <a:rPr i="1"/>
+              <a:t>Speaker Notes</a:t>
+            </a:r>
+            <a:r>
+              <a:rPr/>
+              <a:t> Script for the presentation here.</a:t>
             </a:r>
           </a:p>
         </p:txBody>
@@ -788,7 +1837,7 @@
           <a:p>
             <a:fld id="{18BDFEC3-8487-43E8-A154-7C12CBC1FFF2}" type="slidenum">
               <a:rPr lang="en-US"/>
-              <a:t>13</a:t>
+              <a:t>4</a:t>
             </a:fld>
             <a:endParaRPr lang="en-US"/>
           </a:p>
@@ -847,8 +1896,12 @@
               <a:buNone/>
             </a:pPr>
             <a:r>
-              <a:rPr/>
-              <a:t>For a 90-minute lesson, the instructor should try to “lecture” for only 20 minutes, students should work in groups/pairs/on their own for at least 55 minutes of the lesson (+ a 15 minute break).</a:t>
+              <a:rPr i="1"/>
+              <a:t>Speaker Notes</a:t>
+            </a:r>
+            <a:r>
+              <a:rPr/>
+              <a:t> Script for the presentation here.</a:t>
             </a:r>
           </a:p>
         </p:txBody>
@@ -870,7 +1923,7 @@
           <a:p>
             <a:fld id="{18BDFEC3-8487-43E8-A154-7C12CBC1FFF2}" type="slidenum">
               <a:rPr lang="en-US"/>
-              <a:t>14</a:t>
+              <a:t>5</a:t>
             </a:fld>
             <a:endParaRPr lang="en-US"/>
           </a:p>
@@ -929,8 +1982,12 @@
               <a:buNone/>
             </a:pPr>
             <a:r>
-              <a:rPr/>
-              <a:t>For students who advance faster: Prepare extra exercises.</a:t>
+              <a:rPr i="1"/>
+              <a:t>Speaker Notes</a:t>
+            </a:r>
+            <a:r>
+              <a:rPr/>
+              <a:t> Make it clear to the group that there will be a similar post-submodule survey to examine understanding and learning progress.</a:t>
             </a:r>
           </a:p>
         </p:txBody>
@@ -952,7 +2009,351 @@
           <a:p>
             <a:fld id="{18BDFEC3-8487-43E8-A154-7C12CBC1FFF2}" type="slidenum">
               <a:rPr lang="en-US"/>
-              <a:t>21</a:t>
+              <a:t>9</a:t>
+            </a:fld>
+            <a:endParaRPr lang="en-US"/>
+          </a:p>
+        </p:txBody>
+      </p:sp>
+    </p:spTree>
+  </p:cSld>
+</p:notes>
+</file>
+
+<file path=ppt/notesSlides/notesSlide6.xml><?xml version="1.0" encoding="utf-8"?>
+<p:notes xmlns:a="http://schemas.openxmlformats.org/drawingml/2006/main" xmlns:r="http://schemas.openxmlformats.org/officeDocument/2006/relationships" xmlns:p="http://schemas.openxmlformats.org/presentationml/2006/main">
+  <p:cSld>
+    <p:spTree>
+      <p:nvGrpSpPr>
+        <p:cNvPr id="1" name=""/>
+        <p:cNvGrpSpPr/>
+        <p:nvPr/>
+      </p:nvGrpSpPr>
+      <p:grpSpPr>
+        <a:xfrm>
+          <a:off x="0" y="0"/>
+          <a:ext cx="0" cy="0"/>
+          <a:chOff x="0" y="0"/>
+          <a:chExt cx="0" cy="0"/>
+        </a:xfrm>
+      </p:grpSpPr>
+      <p:sp>
+        <p:nvSpPr>
+          <p:cNvPr id="2" name="Slide Image Placeholder 1"/>
+          <p:cNvSpPr>
+            <a:spLocks noGrp="1" noRot="1" noChangeAspect="1"/>
+          </p:cNvSpPr>
+          <p:nvPr>
+            <p:ph type="sldImg"/>
+          </p:nvPr>
+        </p:nvSpPr>
+        <p:spPr/>
+      </p:sp>
+      <p:sp>
+        <p:nvSpPr>
+          <p:cNvPr id="3" name="Notes Placeholder 2"/>
+          <p:cNvSpPr>
+            <a:spLocks noGrp="1"/>
+          </p:cNvSpPr>
+          <p:nvPr>
+            <p:ph type="body" idx="1"/>
+          </p:nvPr>
+        </p:nvSpPr>
+        <p:spPr/>
+        <p:txBody>
+          <a:bodyPr/>
+          <a:lstStyle/>
+          <a:p>
+            <a:pPr lvl="0" indent="0" marL="0">
+              <a:buNone/>
+            </a:pPr>
+            <a:r>
+              <a:rPr i="1"/>
+              <a:t>Speaker Notes</a:t>
+            </a:r>
+            <a:r>
+              <a:rPr/>
+              <a:t> Script for the presentation here.</a:t>
+            </a:r>
+          </a:p>
+        </p:txBody>
+      </p:sp>
+      <p:sp>
+        <p:nvSpPr>
+          <p:cNvPr id="4" name="Slide Number Placeholder 3"/>
+          <p:cNvSpPr>
+            <a:spLocks noGrp="1"/>
+          </p:cNvSpPr>
+          <p:nvPr>
+            <p:ph type="sldNum" sz="quarter" idx="10"/>
+          </p:nvPr>
+        </p:nvSpPr>
+        <p:spPr/>
+        <p:txBody>
+          <a:bodyPr/>
+          <a:lstStyle/>
+          <a:p>
+            <a:fld id="{18BDFEC3-8487-43E8-A154-7C12CBC1FFF2}" type="slidenum">
+              <a:rPr lang="en-US"/>
+              <a:t>10</a:t>
+            </a:fld>
+            <a:endParaRPr lang="en-US"/>
+          </a:p>
+        </p:txBody>
+      </p:sp>
+    </p:spTree>
+  </p:cSld>
+</p:notes>
+</file>
+
+<file path=ppt/notesSlides/notesSlide7.xml><?xml version="1.0" encoding="utf-8"?>
+<p:notes xmlns:a="http://schemas.openxmlformats.org/drawingml/2006/main" xmlns:r="http://schemas.openxmlformats.org/officeDocument/2006/relationships" xmlns:p="http://schemas.openxmlformats.org/presentationml/2006/main">
+  <p:cSld>
+    <p:spTree>
+      <p:nvGrpSpPr>
+        <p:cNvPr id="1" name=""/>
+        <p:cNvGrpSpPr/>
+        <p:nvPr/>
+      </p:nvGrpSpPr>
+      <p:grpSpPr>
+        <a:xfrm>
+          <a:off x="0" y="0"/>
+          <a:ext cx="0" cy="0"/>
+          <a:chOff x="0" y="0"/>
+          <a:chExt cx="0" cy="0"/>
+        </a:xfrm>
+      </p:grpSpPr>
+      <p:sp>
+        <p:nvSpPr>
+          <p:cNvPr id="2" name="Slide Image Placeholder 1"/>
+          <p:cNvSpPr>
+            <a:spLocks noGrp="1" noRot="1" noChangeAspect="1"/>
+          </p:cNvSpPr>
+          <p:nvPr>
+            <p:ph type="sldImg"/>
+          </p:nvPr>
+        </p:nvSpPr>
+        <p:spPr/>
+      </p:sp>
+      <p:sp>
+        <p:nvSpPr>
+          <p:cNvPr id="3" name="Notes Placeholder 2"/>
+          <p:cNvSpPr>
+            <a:spLocks noGrp="1"/>
+          </p:cNvSpPr>
+          <p:nvPr>
+            <p:ph type="body" idx="1"/>
+          </p:nvPr>
+        </p:nvSpPr>
+        <p:spPr/>
+        <p:txBody>
+          <a:bodyPr/>
+          <a:lstStyle/>
+          <a:p>
+            <a:pPr lvl="0" indent="0" marL="0">
+              <a:buNone/>
+            </a:pPr>
+            <a:r>
+              <a:rPr i="1"/>
+              <a:t>Speaker Notes</a:t>
+            </a:r>
+            <a:r>
+              <a:rPr/>
+              <a:t> Script for the presentation here.</a:t>
+            </a:r>
+          </a:p>
+        </p:txBody>
+      </p:sp>
+      <p:sp>
+        <p:nvSpPr>
+          <p:cNvPr id="4" name="Slide Number Placeholder 3"/>
+          <p:cNvSpPr>
+            <a:spLocks noGrp="1"/>
+          </p:cNvSpPr>
+          <p:nvPr>
+            <p:ph type="sldNum" sz="quarter" idx="10"/>
+          </p:nvPr>
+        </p:nvSpPr>
+        <p:spPr/>
+        <p:txBody>
+          <a:bodyPr/>
+          <a:lstStyle/>
+          <a:p>
+            <a:fld id="{18BDFEC3-8487-43E8-A154-7C12CBC1FFF2}" type="slidenum">
+              <a:rPr lang="en-US"/>
+              <a:t>11</a:t>
+            </a:fld>
+            <a:endParaRPr lang="en-US"/>
+          </a:p>
+        </p:txBody>
+      </p:sp>
+    </p:spTree>
+  </p:cSld>
+</p:notes>
+</file>
+
+<file path=ppt/notesSlides/notesSlide8.xml><?xml version="1.0" encoding="utf-8"?>
+<p:notes xmlns:a="http://schemas.openxmlformats.org/drawingml/2006/main" xmlns:r="http://schemas.openxmlformats.org/officeDocument/2006/relationships" xmlns:p="http://schemas.openxmlformats.org/presentationml/2006/main">
+  <p:cSld>
+    <p:spTree>
+      <p:nvGrpSpPr>
+        <p:cNvPr id="1" name=""/>
+        <p:cNvGrpSpPr/>
+        <p:nvPr/>
+      </p:nvGrpSpPr>
+      <p:grpSpPr>
+        <a:xfrm>
+          <a:off x="0" y="0"/>
+          <a:ext cx="0" cy="0"/>
+          <a:chOff x="0" y="0"/>
+          <a:chExt cx="0" cy="0"/>
+        </a:xfrm>
+      </p:grpSpPr>
+      <p:sp>
+        <p:nvSpPr>
+          <p:cNvPr id="2" name="Slide Image Placeholder 1"/>
+          <p:cNvSpPr>
+            <a:spLocks noGrp="1" noRot="1" noChangeAspect="1"/>
+          </p:cNvSpPr>
+          <p:nvPr>
+            <p:ph type="sldImg"/>
+          </p:nvPr>
+        </p:nvSpPr>
+        <p:spPr/>
+      </p:sp>
+      <p:sp>
+        <p:nvSpPr>
+          <p:cNvPr id="3" name="Notes Placeholder 2"/>
+          <p:cNvSpPr>
+            <a:spLocks noGrp="1"/>
+          </p:cNvSpPr>
+          <p:nvPr>
+            <p:ph type="body" idx="1"/>
+          </p:nvPr>
+        </p:nvSpPr>
+        <p:spPr/>
+        <p:txBody>
+          <a:bodyPr/>
+          <a:lstStyle/>
+          <a:p>
+            <a:pPr lvl="0" indent="0" marL="0">
+              <a:buNone/>
+            </a:pPr>
+            <a:r>
+              <a:rPr i="1"/>
+              <a:t>Speaker Notes</a:t>
+            </a:r>
+            <a:r>
+              <a:rPr/>
+              <a:t> Script for the presentation here.</a:t>
+            </a:r>
+          </a:p>
+        </p:txBody>
+      </p:sp>
+      <p:sp>
+        <p:nvSpPr>
+          <p:cNvPr id="4" name="Slide Number Placeholder 3"/>
+          <p:cNvSpPr>
+            <a:spLocks noGrp="1"/>
+          </p:cNvSpPr>
+          <p:nvPr>
+            <p:ph type="sldNum" sz="quarter" idx="10"/>
+          </p:nvPr>
+        </p:nvSpPr>
+        <p:spPr/>
+        <p:txBody>
+          <a:bodyPr/>
+          <a:lstStyle/>
+          <a:p>
+            <a:fld id="{18BDFEC3-8487-43E8-A154-7C12CBC1FFF2}" type="slidenum">
+              <a:rPr lang="en-US"/>
+              <a:t>12</a:t>
+            </a:fld>
+            <a:endParaRPr lang="en-US"/>
+          </a:p>
+        </p:txBody>
+      </p:sp>
+    </p:spTree>
+  </p:cSld>
+</p:notes>
+</file>
+
+<file path=ppt/notesSlides/notesSlide9.xml><?xml version="1.0" encoding="utf-8"?>
+<p:notes xmlns:a="http://schemas.openxmlformats.org/drawingml/2006/main" xmlns:r="http://schemas.openxmlformats.org/officeDocument/2006/relationships" xmlns:p="http://schemas.openxmlformats.org/presentationml/2006/main">
+  <p:cSld>
+    <p:spTree>
+      <p:nvGrpSpPr>
+        <p:cNvPr id="1" name=""/>
+        <p:cNvGrpSpPr/>
+        <p:nvPr/>
+      </p:nvGrpSpPr>
+      <p:grpSpPr>
+        <a:xfrm>
+          <a:off x="0" y="0"/>
+          <a:ext cx="0" cy="0"/>
+          <a:chOff x="0" y="0"/>
+          <a:chExt cx="0" cy="0"/>
+        </a:xfrm>
+      </p:grpSpPr>
+      <p:sp>
+        <p:nvSpPr>
+          <p:cNvPr id="2" name="Slide Image Placeholder 1"/>
+          <p:cNvSpPr>
+            <a:spLocks noGrp="1" noRot="1" noChangeAspect="1"/>
+          </p:cNvSpPr>
+          <p:nvPr>
+            <p:ph type="sldImg"/>
+          </p:nvPr>
+        </p:nvSpPr>
+        <p:spPr/>
+      </p:sp>
+      <p:sp>
+        <p:nvSpPr>
+          <p:cNvPr id="3" name="Notes Placeholder 2"/>
+          <p:cNvSpPr>
+            <a:spLocks noGrp="1"/>
+          </p:cNvSpPr>
+          <p:nvPr>
+            <p:ph type="body" idx="1"/>
+          </p:nvPr>
+        </p:nvSpPr>
+        <p:spPr/>
+        <p:txBody>
+          <a:bodyPr/>
+          <a:lstStyle/>
+          <a:p>
+            <a:pPr lvl="0" indent="0" marL="0">
+              <a:buNone/>
+            </a:pPr>
+            <a:r>
+              <a:rPr i="1"/>
+              <a:t>Speaker notes</a:t>
+            </a:r>
+            <a:r>
+              <a:rPr/>
+              <a:t> Base yourself on conceptual change theory and examine exisiting concepts in relation to some key terms. Re-examine formation of new concepts at the end of the lesson.</a:t>
+            </a:r>
+          </a:p>
+        </p:txBody>
+      </p:sp>
+      <p:sp>
+        <p:nvSpPr>
+          <p:cNvPr id="4" name="Slide Number Placeholder 3"/>
+          <p:cNvSpPr>
+            <a:spLocks noGrp="1"/>
+          </p:cNvSpPr>
+          <p:nvPr>
+            <p:ph type="sldNum" sz="quarter" idx="10"/>
+          </p:nvPr>
+        </p:nvSpPr>
+        <p:spPr/>
+        <p:txBody>
+          <a:bodyPr/>
+          <a:lstStyle/>
+          <a:p>
+            <a:fld id="{18BDFEC3-8487-43E8-A154-7C12CBC1FFF2}" type="slidenum">
+              <a:rPr lang="en-US"/>
+              <a:t>13</a:t>
             </a:fld>
             <a:endParaRPr lang="en-US"/>
           </a:p>
@@ -3955,7 +5356,7 @@
             </a:pPr>
             <a:r>
               <a:rPr/>
-              <a:t>Template Slides: Title of Submodule</a:t>
+              <a:t>Template Slides: Title of submodule</a:t>
             </a:r>
           </a:p>
         </p:txBody>
@@ -4012,7 +5413,7 @@
             </a:pPr>
             <a:r>
               <a:rPr/>
-              <a:t>20/08/2025</a:t>
+              <a:t>21/08/2025</a:t>
             </a:r>
           </a:p>
         </p:txBody>
@@ -4709,64 +6110,10 @@
             </a:r>
           </a:p>
           <a:p>
-            <a:pPr lvl="0" indent="0" marL="0">
-              <a:spcBef>
-                <a:spcPts val="3000"/>
-              </a:spcBef>
-              <a:buNone/>
-            </a:pPr>
-            <a:r>
-              <a:rPr b="1"/>
+            <a:pPr lvl="0"/>
+            <a:r>
+              <a:rPr/>
               <a:t>Use free survey software such as or other survey software (particify, formR) to establish the following questions (shown on separate slides):</a:t>
-            </a:r>
-          </a:p>
-          <a:p>
-            <a:pPr lvl="0" indent="0" marL="0">
-              <a:buNone/>
-            </a:pPr>
-            <a:r>
-              <a:rPr b="1"/>
-              <a:t>Which species is the largest type of penguin</a:t>
-            </a:r>
-            <a:r>
-              <a:rPr/>
-              <a:t>?</a:t>
-            </a:r>
-          </a:p>
-          <a:p>
-            <a:pPr lvl="0" indent="-342900" marL="342900">
-              <a:buAutoNum type="alphaLcPeriod"/>
-            </a:pPr>
-            <a:r>
-              <a:rPr/>
-              <a:t>Chinstrap Penguin</a:t>
-            </a:r>
-          </a:p>
-          <a:p>
-            <a:pPr lvl="0" indent="-342900" marL="342900">
-              <a:buAutoNum type="alphaLcPeriod"/>
-            </a:pPr>
-            <a:r>
-              <a:rPr/>
-              <a:t>Emperor Penguin ✅</a:t>
-            </a:r>
-          </a:p>
-          <a:p>
-            <a:pPr lvl="0" indent="-342900" marL="342900">
-              <a:buAutoNum type="alphaLcPeriod"/>
-            </a:pPr>
-            <a:r>
-              <a:rPr/>
-              <a:t>Adélie Penguin</a:t>
-            </a:r>
-          </a:p>
-          <a:p>
-            <a:pPr lvl="0" indent="-342900" marL="342900">
-              <a:buAutoNum type="alphaLcPeriod"/>
-            </a:pPr>
-            <a:r>
-              <a:rPr/>
-              <a:t>King Penguin</a:t>
             </a:r>
           </a:p>
         </p:txBody>
@@ -4813,7 +6160,11 @@
             </a:pPr>
             <a:r>
               <a:rPr b="1"/>
-              <a:t>What is the key biological feature that helps penguins swim efficiently?</a:t>
+              <a:t>Which species is the largest type of penguin</a:t>
+            </a:r>
+            <a:r>
+              <a:rPr/>
+              <a:t>?</a:t>
             </a:r>
           </a:p>
           <a:p>
@@ -4822,7 +6173,7 @@
             </a:pPr>
             <a:r>
               <a:rPr/>
-              <a:t>Hollow bones for buoyancy</a:t>
+              <a:t>Chinstrap Penguin</a:t>
             </a:r>
           </a:p>
           <a:p>
@@ -4831,7 +6182,7 @@
             </a:pPr>
             <a:r>
               <a:rPr/>
-              <a:t>Webbed feet for paddling</a:t>
+              <a:t>Emperor Penguin ✅</a:t>
             </a:r>
           </a:p>
           <a:p>
@@ -4840,7 +6191,7 @@
             </a:pPr>
             <a:r>
               <a:rPr/>
-              <a:t>Waterproof feathers and flipper-like wings ✅</a:t>
+              <a:t>Adélie Penguin</a:t>
             </a:r>
           </a:p>
           <a:p>
@@ -4849,7 +6200,7 @@
             </a:pPr>
             <a:r>
               <a:rPr/>
-              <a:t>Gills to breathe underwater</a:t>
+              <a:t>King Penguin</a:t>
             </a:r>
           </a:p>
         </p:txBody>
@@ -4878,12 +6229,12 @@
       </p:grpSpPr>
       <p:sp>
         <p:nvSpPr>
-          <p:cNvPr id="2" name="Title 1"/>
-          <p:cNvSpPr>
-            <a:spLocks noGrp="1"/>
-          </p:cNvSpPr>
-          <p:nvPr>
-            <p:ph type="title"/>
+          <p:cNvPr id="3" name="Content Placeholder 2"/>
+          <p:cNvSpPr>
+            <a:spLocks noGrp="1"/>
+          </p:cNvSpPr>
+          <p:nvPr>
+            <p:ph idx="1"/>
           </p:nvPr>
         </p:nvSpPr>
         <p:spPr/>
@@ -4895,8 +6246,44 @@
               <a:buNone/>
             </a:pPr>
             <a:r>
-              <a:rPr/>
-              <a:t>Break! 15 minutes</a:t>
+              <a:rPr b="1"/>
+              <a:t>What is the key biological feature that helps penguins swim efficiently?</a:t>
+            </a:r>
+          </a:p>
+          <a:p>
+            <a:pPr lvl="0" indent="-342900" marL="342900">
+              <a:buAutoNum type="alphaLcPeriod"/>
+            </a:pPr>
+            <a:r>
+              <a:rPr/>
+              <a:t>Hollow bones for buoyancy</a:t>
+            </a:r>
+          </a:p>
+          <a:p>
+            <a:pPr lvl="0" indent="-342900" marL="342900">
+              <a:buAutoNum type="alphaLcPeriod"/>
+            </a:pPr>
+            <a:r>
+              <a:rPr/>
+              <a:t>Webbed feet for paddling</a:t>
+            </a:r>
+          </a:p>
+          <a:p>
+            <a:pPr lvl="0" indent="-342900" marL="342900">
+              <a:buAutoNum type="alphaLcPeriod"/>
+            </a:pPr>
+            <a:r>
+              <a:rPr/>
+              <a:t>Waterproof feathers and flipper-like wings ✅</a:t>
+            </a:r>
+          </a:p>
+          <a:p>
+            <a:pPr lvl="0" indent="-342900" marL="342900">
+              <a:buAutoNum type="alphaLcPeriod"/>
+            </a:pPr>
+            <a:r>
+              <a:rPr/>
+              <a:t>Gills to breathe underwater</a:t>
             </a:r>
           </a:p>
         </p:txBody>
@@ -4959,157 +6346,60 @@
             </a:r>
           </a:p>
           <a:p>
-            <a:pPr lvl="0"/>
+            <a:pPr lvl="0" indent="0" marL="0">
+              <a:buNone/>
+            </a:pPr>
             <a:r>
               <a:rPr b="1"/>
-              <a:t>Conceptualization</a:t>
-            </a:r>
-            <a:r>
-              <a:rPr/>
-              <a:t>: Ideas; formulation or evolution of overarching research goals and aims</a:t>
-            </a:r>
-          </a:p>
-          <a:p>
-            <a:pPr lvl="0"/>
+              <a:t>Name main content creator</a:t>
+            </a:r>
+            <a:r>
+              <a:rPr/>
+              <a:t>: Conceptualization, Software, Writing - Original Draft, Visualization. </a:t>
+            </a:r>
             <a:r>
               <a:rPr b="1"/>
-              <a:t>Methodology</a:t>
-            </a:r>
-            <a:r>
-              <a:rPr/>
-              <a:t>: Development or design of methodology; creation of models</a:t>
-            </a:r>
-          </a:p>
-          <a:p>
-            <a:pPr lvl="0"/>
+              <a:t>Sara Lil Middleton</a:t>
+            </a:r>
+            <a:r>
+              <a:rPr/>
+              <a:t>: Writing - Review &amp; Editing, Supervision. </a:t>
+            </a:r>
             <a:r>
               <a:rPr b="1"/>
-              <a:t>Software</a:t>
-            </a:r>
-            <a:r>
-              <a:rPr/>
-              <a:t> : Programming, software development; designing computer programs; implementation of the computer code and supporting algorithms; testing of existing code components</a:t>
-            </a:r>
-          </a:p>
-          <a:p>
-            <a:pPr lvl="0"/>
-            <a:r>
-              <a:rPr b="1"/>
-              <a:t>Validation</a:t>
-            </a:r>
-            <a:r>
-              <a:rPr/>
-              <a:t>: Verification, whether as a part of the activity or separate, of the overall replication/ reproducibility of results/experiments and other research outputs</a:t>
-            </a:r>
-          </a:p>
-          <a:p>
-            <a:pPr lvl="0"/>
-            <a:r>
-              <a:rPr b="1"/>
-              <a:t>Formal analysis</a:t>
-            </a:r>
-            <a:r>
-              <a:rPr/>
-              <a:t>: Application of statistical, mathematical, computational, or other formal techniques to analyze or synthesize study data</a:t>
-            </a:r>
-          </a:p>
-          <a:p>
-            <a:pPr lvl="0"/>
-            <a:r>
-              <a:rPr b="1"/>
-              <a:t>Investigation</a:t>
-            </a:r>
-            <a:r>
-              <a:rPr/>
-              <a:t>: Conducting a research and investigation process, specifically performing the experiments, or data/evidence collection</a:t>
-            </a:r>
-          </a:p>
-          <a:p>
-            <a:pPr lvl="0"/>
-            <a:r>
-              <a:rPr b="1"/>
-              <a:t>Resources</a:t>
-            </a:r>
-            <a:r>
-              <a:rPr/>
-              <a:t>: Provision of study materials, reagents, materials, patients, laboratory samples, animals, instrumentation, computing resources, or other analysis tools</a:t>
-            </a:r>
-          </a:p>
-          <a:p>
-            <a:pPr lvl="0"/>
-            <a:r>
-              <a:rPr b="1"/>
-              <a:t>Data Curation</a:t>
-            </a:r>
-            <a:r>
-              <a:rPr/>
-              <a:t>: Management activities to annotate (produce metadata), scrub data and maintain research data (including software code, where it is necessary for interpreting the data itself) for initial use and later reuse</a:t>
-            </a:r>
-          </a:p>
-          <a:p>
-            <a:pPr lvl="0"/>
-            <a:r>
-              <a:rPr b="1"/>
-              <a:t>Writing - Original Draft</a:t>
-            </a:r>
-            <a:r>
-              <a:rPr/>
-              <a:t>: Preparation, creation and/or presentation of the published work, specifically writing the initial draft (including substantive translation)</a:t>
-            </a:r>
-          </a:p>
-          <a:p>
-            <a:pPr lvl="0"/>
-            <a:r>
-              <a:rPr b="1"/>
-              <a:t>Writing - Review &amp; Editing</a:t>
-            </a:r>
-            <a:r>
-              <a:rPr/>
-              <a:t>: Preparation, creation and/or presentation of the published work by those from the original research group, specifically critical review, commentary or revision – including pre-or postpublication stages</a:t>
-            </a:r>
-          </a:p>
-          <a:p>
-            <a:pPr lvl="0"/>
-            <a:r>
-              <a:rPr b="1"/>
-              <a:t>Visualization</a:t>
-            </a:r>
-            <a:r>
-              <a:rPr/>
-              <a:t>: Preparation, creation and/or presentation of the published work, specifically visualization/ data presentation</a:t>
-            </a:r>
-          </a:p>
-          <a:p>
-            <a:pPr lvl="0"/>
-            <a:r>
-              <a:rPr b="1"/>
-              <a:t>Supervision</a:t>
-            </a:r>
-            <a:r>
-              <a:rPr/>
-              <a:t>: Oversight and leadership responsibility for the research activity planning and execution, including mentorship external to the core team</a:t>
-            </a:r>
-          </a:p>
-          <a:p>
-            <a:pPr lvl="0"/>
-            <a:r>
-              <a:rPr b="1"/>
-              <a:t>Project administration</a:t>
-            </a:r>
-            <a:r>
-              <a:rPr/>
-              <a:t>: Management and coordination responsibility for the research activity planning and execution</a:t>
-            </a:r>
-          </a:p>
-          <a:p>
-            <a:pPr lvl="0"/>
-            <a:r>
-              <a:rPr b="1"/>
-              <a:t>Funding acquisition</a:t>
-            </a:r>
-            <a:r>
-              <a:rPr/>
-              <a:t>: Acquisition of the financial support for the project leading to this publication</a:t>
+              <a:t>Sarah von Grebmer zu Wolfsthurn</a:t>
+            </a:r>
+            <a:r>
+              <a:rPr/>
+              <a:t>: Conceptualisation, Writing - Review &amp; Editing, Supervision, Project Administration, Validation.</a:t>
+            </a:r>
+          </a:p>
+          <a:p>
+            <a:pPr lvl="0" indent="0" marL="0">
+              <a:buNone/>
+            </a:pPr>
+            <a:r>
+              <a:rPr/>
+              <a:t> </a:t>
+            </a:r>
+          </a:p>
+          <a:p>
+            <a:pPr lvl="0" indent="0" marL="0">
+              <a:buNone/>
+            </a:pPr>
+            <a:r>
+              <a:rPr/>
+              <a:t>This work by YYY XXX, Sara Lil Middleton and Sarah von Grebmer zu Wolfsthurn is licensed under a CC-BY 4.0 </a:t>
+            </a:r>
+            <a:r>
+              <a:rPr>
+                <a:hlinkClick r:id="rId3"/>
+              </a:rPr>
+              <a:t>Creative Commons Attribution 4.0 International License</a:t>
+            </a:r>
+            <a:r>
+              <a:rPr/>
+              <a:t>.</a:t>
             </a:r>
           </a:p>
         </p:txBody>
@@ -5138,12 +6428,12 @@
       </p:grpSpPr>
       <p:sp>
         <p:nvSpPr>
-          <p:cNvPr id="3" name="Content Placeholder 2"/>
-          <p:cNvSpPr>
-            <a:spLocks noGrp="1"/>
-          </p:cNvSpPr>
-          <p:nvPr>
-            <p:ph idx="1"/>
+          <p:cNvPr id="2" name="Title 1"/>
+          <p:cNvSpPr>
+            <a:spLocks noGrp="1"/>
+          </p:cNvSpPr>
+          <p:nvPr>
+            <p:ph type="title"/>
           </p:nvPr>
         </p:nvSpPr>
         <p:spPr/>
@@ -5152,32 +6442,11 @@
           <a:lstStyle/>
           <a:p>
             <a:pPr lvl="0" indent="0" marL="0">
-              <a:spcBef>
-                <a:spcPts val="3000"/>
-              </a:spcBef>
-              <a:buNone/>
-            </a:pPr>
-            <a:r>
-              <a:rPr b="1"/>
-              <a:t>Post-break survey discussion</a:t>
-            </a:r>
-          </a:p>
-          <a:p>
-            <a:pPr lvl="0"/>
-            <a:r>
-              <a:rPr b="1"/>
-              <a:t>Aim</a:t>
-            </a:r>
-            <a:r>
-              <a:rPr/>
-              <a:t>: To clarify concepts and aspects that are not yet understood</a:t>
-            </a:r>
-          </a:p>
-          <a:p>
-            <a:pPr lvl="0"/>
-            <a:r>
-              <a:rPr/>
-              <a:t>Highlight specific answers given during the survey</a:t>
+              <a:buNone/>
+            </a:pPr>
+            <a:r>
+              <a:rPr/>
+              <a:t>Break! 15 minutes</a:t>
             </a:r>
           </a:p>
         </p:txBody>
@@ -5227,7 +6496,7 @@
             </a:pPr>
             <a:r>
               <a:rPr b="1"/>
-              <a:t>Practical Exercise 2</a:t>
+              <a:t>Post-break survey discussion</a:t>
             </a:r>
           </a:p>
           <a:p>
@@ -5238,42 +6507,14 @@
             </a:r>
             <a:r>
               <a:rPr/>
-              <a:t>: Design more practical exercises for students to apply the new skills in practise.</a:t>
+              <a:t>: To clarify concepts and aspects that are not yet understood</a:t>
             </a:r>
           </a:p>
           <a:p>
             <a:pPr lvl="0"/>
             <a:r>
               <a:rPr/>
-              <a:t>Depending on the topic, the exercises should be in accordance with the learning objective(s).</a:t>
-            </a:r>
-          </a:p>
-          <a:p>
-            <a:pPr lvl="0"/>
-            <a:r>
-              <a:rPr/>
-              <a:t>Add a description of the task, as well as a checklist as an overview of that your students need to be doing.</a:t>
-            </a:r>
-          </a:p>
-          <a:p>
-            <a:pPr lvl="0"/>
-            <a:r>
-              <a:rPr/>
-              <a:t>☒ Step 1</a:t>
-            </a:r>
-          </a:p>
-          <a:p>
-            <a:pPr lvl="0"/>
-            <a:r>
-              <a:rPr/>
-              <a:t>☐ Step 2</a:t>
-            </a:r>
-          </a:p>
-          <a:p>
-            <a:pPr lvl="0"/>
-            <a:r>
-              <a:rPr/>
-              <a:t>☐ Step 3</a:t>
+              <a:t>Highlight specific answers given during the survey</a:t>
             </a:r>
           </a:p>
         </p:txBody>
@@ -5323,7 +6564,7 @@
             </a:pPr>
             <a:r>
               <a:rPr b="1"/>
-              <a:t>Relevance and implications</a:t>
+              <a:t>Practical exercise 2</a:t>
             </a:r>
           </a:p>
           <a:p>
@@ -5334,21 +6575,42 @@
             </a:r>
             <a:r>
               <a:rPr/>
-              <a:t>: To work out the relevance of the topic to your students.</a:t>
+              <a:t>: Design more practical exercises for students to apply the new skills in practise.</a:t>
             </a:r>
           </a:p>
           <a:p>
             <a:pPr lvl="0"/>
             <a:r>
               <a:rPr/>
-              <a:t>In an interactive setting, discuss how the new skills could be applied in practise with specific examples.</a:t>
+              <a:t>Depending on the topic, the exercises should be in accordance with the learning objective(s).</a:t>
             </a:r>
           </a:p>
           <a:p>
             <a:pPr lvl="0"/>
             <a:r>
               <a:rPr/>
-              <a:t>Examine downfalls and practical obstacles.</a:t>
+              <a:t>Add a description of the task, as well as a checklist as an overview of that your students need to be doing.</a:t>
+            </a:r>
+          </a:p>
+          <a:p>
+            <a:pPr lvl="0"/>
+            <a:r>
+              <a:rPr/>
+              <a:t>☒ Step 1</a:t>
+            </a:r>
+          </a:p>
+          <a:p>
+            <a:pPr lvl="0"/>
+            <a:r>
+              <a:rPr/>
+              <a:t>☐ Step 2</a:t>
+            </a:r>
+          </a:p>
+          <a:p>
+            <a:pPr lvl="0"/>
+            <a:r>
+              <a:rPr/>
+              <a:t>☐ Step 3</a:t>
             </a:r>
           </a:p>
         </p:txBody>
@@ -5398,38 +6660,32 @@
             </a:pPr>
             <a:r>
               <a:rPr b="1"/>
-              <a:t>Take-home message</a:t>
-            </a:r>
-          </a:p>
-          <a:p>
-            <a:pPr lvl="0" indent="0" marL="0">
-              <a:buNone/>
-            </a:pPr>
+              <a:t>Relevance and implications</a:t>
+            </a:r>
+          </a:p>
+          <a:p>
+            <a:pPr lvl="0"/>
             <a:r>
               <a:rPr b="1"/>
               <a:t>Aim</a:t>
             </a:r>
             <a:r>
               <a:rPr/>
-              <a:t>: End lesson on clear take-home message that are interactively compiled by students.</a:t>
-            </a:r>
-          </a:p>
-          <a:p>
-            <a:pPr lvl="0" indent="0" marL="1270000">
-              <a:buNone/>
-            </a:pPr>
-            <a:r>
-              <a:rPr sz="2000" b="1"/>
-              <a:t>Tip with Title</a:t>
-            </a:r>
-          </a:p>
-          <a:p>
-            <a:pPr lvl="0" indent="0" marL="1270000">
-              <a:buNone/>
-            </a:pPr>
-            <a:r>
-              <a:rPr sz="2000"/>
-              <a:t>Add one practical tips or take-home message.</a:t>
+              <a:t>: To work out the relevance of the topic to your students.</a:t>
+            </a:r>
+          </a:p>
+          <a:p>
+            <a:pPr lvl="0"/>
+            <a:r>
+              <a:rPr/>
+              <a:t>In an interactive setting, discuss how the new skills could be applied in practise with specific examples.</a:t>
+            </a:r>
+          </a:p>
+          <a:p>
+            <a:pPr lvl="0"/>
+            <a:r>
+              <a:rPr/>
+              <a:t>Examine downfalls and practical obstacles.</a:t>
             </a:r>
           </a:p>
         </p:txBody>
@@ -5479,39 +6735,38 @@
             </a:pPr>
             <a:r>
               <a:rPr b="1"/>
-              <a:t>Assignment</a:t>
-            </a:r>
-          </a:p>
-          <a:p>
-            <a:pPr lvl="0"/>
+              <a:t>Take-home message</a:t>
+            </a:r>
+          </a:p>
+          <a:p>
+            <a:pPr lvl="0" indent="0" marL="0">
+              <a:buNone/>
+            </a:pPr>
             <a:r>
               <a:rPr b="1"/>
               <a:t>Aim</a:t>
             </a:r>
             <a:r>
               <a:rPr/>
-              <a:t>: Explain the homework assignment and the rationale behind the homework.</a:t>
-            </a:r>
-          </a:p>
-          <a:p>
-            <a:pPr lvl="0"/>
-            <a:r>
-              <a:rPr/>
-              <a:t>Examine whether/how it will be assessed</a:t>
-            </a:r>
-          </a:p>
-          <a:p>
-            <a:pPr lvl="0"/>
-            <a:r>
-              <a:rPr/>
-              <a:t>Mention scoring rubrics, if applicable</a:t>
-            </a:r>
-          </a:p>
-          <a:p>
-            <a:pPr lvl="0"/>
-            <a:r>
-              <a:rPr/>
-              <a:t>Design a peer-review system for assignments to place students in role of reviewer and author</a:t>
+              <a:t>: End lesson on clear take-home message that are interactively compiled by students.</a:t>
+            </a:r>
+          </a:p>
+          <a:p>
+            <a:pPr lvl="0" indent="0" marL="1270000">
+              <a:buNone/>
+            </a:pPr>
+            <a:r>
+              <a:rPr sz="2000" b="1"/>
+              <a:t>Tip with Title</a:t>
+            </a:r>
+          </a:p>
+          <a:p>
+            <a:pPr lvl="0" indent="0" marL="1270000">
+              <a:buNone/>
+            </a:pPr>
+            <a:r>
+              <a:rPr sz="2000"/>
+              <a:t>Add one practical tips or take-home message.</a:t>
             </a:r>
           </a:p>
         </p:txBody>
@@ -5561,7 +6816,7 @@
             </a:pPr>
             <a:r>
               <a:rPr b="1"/>
-              <a:t>To conclude: Survey time!</a:t>
+              <a:t>Assignment</a:t>
             </a:r>
           </a:p>
           <a:p>
@@ -5572,14 +6827,28 @@
             </a:r>
             <a:r>
               <a:rPr/>
-              <a:t>: This post-submodule survey serves to examine students’ current knowledge about the sumodule’s topic.</a:t>
+              <a:t>: Explain the homework assignment and the rationale behind the homework.</a:t>
             </a:r>
           </a:p>
           <a:p>
             <a:pPr lvl="0"/>
             <a:r>
               <a:rPr/>
-              <a:t>Use free survey software such as or other survey software (particify, formR) to establish the following questions (shown on separate slides):</a:t>
+              <a:t>Examine whether/how it will be assessed</a:t>
+            </a:r>
+          </a:p>
+          <a:p>
+            <a:pPr lvl="0"/>
+            <a:r>
+              <a:rPr/>
+              <a:t>Mention scoring rubrics, if applicable</a:t>
+            </a:r>
+          </a:p>
+          <a:p>
+            <a:pPr lvl="0"/>
+            <a:r>
+              <a:rPr/>
+              <a:t>Design a peer-review system for assignments to place students in role of reviewer and author</a:t>
             </a:r>
           </a:p>
         </p:txBody>
@@ -5622,47 +6891,32 @@
           <a:lstStyle/>
           <a:p>
             <a:pPr lvl="0" indent="0" marL="0">
+              <a:spcBef>
+                <a:spcPts val="3000"/>
+              </a:spcBef>
               <a:buNone/>
             </a:pPr>
             <a:r>
               <a:rPr b="1"/>
-              <a:t>What is your level of familiarity with [Topic] (e.g., basic concepts, terminology, or tools)?</a:t>
-            </a:r>
-          </a:p>
-          <a:p>
-            <a:pPr lvl="0" indent="-342900" marL="342900">
-              <a:buAutoNum type="alphaLcPeriod"/>
-            </a:pPr>
-            <a:r>
-              <a:rPr/>
-              <a:t>I have never heard of it before.</a:t>
-            </a:r>
-          </a:p>
-          <a:p>
-            <a:pPr lvl="0" indent="-342900" marL="342900">
-              <a:buAutoNum type="alphaLcPeriod"/>
-            </a:pPr>
-            <a:r>
-              <a:rPr/>
-              <a:t>I have heard of it but have never worked with it.</a:t>
-            </a:r>
-          </a:p>
-          <a:p>
-            <a:pPr lvl="0" indent="-342900" marL="342900">
-              <a:buAutoNum type="alphaLcPeriod"/>
-            </a:pPr>
-            <a:r>
-              <a:rPr/>
-              <a:t>I have basic understanding and experience with it.</a:t>
-            </a:r>
-          </a:p>
-          <a:p>
-            <a:pPr lvl="0" indent="-342900" marL="342900">
-              <a:buAutoNum type="alphaLcPeriod"/>
-            </a:pPr>
-            <a:r>
-              <a:rPr/>
-              <a:t>I am very familiar and have worked with it extensively.</a:t>
+              <a:t>To conclude: Survey time!</a:t>
+            </a:r>
+          </a:p>
+          <a:p>
+            <a:pPr lvl="0"/>
+            <a:r>
+              <a:rPr b="1"/>
+              <a:t>Aim</a:t>
+            </a:r>
+            <a:r>
+              <a:rPr/>
+              <a:t>: This post-submodule survey serves to examine students’ current knowledge about the sumodule’s topic.</a:t>
+            </a:r>
+          </a:p>
+          <a:p>
+            <a:pPr lvl="0"/>
+            <a:r>
+              <a:rPr/>
+              <a:t>Use free survey software such as or other survey software (particify, formR) to establish the following questions (shown on separate slides):</a:t>
             </a:r>
           </a:p>
         </p:txBody>
@@ -5709,7 +6963,7 @@
             </a:pPr>
             <a:r>
               <a:rPr b="1"/>
-              <a:t>Which of the following concepts or skills do you feel most confident about in relation to [Topic]? (Select all that apply)</a:t>
+              <a:t>What is your level of familiarity with [Topic] (e.g., basic concepts, terminology, or tools)?</a:t>
             </a:r>
           </a:p>
           <a:p>
@@ -5718,7 +6972,7 @@
             </a:pPr>
             <a:r>
               <a:rPr/>
-              <a:t>Concept 1</a:t>
+              <a:t>I have never heard of it before.</a:t>
             </a:r>
           </a:p>
           <a:p>
@@ -5727,7 +6981,7 @@
             </a:pPr>
             <a:r>
               <a:rPr/>
-              <a:t>Concept 2</a:t>
+              <a:t>I have heard of it but have never worked with it.</a:t>
             </a:r>
           </a:p>
           <a:p>
@@ -5736,7 +6990,7 @@
             </a:pPr>
             <a:r>
               <a:rPr/>
-              <a:t>Concept 3</a:t>
+              <a:t>I have basic understanding and experience with it.</a:t>
             </a:r>
           </a:p>
           <a:p>
@@ -5745,16 +6999,7 @@
             </a:pPr>
             <a:r>
               <a:rPr/>
-              <a:t>Concept 4</a:t>
-            </a:r>
-          </a:p>
-          <a:p>
-            <a:pPr lvl="0" indent="-342900" marL="342900">
-              <a:buAutoNum type="alphaLcPeriod"/>
-            </a:pPr>
-            <a:r>
-              <a:rPr/>
-              <a:t>I am not sure about any of these concepts.</a:t>
+              <a:t>I am very familiar and have worked with it extensively.</a:t>
             </a:r>
           </a:p>
         </p:txBody>
@@ -5801,7 +7046,7 @@
             </a:pPr>
             <a:r>
               <a:rPr b="1"/>
-              <a:t>On a scale of 1 to 5, how comfortable are you with using [specific tool/technology] related to [Topic]? (1 = Not comfortable at all, 5 = Very comfortable)</a:t>
+              <a:t>Which of the following concepts or skills do you feel most confident about in relation to [Topic]? (Select all that apply)</a:t>
             </a:r>
           </a:p>
           <a:p>
@@ -5810,7 +7055,7 @@
             </a:pPr>
             <a:r>
               <a:rPr/>
-              <a:t>1</a:t>
+              <a:t>Concept 1</a:t>
             </a:r>
           </a:p>
           <a:p>
@@ -5819,7 +7064,7 @@
             </a:pPr>
             <a:r>
               <a:rPr/>
-              <a:t>2</a:t>
+              <a:t>Concept 2</a:t>
             </a:r>
           </a:p>
           <a:p>
@@ -5828,7 +7073,7 @@
             </a:pPr>
             <a:r>
               <a:rPr/>
-              <a:t>3</a:t>
+              <a:t>Concept 3</a:t>
             </a:r>
           </a:p>
           <a:p>
@@ -5837,7 +7082,7 @@
             </a:pPr>
             <a:r>
               <a:rPr/>
-              <a:t>4</a:t>
+              <a:t>Concept 4</a:t>
             </a:r>
           </a:p>
           <a:p>
@@ -5846,7 +7091,7 @@
             </a:pPr>
             <a:r>
               <a:rPr/>
-              <a:t>5</a:t>
+              <a:t>I am not sure about any of these concepts.</a:t>
             </a:r>
           </a:p>
         </p:txBody>
@@ -5889,32 +7134,56 @@
           <a:lstStyle/>
           <a:p>
             <a:pPr lvl="0" indent="0" marL="0">
-              <a:spcBef>
-                <a:spcPts val="3000"/>
-              </a:spcBef>
               <a:buNone/>
             </a:pPr>
             <a:r>
               <a:rPr b="1"/>
-              <a:t>Discussion of survey results</a:t>
-            </a:r>
-          </a:p>
-          <a:p>
-            <a:pPr lvl="0"/>
-            <a:r>
-              <a:rPr b="1"/>
-              <a:t>Aim</a:t>
-            </a:r>
-            <a:r>
-              <a:rPr/>
-              <a:t>: Briefly examine the answers given to each question interactively with the group.</a:t>
-            </a:r>
-          </a:p>
-          <a:p>
-            <a:pPr lvl="0"/>
-            <a:r>
-              <a:rPr/>
-              <a:t>Compare and highlight specific differences in answers between pre- and post-survey answers</a:t>
+              <a:t>On a scale of 1 to 5, how comfortable are you with using [specific tool/technology] related to [Topic]? (1 = Not comfortable at all, 5 = Very comfortable)</a:t>
+            </a:r>
+          </a:p>
+          <a:p>
+            <a:pPr lvl="0" indent="-342900" marL="342900">
+              <a:buAutoNum type="alphaLcPeriod"/>
+            </a:pPr>
+            <a:r>
+              <a:rPr/>
+              <a:t>1</a:t>
+            </a:r>
+          </a:p>
+          <a:p>
+            <a:pPr lvl="0" indent="-342900" marL="342900">
+              <a:buAutoNum type="alphaLcPeriod"/>
+            </a:pPr>
+            <a:r>
+              <a:rPr/>
+              <a:t>2</a:t>
+            </a:r>
+          </a:p>
+          <a:p>
+            <a:pPr lvl="0" indent="-342900" marL="342900">
+              <a:buAutoNum type="alphaLcPeriod"/>
+            </a:pPr>
+            <a:r>
+              <a:rPr/>
+              <a:t>3</a:t>
+            </a:r>
+          </a:p>
+          <a:p>
+            <a:pPr lvl="0" indent="-342900" marL="342900">
+              <a:buAutoNum type="alphaLcPeriod"/>
+            </a:pPr>
+            <a:r>
+              <a:rPr/>
+              <a:t>4</a:t>
+            </a:r>
+          </a:p>
+          <a:p>
+            <a:pPr lvl="0" indent="-342900" marL="342900">
+              <a:buAutoNum type="alphaLcPeriod"/>
+            </a:pPr>
+            <a:r>
+              <a:rPr/>
+              <a:t>5</a:t>
             </a:r>
           </a:p>
         </p:txBody>
@@ -5973,7 +7242,7 @@
             </a:pPr>
             <a:r>
               <a:rPr sz="2000" b="1"/>
-              <a:t>Prerequisites</a:t>
+              <a:t>Important</a:t>
             </a:r>
           </a:p>
           <a:p>
@@ -6207,14 +7476,25 @@
             </a:pPr>
             <a:r>
               <a:rPr b="1"/>
-              <a:t>References</a:t>
+              <a:t>Discussion of survey results</a:t>
             </a:r>
           </a:p>
           <a:p>
             <a:pPr lvl="0"/>
             <a:r>
-              <a:rPr/>
-              <a:t>Provide literature you refer to throughout this lesson.</a:t>
+              <a:rPr b="1"/>
+              <a:t>Aim</a:t>
+            </a:r>
+            <a:r>
+              <a:rPr/>
+              <a:t>: Briefly examine the answers given to each question interactively with the group.</a:t>
+            </a:r>
+          </a:p>
+          <a:p>
+            <a:pPr lvl="0"/>
+            <a:r>
+              <a:rPr/>
+              <a:t>Compare and highlight specific differences in answers between pre- and post-survey answers</a:t>
             </a:r>
           </a:p>
         </p:txBody>
@@ -6243,12 +7523,12 @@
       </p:grpSpPr>
       <p:sp>
         <p:nvSpPr>
-          <p:cNvPr id="2" name="Title 1"/>
-          <p:cNvSpPr>
-            <a:spLocks noGrp="1"/>
-          </p:cNvSpPr>
-          <p:nvPr>
-            <p:ph type="title"/>
+          <p:cNvPr id="3" name="Content Placeholder 2"/>
+          <p:cNvSpPr>
+            <a:spLocks noGrp="1"/>
+          </p:cNvSpPr>
+          <p:nvPr>
+            <p:ph idx="1"/>
           </p:nvPr>
         </p:nvSpPr>
         <p:spPr/>
@@ -6257,36 +7537,21 @@
           <a:lstStyle/>
           <a:p>
             <a:pPr lvl="0" indent="0" marL="0">
-              <a:buNone/>
-            </a:pPr>
-            <a:r>
-              <a:rPr/>
-              <a:t>Thanks! </a:t>
-            </a:r>
-          </a:p>
-        </p:txBody>
-      </p:sp>
-      <p:sp>
-        <p:nvSpPr>
-          <p:cNvPr id="3" name="Content Placeholder 2"/>
-          <p:cNvSpPr>
-            <a:spLocks noGrp="1"/>
-          </p:cNvSpPr>
-          <p:nvPr>
-            <p:ph idx="1"/>
-          </p:nvPr>
-        </p:nvSpPr>
-        <p:spPr/>
-        <p:txBody>
-          <a:bodyPr/>
-          <a:lstStyle/>
-          <a:p>
-            <a:pPr lvl="0" indent="0" marL="0">
-              <a:buNone/>
-            </a:pPr>
-            <a:r>
-              <a:rPr/>
-              <a:t>See you next class :)</a:t>
+              <a:spcBef>
+                <a:spcPts val="3000"/>
+              </a:spcBef>
+              <a:buNone/>
+            </a:pPr>
+            <a:r>
+              <a:rPr b="1"/>
+              <a:t>References</a:t>
+            </a:r>
+          </a:p>
+          <a:p>
+            <a:pPr lvl="0"/>
+            <a:r>
+              <a:rPr/>
+              <a:t>Provide literature you refer to throughout this lesson.</a:t>
             </a:r>
           </a:p>
         </p:txBody>
@@ -6315,6 +7580,31 @@
       </p:grpSpPr>
       <p:sp>
         <p:nvSpPr>
+          <p:cNvPr id="2" name="Title 1"/>
+          <p:cNvSpPr>
+            <a:spLocks noGrp="1"/>
+          </p:cNvSpPr>
+          <p:nvPr>
+            <p:ph type="title"/>
+          </p:nvPr>
+        </p:nvSpPr>
+        <p:spPr/>
+        <p:txBody>
+          <a:bodyPr/>
+          <a:lstStyle/>
+          <a:p>
+            <a:pPr lvl="0" indent="0" marL="0">
+              <a:buNone/>
+            </a:pPr>
+            <a:r>
+              <a:rPr/>
+              <a:t>Thanks! </a:t>
+            </a:r>
+          </a:p>
+        </p:txBody>
+      </p:sp>
+      <p:sp>
+        <p:nvSpPr>
           <p:cNvPr id="3" name="Content Placeholder 2"/>
           <p:cNvSpPr>
             <a:spLocks noGrp="1"/>
@@ -6329,42 +7619,11 @@
           <a:lstStyle/>
           <a:p>
             <a:pPr lvl="0" indent="0" marL="0">
-              <a:spcBef>
-                <a:spcPts val="3000"/>
-              </a:spcBef>
-              <a:buNone/>
-            </a:pPr>
-            <a:r>
-              <a:rPr b="1"/>
-              <a:t>Pedagogical add-on tools for instructors</a:t>
-            </a:r>
-          </a:p>
-          <a:p>
-            <a:pPr lvl="0"/>
-            <a:r>
-              <a:rPr/>
-              <a:t>This section is dedicated to ideas on how to incorporate pedagogical tools into teaching for this specific submodule topic. This could mean:</a:t>
-            </a:r>
-          </a:p>
-          <a:p>
-            <a:pPr lvl="1"/>
-            <a:r>
-              <a:rPr/>
-              <a:t>Information about the scientific evidence on the theory of the pedagogical add-on tool and the evidence for its efficacy.</a:t>
-            </a:r>
-          </a:p>
-          <a:p>
-            <a:pPr lvl="1"/>
-            <a:r>
-              <a:rPr/>
-              <a:t>Discussion/reflection on how tools can be incorporated into the teaching for this particular content.</a:t>
-            </a:r>
-          </a:p>
-          <a:p>
-            <a:pPr lvl="1"/>
-            <a:r>
-              <a:rPr/>
-              <a:t>Extra exercises for faster students.</a:t>
+              <a:buNone/>
+            </a:pPr>
+            <a:r>
+              <a:rPr/>
+              <a:t>See you next class :)</a:t>
             </a:r>
           </a:p>
         </p:txBody>
@@ -6414,29 +7673,35 @@
             </a:pPr>
             <a:r>
               <a:rPr b="1"/>
-              <a:t>Additional literature for instructors</a:t>
+              <a:t>Pedagogical add-on tools for instructors</a:t>
             </a:r>
           </a:p>
           <a:p>
             <a:pPr lvl="0"/>
             <a:r>
               <a:rPr/>
-              <a:t>References for content</a:t>
-            </a:r>
-          </a:p>
-          <a:p>
-            <a:pPr lvl="0"/>
-            <a:r>
-              <a:rPr/>
-              <a:t>References for pedagogical add-on tools</a:t>
-            </a:r>
-            <a:br/>
-          </a:p>
-          <a:p>
-            <a:pPr lvl="0"/>
-            <a:r>
-              <a:rPr/>
-              <a:t>Other resources (videos etc.)</a:t>
+              <a:t>This section is dedicated to ideas on how to incorporate pedagogical tools into teaching for this specific submodule topic. This could mean:</a:t>
+            </a:r>
+          </a:p>
+          <a:p>
+            <a:pPr lvl="1"/>
+            <a:r>
+              <a:rPr/>
+              <a:t>Information about the scientific evidence on the theory of the pedagogical add-on tool and the evidence for its efficacy.</a:t>
+            </a:r>
+          </a:p>
+          <a:p>
+            <a:pPr lvl="1"/>
+            <a:r>
+              <a:rPr/>
+              <a:t>Discussion/reflection on how tools can be incorporated into the teaching for this particular content.</a:t>
+            </a:r>
+          </a:p>
+          <a:p>
+            <a:pPr lvl="1"/>
+            <a:r>
+              <a:rPr/>
+              <a:t>Extra exercises for faster students.</a:t>
             </a:r>
           </a:p>
         </p:txBody>
@@ -6465,12 +7730,12 @@
       </p:grpSpPr>
       <p:sp>
         <p:nvSpPr>
-          <p:cNvPr id="2" name="Title 1"/>
-          <p:cNvSpPr>
-            <a:spLocks noGrp="1"/>
-          </p:cNvSpPr>
-          <p:nvPr>
-            <p:ph type="title"/>
+          <p:cNvPr id="3" name="Content Placeholder 2"/>
+          <p:cNvSpPr>
+            <a:spLocks noGrp="1"/>
+          </p:cNvSpPr>
+          <p:nvPr>
+            <p:ph idx="1"/>
           </p:nvPr>
         </p:nvSpPr>
         <p:spPr/>
@@ -6479,38 +7744,36 @@
           <a:lstStyle/>
           <a:p>
             <a:pPr lvl="0" indent="0" marL="0">
-              <a:buNone/>
-            </a:pPr>
-            <a:r>
-              <a:rPr/>
-              <a:t>Formatting elements for instructors</a:t>
-            </a:r>
-          </a:p>
-        </p:txBody>
-      </p:sp>
-      <p:sp>
-        <p:nvSpPr>
-          <p:cNvPr id="3" name="Content Placeholder 2"/>
-          <p:cNvSpPr>
-            <a:spLocks noGrp="1"/>
-          </p:cNvSpPr>
-          <p:nvPr>
-            <p:ph idx="1"/>
-          </p:nvPr>
-        </p:nvSpPr>
-        <p:spPr/>
-        <p:txBody>
-          <a:bodyPr/>
-          <a:lstStyle/>
+              <a:spcBef>
+                <a:spcPts val="3000"/>
+              </a:spcBef>
+              <a:buNone/>
+            </a:pPr>
+            <a:r>
+              <a:rPr b="1"/>
+              <a:t>Additional literature for instructors</a:t>
+            </a:r>
+          </a:p>
           <a:p>
             <a:pPr lvl="0"/>
             <a:r>
-              <a:rPr b="1"/>
-              <a:t>Aim</a:t>
-            </a:r>
-            <a:r>
-              <a:rPr/>
-              <a:t>: This section contains templates for different formatting elements, which can be modified and adapted for the instructor’s individual purposes.</a:t>
+              <a:rPr/>
+              <a:t>References for content</a:t>
+            </a:r>
+          </a:p>
+          <a:p>
+            <a:pPr lvl="0"/>
+            <a:r>
+              <a:rPr/>
+              <a:t>References for pedagogical add-on tools</a:t>
+            </a:r>
+            <a:br/>
+          </a:p>
+          <a:p>
+            <a:pPr lvl="0"/>
+            <a:r>
+              <a:rPr/>
+              <a:t>Other resources (videos etc.)</a:t>
             </a:r>
           </a:p>
         </p:txBody>
@@ -6539,6 +7802,31 @@
       </p:grpSpPr>
       <p:sp>
         <p:nvSpPr>
+          <p:cNvPr id="2" name="Title 1"/>
+          <p:cNvSpPr>
+            <a:spLocks noGrp="1"/>
+          </p:cNvSpPr>
+          <p:nvPr>
+            <p:ph type="title"/>
+          </p:nvPr>
+        </p:nvSpPr>
+        <p:spPr/>
+        <p:txBody>
+          <a:bodyPr/>
+          <a:lstStyle/>
+          <a:p>
+            <a:pPr lvl="0" indent="0" marL="0">
+              <a:buNone/>
+            </a:pPr>
+            <a:r>
+              <a:rPr/>
+              <a:t>Formatting elements for instructors</a:t>
+            </a:r>
+          </a:p>
+        </p:txBody>
+      </p:sp>
+      <p:sp>
+        <p:nvSpPr>
           <p:cNvPr id="3" name="Content Placeholder 2"/>
           <p:cNvSpPr>
             <a:spLocks noGrp="1"/>
@@ -6552,51 +7840,14 @@
           <a:bodyPr/>
           <a:lstStyle/>
           <a:p>
-            <a:pPr lvl="0" indent="0" marL="0">
-              <a:spcBef>
-                <a:spcPts val="3000"/>
-              </a:spcBef>
-              <a:buNone/>
-            </a:pPr>
+            <a:pPr lvl="0"/>
             <a:r>
               <a:rPr b="1"/>
-              <a:t>Text with example links</a:t>
-            </a:r>
-          </a:p>
-          <a:p>
-            <a:pPr lvl="0"/>
-            <a:r>
-              <a:rPr>
-                <a:hlinkClick r:id="rId2"/>
-              </a:rPr>
-              <a:t>Quarto Documentation</a:t>
-            </a:r>
-          </a:p>
-          <a:p>
-            <a:pPr lvl="0"/>
-            <a:r>
-              <a:rPr>
-                <a:hlinkClick r:id="rId3"/>
-              </a:rPr>
-              <a:t>Reveal.js Documentation</a:t>
-            </a:r>
-          </a:p>
-          <a:p>
-            <a:pPr lvl="0"/>
-            <a:r>
-              <a:rPr>
-                <a:hlinkClick r:id="rId4"/>
-              </a:rPr>
-              <a:t>Markdown Guide</a:t>
-            </a:r>
-          </a:p>
-          <a:p>
-            <a:pPr lvl="0"/>
-            <a:r>
-              <a:rPr>
-                <a:hlinkClick r:id="rId5"/>
-              </a:rPr>
-              <a:t>GitHub</a:t>
+              <a:t>Aim</a:t>
+            </a:r>
+            <a:r>
+              <a:rPr/>
+              <a:t>: This section contains templates for different formatting elements, which can be modified and adapted for the instructor’s individual purposes.</a:t>
             </a:r>
           </a:p>
         </p:txBody>
@@ -6646,133 +7897,43 @@
             </a:pPr>
             <a:r>
               <a:rPr b="1"/>
-              <a:t>Basic text formatting</a:t>
+              <a:t>Text with example links</a:t>
             </a:r>
           </a:p>
           <a:p>
             <a:pPr lvl="0"/>
             <a:r>
-              <a:rPr b="1"/>
-              <a:t>Bold:</a:t>
-            </a:r>
-            <a:r>
-              <a:rPr/>
-              <a:t> </a:t>
-            </a:r>
-            <a:r>
               <a:rPr>
-                <a:latin typeface="Courier"/>
+                <a:hlinkClick r:id="rId2"/>
               </a:rPr>
-              <a:t>**bold**</a:t>
-            </a:r>
-            <a:r>
-              <a:rPr/>
-              <a:t> → </a:t>
-            </a:r>
-            <a:r>
-              <a:rPr b="1"/>
-              <a:t>bold</a:t>
+              <a:t>Quarto Documentation</a:t>
             </a:r>
           </a:p>
           <a:p>
             <a:pPr lvl="0"/>
             <a:r>
-              <a:rPr i="1"/>
-              <a:t>Italic:</a:t>
-            </a:r>
-            <a:r>
-              <a:rPr/>
-              <a:t> </a:t>
-            </a:r>
-            <a:r>
               <a:rPr>
-                <a:latin typeface="Courier"/>
+                <a:hlinkClick r:id="rId3"/>
               </a:rPr>
-              <a:t>*italic*</a:t>
-            </a:r>
-            <a:r>
-              <a:rPr/>
-              <a:t> → </a:t>
-            </a:r>
-            <a:r>
-              <a:rPr i="1"/>
-              <a:t>italic</a:t>
+              <a:t>Reveal.js Documentation</a:t>
             </a:r>
           </a:p>
           <a:p>
             <a:pPr lvl="0"/>
             <a:r>
-              <a:rPr strike="sngStrike"/>
-              <a:t>Strikethrough:</a:t>
-            </a:r>
-            <a:r>
-              <a:rPr/>
-              <a:t> </a:t>
-            </a:r>
-            <a:r>
               <a:rPr>
-                <a:latin typeface="Courier"/>
+                <a:hlinkClick r:id="rId4"/>
               </a:rPr>
-              <a:t>~~text~~</a:t>
-            </a:r>
-            <a:r>
-              <a:rPr/>
-              <a:t> → </a:t>
-            </a:r>
-            <a:r>
-              <a:rPr strike="sngStrike"/>
-              <a:t>text</a:t>
+              <a:t>Markdown Guide</a:t>
             </a:r>
           </a:p>
           <a:p>
             <a:pPr lvl="0"/>
             <a:r>
               <a:rPr>
-                <a:latin typeface="Courier"/>
+                <a:hlinkClick r:id="rId5"/>
               </a:rPr>
-              <a:t>Inline code:</a:t>
-            </a:r>
-            <a:r>
-              <a:rPr/>
-              <a:t> </a:t>
-            </a:r>
-            <a:r>
-              <a:rPr>
-                <a:latin typeface="Courier"/>
-              </a:rPr>
-              <a:t>`code`</a:t>
-            </a:r>
-            <a:r>
-              <a:rPr/>
-              <a:t> → </a:t>
-            </a:r>
-            <a:r>
-              <a:rPr>
-                <a:latin typeface="Courier"/>
-              </a:rPr>
-              <a:t>code</a:t>
-            </a:r>
-          </a:p>
-          <a:p>
-            <a:pPr lvl="0" indent="0" marL="1270000"/>
-            <a:r>
-              <a:rPr sz="2000"/>
-              <a:t>Blockquote: </a:t>
-            </a:r>
-            <a:r>
-              <a:rPr sz="2000">
-                <a:latin typeface="Courier"/>
-              </a:rPr>
-              <a:t>&gt; Quote</a:t>
-            </a:r>
-            <a:r>
-              <a:rPr sz="2000"/>
-              <a:t> →</a:t>
-            </a:r>
-            <a:br/>
-            <a:r>
-              <a:rPr sz="2000"/>
-              <a:t>“This is a quote”</a:t>
+              <a:t>GitHub</a:t>
             </a:r>
           </a:p>
         </p:txBody>
@@ -6822,28 +7983,133 @@
             </a:pPr>
             <a:r>
               <a:rPr b="1"/>
-              <a:t>Figure with caption</a:t>
+              <a:t>Basic text formatting</a:t>
             </a:r>
           </a:p>
           <a:p>
             <a:pPr lvl="0"/>
             <a:r>
-              <a:rPr/>
-              <a:t>Centered image and caption below in italics</a:t>
-            </a:r>
-          </a:p>
-          <a:p>
-            <a:pPr lvl="0" indent="0" marL="0">
-              <a:buNone/>
-            </a:pPr>
-          </a:p>
-          <a:p>
-            <a:pPr lvl="0" indent="0" marL="0">
-              <a:buNone/>
-            </a:pPr>
-            <a:r>
-              <a:rPr/>
-              <a:t>This is a Penguin.</a:t>
+              <a:rPr b="1"/>
+              <a:t>Bold:</a:t>
+            </a:r>
+            <a:r>
+              <a:rPr/>
+              <a:t> </a:t>
+            </a:r>
+            <a:r>
+              <a:rPr>
+                <a:latin typeface="Courier"/>
+              </a:rPr>
+              <a:t>**bold**</a:t>
+            </a:r>
+            <a:r>
+              <a:rPr/>
+              <a:t> → </a:t>
+            </a:r>
+            <a:r>
+              <a:rPr b="1"/>
+              <a:t>bold</a:t>
+            </a:r>
+          </a:p>
+          <a:p>
+            <a:pPr lvl="0"/>
+            <a:r>
+              <a:rPr i="1"/>
+              <a:t>Italic:</a:t>
+            </a:r>
+            <a:r>
+              <a:rPr/>
+              <a:t> </a:t>
+            </a:r>
+            <a:r>
+              <a:rPr>
+                <a:latin typeface="Courier"/>
+              </a:rPr>
+              <a:t>*italic*</a:t>
+            </a:r>
+            <a:r>
+              <a:rPr/>
+              <a:t> → </a:t>
+            </a:r>
+            <a:r>
+              <a:rPr i="1"/>
+              <a:t>italic</a:t>
+            </a:r>
+          </a:p>
+          <a:p>
+            <a:pPr lvl="0"/>
+            <a:r>
+              <a:rPr strike="sngStrike"/>
+              <a:t>Strikethrough:</a:t>
+            </a:r>
+            <a:r>
+              <a:rPr/>
+              <a:t> </a:t>
+            </a:r>
+            <a:r>
+              <a:rPr>
+                <a:latin typeface="Courier"/>
+              </a:rPr>
+              <a:t>~~text~~</a:t>
+            </a:r>
+            <a:r>
+              <a:rPr/>
+              <a:t> → </a:t>
+            </a:r>
+            <a:r>
+              <a:rPr strike="sngStrike"/>
+              <a:t>text</a:t>
+            </a:r>
+          </a:p>
+          <a:p>
+            <a:pPr lvl="0"/>
+            <a:r>
+              <a:rPr>
+                <a:latin typeface="Courier"/>
+              </a:rPr>
+              <a:t>Inline code:</a:t>
+            </a:r>
+            <a:r>
+              <a:rPr/>
+              <a:t> </a:t>
+            </a:r>
+            <a:r>
+              <a:rPr>
+                <a:latin typeface="Courier"/>
+              </a:rPr>
+              <a:t>`code`</a:t>
+            </a:r>
+            <a:r>
+              <a:rPr/>
+              <a:t> → </a:t>
+            </a:r>
+            <a:r>
+              <a:rPr>
+                <a:latin typeface="Courier"/>
+              </a:rPr>
+              <a:t>code</a:t>
+            </a:r>
+          </a:p>
+          <a:p>
+            <a:pPr lvl="0" indent="0" marL="1270000"/>
+            <a:r>
+              <a:rPr sz="2000"/>
+              <a:t>Blockquote: </a:t>
+            </a:r>
+            <a:r>
+              <a:rPr sz="2000">
+                <a:latin typeface="Courier"/>
+              </a:rPr>
+              <a:t>&gt; Quote</a:t>
+            </a:r>
+            <a:r>
+              <a:rPr sz="2000"/>
+              <a:t> →</a:t>
+            </a:r>
+            <a:br/>
+            <a:r>
+              <a:rPr sz="2000"/>
+              <a:t>“This is a quote”</a:t>
             </a:r>
           </a:p>
         </p:txBody>
@@ -6893,7 +8159,14 @@
             </a:pPr>
             <a:r>
               <a:rPr b="1"/>
-              <a:t>Figure with bullet points</a:t>
+              <a:t>Figure with caption</a:t>
+            </a:r>
+          </a:p>
+          <a:p>
+            <a:pPr lvl="0"/>
+            <a:r>
+              <a:rPr/>
+              <a:t>Centered image and caption below in italics</a:t>
             </a:r>
           </a:p>
           <a:p>
@@ -6902,24 +8175,12 @@
             </a:pPr>
           </a:p>
           <a:p>
-            <a:pPr lvl="0"/>
-            <a:r>
-              <a:rPr/>
-              <a:t>First bullet point</a:t>
-            </a:r>
-          </a:p>
-          <a:p>
-            <a:pPr lvl="0"/>
-            <a:r>
-              <a:rPr/>
-              <a:t>Second bullet point</a:t>
-            </a:r>
-          </a:p>
-          <a:p>
-            <a:pPr lvl="0"/>
-            <a:r>
-              <a:rPr/>
-              <a:t>Third bullet point</a:t>
+            <a:pPr lvl="0" indent="0" marL="0">
+              <a:buNone/>
+            </a:pPr>
+            <a:r>
+              <a:rPr/>
+              <a:t>This is a Penguin.</a:t>
             </a:r>
           </a:p>
         </p:txBody>
@@ -6969,7 +8230,33 @@
             </a:pPr>
             <a:r>
               <a:rPr b="1"/>
-              <a:t>Side-by-side figures</a:t>
+              <a:t>Figure with bullet points</a:t>
+            </a:r>
+          </a:p>
+          <a:p>
+            <a:pPr lvl="0" indent="0" marL="0">
+              <a:buNone/>
+            </a:pPr>
+          </a:p>
+          <a:p>
+            <a:pPr lvl="0"/>
+            <a:r>
+              <a:rPr/>
+              <a:t>First bullet point</a:t>
+            </a:r>
+          </a:p>
+          <a:p>
+            <a:pPr lvl="0"/>
+            <a:r>
+              <a:rPr/>
+              <a:t>Second bullet point</a:t>
+            </a:r>
+          </a:p>
+          <a:p>
+            <a:pPr lvl="0"/>
+            <a:r>
+              <a:rPr/>
+              <a:t>Third bullet point</a:t>
             </a:r>
           </a:p>
         </p:txBody>
@@ -7101,33 +8388,7 @@
             </a:pPr>
             <a:r>
               <a:rPr b="1"/>
-              <a:t>Stacked figures with text</a:t>
-            </a:r>
-          </a:p>
-          <a:p>
-            <a:pPr lvl="0" indent="0" marL="0">
-              <a:buNone/>
-            </a:pPr>
-          </a:p>
-          <a:p>
-            <a:pPr lvl="0"/>
-            <a:r>
-              <a:rPr/>
-              <a:t>First bullet point</a:t>
-            </a:r>
-          </a:p>
-          <a:p>
-            <a:pPr lvl="0"/>
-            <a:r>
-              <a:rPr/>
-              <a:t>Second bullet point</a:t>
-            </a:r>
-          </a:p>
-          <a:p>
-            <a:pPr lvl="0"/>
-            <a:r>
-              <a:rPr/>
-              <a:t>Third bullet point</a:t>
+              <a:t>Side-by-side figures</a:t>
             </a:r>
           </a:p>
         </p:txBody>
@@ -7177,58 +8438,33 @@
             </a:pPr>
             <a:r>
               <a:rPr b="1"/>
-              <a:t>Two-column text slide</a:t>
+              <a:t>Stacked figures with text</a:t>
             </a:r>
           </a:p>
           <a:p>
             <a:pPr lvl="0" indent="0" marL="0">
               <a:buNone/>
             </a:pPr>
-            <a:r>
-              <a:rPr b="1"/>
-              <a:t>Column 1</a:t>
-            </a:r>
-          </a:p>
-          <a:p>
-            <a:pPr lvl="0" indent="0" marL="0">
-              <a:buNone/>
-            </a:pPr>
-            <a:r>
-              <a:rPr/>
-              <a:t>Lorem ipsum dolor sit amet, consectetur adipiscing elit.</a:t>
-            </a:r>
-            <a:br/>
-            <a:r>
-              <a:rPr/>
-              <a:t>Vivamus lacinia odio vitae vestibulum vestibulum.</a:t>
-            </a:r>
-            <a:br/>
-            <a:r>
-              <a:rPr/>
-              <a:t>Cras venenatis euismod malesuada.</a:t>
-            </a:r>
-          </a:p>
-          <a:p>
-            <a:pPr lvl="0" indent="0" marL="0">
-              <a:buNone/>
-            </a:pPr>
-            <a:r>
-              <a:rPr b="1"/>
-              <a:t>Column 2</a:t>
-            </a:r>
-          </a:p>
-          <a:p>
-            <a:pPr lvl="0" indent="0" marL="0">
-              <a:buNone/>
-            </a:pPr>
-            <a:r>
-              <a:rPr/>
-              <a:t>Sed do eiusmod tempor incididunt ut labore et dolore magna aliqua.</a:t>
-            </a:r>
-            <a:br/>
-            <a:r>
-              <a:rPr/>
-              <a:t>Ut enim ad minim veniam, quis nostrud exercitation ullamco laboris.</a:t>
+          </a:p>
+          <a:p>
+            <a:pPr lvl="0"/>
+            <a:r>
+              <a:rPr/>
+              <a:t>First bullet point</a:t>
+            </a:r>
+          </a:p>
+          <a:p>
+            <a:pPr lvl="0"/>
+            <a:r>
+              <a:rPr/>
+              <a:t>Second bullet point</a:t>
+            </a:r>
+          </a:p>
+          <a:p>
+            <a:pPr lvl="0"/>
+            <a:r>
+              <a:rPr/>
+              <a:t>Third bullet point</a:t>
             </a:r>
           </a:p>
         </p:txBody>
@@ -7278,7 +8514,7 @@
             </a:pPr>
             <a:r>
               <a:rPr b="1"/>
-              <a:t>Three-column text slide</a:t>
+              <a:t>Two-column text slide</a:t>
             </a:r>
           </a:p>
           <a:p>
@@ -7303,6 +8539,11 @@
               <a:rPr/>
               <a:t>Vivamus lacinia odio vitae vestibulum vestibulum.</a:t>
             </a:r>
+            <a:br/>
+            <a:r>
+              <a:rPr/>
+              <a:t>Cras venenatis euismod malesuada.</a:t>
+            </a:r>
           </a:p>
           <a:p>
             <a:pPr lvl="0" indent="0" marL="0">
@@ -7325,24 +8566,6 @@
             <a:r>
               <a:rPr/>
               <a:t>Ut enim ad minim veniam, quis nostrud exercitation ullamco laboris.</a:t>
-            </a:r>
-          </a:p>
-          <a:p>
-            <a:pPr lvl="0" indent="0" marL="0">
-              <a:buNone/>
-            </a:pPr>
-            <a:r>
-              <a:rPr b="1"/>
-              <a:t>Column 3</a:t>
-            </a:r>
-          </a:p>
-          <a:p>
-            <a:pPr lvl="0" indent="0" marL="0">
-              <a:buNone/>
-            </a:pPr>
-            <a:r>
-              <a:rPr/>
-              <a:t>Duis aute irure dolor in reprehenderit in voluptate velit esse cillum dolore eu fugiat nulla pariatur.</a:t>
             </a:r>
           </a:p>
         </p:txBody>
@@ -7371,12 +8594,12 @@
       </p:grpSpPr>
       <p:sp>
         <p:nvSpPr>
-          <p:cNvPr id="4" name="Text Placeholder 3"/>
-          <p:cNvSpPr>
-            <a:spLocks noGrp="1"/>
-          </p:cNvSpPr>
-          <p:nvPr>
-            <p:ph idx="2" sz="half" type="body"/>
+          <p:cNvPr id="3" name="Content Placeholder 2"/>
+          <p:cNvSpPr>
+            <a:spLocks noGrp="1"/>
+          </p:cNvSpPr>
+          <p:nvPr>
+            <p:ph idx="1"/>
           </p:nvPr>
         </p:nvSpPr>
         <p:spPr/>
@@ -7392,278 +8615,75 @@
             </a:pPr>
             <a:r>
               <a:rPr b="1"/>
-              <a:t>Simple table</a:t>
-            </a:r>
-          </a:p>
-        </p:txBody>
-      </p:sp>
-      <p:graphicFrame>
-        <p:nvGraphicFramePr>
-          <p:cNvPr id="6" name="Content Placeholder 5"/>
-          <p:cNvGraphicFramePr>
-            <a:graphicFrameLocks noGrp="1"/>
-          </p:cNvGraphicFramePr>
-          <p:nvPr>
-            <p:ph idx="1"/>
-          </p:nvPr>
-        </p:nvGraphicFramePr>
-        <p:xfrm>
-          <a:off x="3568700" y="203200"/>
-          <a:ext cx="5105400" cy="4381500"/>
-        </p:xfrm>
-        <a:graphic>
-          <a:graphicData uri="http://schemas.openxmlformats.org/drawingml/2006/table">
-            <a:tbl>
-              <a:tblPr firstRow="1" bandRow="1">
-                <a:tableStyleId>{5C22544A-7EE6-4342-B048-85BDC9FD1C3A}</a:tableStyleId>
-              </a:tblPr>
-              <a:tblGrid>
-                <a:gridCol w="1701800"/>
-                <a:gridCol w="1701800"/>
-                <a:gridCol w="1701800"/>
-              </a:tblGrid>
-              <a:tr h="0">
-                <a:tc>
-                  <a:txBody>
-                    <a:bodyPr/>
-                    <a:lstStyle/>
-                    <a:p>
-                      <a:pPr lvl="0" indent="0" marL="0">
-                        <a:buNone/>
-                      </a:pPr>
-                      <a:r>
-                        <a:rPr/>
-                        <a:t>Column 1</a:t>
-                      </a:r>
-                    </a:p>
-                  </a:txBody>
-                  <a:tcPr/>
-                </a:tc>
-                <a:tc>
-                  <a:txBody>
-                    <a:bodyPr/>
-                    <a:lstStyle/>
-                    <a:p>
-                      <a:pPr lvl="0" indent="0" marL="0">
-                        <a:buNone/>
-                      </a:pPr>
-                      <a:r>
-                        <a:rPr/>
-                        <a:t>Column 2</a:t>
-                      </a:r>
-                    </a:p>
-                  </a:txBody>
-                  <a:tcPr/>
-                </a:tc>
-                <a:tc>
-                  <a:txBody>
-                    <a:bodyPr/>
-                    <a:lstStyle/>
-                    <a:p>
-                      <a:pPr lvl="0" indent="0" marL="0">
-                        <a:buNone/>
-                      </a:pPr>
-                      <a:r>
-                        <a:rPr/>
-                        <a:t>Column 3</a:t>
-                      </a:r>
-                    </a:p>
-                  </a:txBody>
-                  <a:tcPr/>
-                </a:tc>
-              </a:tr>
-              <a:tr h="0">
-                <a:tc>
-                  <a:txBody>
-                    <a:bodyPr/>
-                    <a:lstStyle/>
-                    <a:p>
-                      <a:pPr lvl="0" indent="0" marL="0">
-                        <a:buNone/>
-                      </a:pPr>
-                      <a:r>
-                        <a:rPr/>
-                        <a:t>Row 1 Cell</a:t>
-                      </a:r>
-                    </a:p>
-                  </a:txBody>
-                </a:tc>
-                <a:tc>
-                  <a:txBody>
-                    <a:bodyPr/>
-                    <a:lstStyle/>
-                    <a:p>
-                      <a:pPr lvl="0" indent="0" marL="0">
-                        <a:buNone/>
-                      </a:pPr>
-                      <a:r>
-                        <a:rPr/>
-                        <a:t>Row 1 Cell</a:t>
-                      </a:r>
-                    </a:p>
-                  </a:txBody>
-                </a:tc>
-                <a:tc>
-                  <a:txBody>
-                    <a:bodyPr/>
-                    <a:lstStyle/>
-                    <a:p>
-                      <a:pPr lvl="0" indent="0" marL="0">
-                        <a:buNone/>
-                      </a:pPr>
-                      <a:r>
-                        <a:rPr/>
-                        <a:t>Row 1 Cell</a:t>
-                      </a:r>
-                    </a:p>
-                  </a:txBody>
-                </a:tc>
-              </a:tr>
-              <a:tr h="0">
-                <a:tc>
-                  <a:txBody>
-                    <a:bodyPr/>
-                    <a:lstStyle/>
-                    <a:p>
-                      <a:pPr lvl="0" indent="0" marL="0">
-                        <a:buNone/>
-                      </a:pPr>
-                      <a:r>
-                        <a:rPr/>
-                        <a:t>Row 2 Cell</a:t>
-                      </a:r>
-                    </a:p>
-                  </a:txBody>
-                </a:tc>
-                <a:tc>
-                  <a:txBody>
-                    <a:bodyPr/>
-                    <a:lstStyle/>
-                    <a:p>
-                      <a:pPr lvl="0" indent="0" marL="0">
-                        <a:buNone/>
-                      </a:pPr>
-                      <a:r>
-                        <a:rPr/>
-                        <a:t>Row 2 Cell</a:t>
-                      </a:r>
-                    </a:p>
-                  </a:txBody>
-                </a:tc>
-                <a:tc>
-                  <a:txBody>
-                    <a:bodyPr/>
-                    <a:lstStyle/>
-                    <a:p>
-                      <a:pPr lvl="0" indent="0" marL="0">
-                        <a:buNone/>
-                      </a:pPr>
-                      <a:r>
-                        <a:rPr/>
-                        <a:t>Row 2 Cell</a:t>
-                      </a:r>
-                    </a:p>
-                  </a:txBody>
-                </a:tc>
-              </a:tr>
-              <a:tr h="0">
-                <a:tc>
-                  <a:txBody>
-                    <a:bodyPr/>
-                    <a:lstStyle/>
-                    <a:p>
-                      <a:pPr lvl="0" indent="0" marL="0">
-                        <a:buNone/>
-                      </a:pPr>
-                      <a:r>
-                        <a:rPr/>
-                        <a:t>Row 3 Cell</a:t>
-                      </a:r>
-                    </a:p>
-                  </a:txBody>
-                </a:tc>
-                <a:tc>
-                  <a:txBody>
-                    <a:bodyPr/>
-                    <a:lstStyle/>
-                    <a:p>
-                      <a:pPr lvl="0" indent="0" marL="0">
-                        <a:buNone/>
-                      </a:pPr>
-                      <a:r>
-                        <a:rPr/>
-                        <a:t>Row 3 Cell</a:t>
-                      </a:r>
-                    </a:p>
-                  </a:txBody>
-                </a:tc>
-                <a:tc>
-                  <a:txBody>
-                    <a:bodyPr/>
-                    <a:lstStyle/>
-                    <a:p>
-                      <a:pPr lvl="0" indent="0" marL="0">
-                        <a:buNone/>
-                      </a:pPr>
-                      <a:r>
-                        <a:rPr/>
-                        <a:t>Row 3 Cell</a:t>
-                      </a:r>
-                    </a:p>
-                  </a:txBody>
-                </a:tc>
-              </a:tr>
-              <a:tr h="0">
-                <a:tc>
-                  <a:txBody>
-                    <a:bodyPr/>
-                    <a:lstStyle/>
-                    <a:p>
-                      <a:pPr lvl="0" indent="0" marL="0">
-                        <a:buNone/>
-                      </a:pPr>
-                      <a:r>
-                        <a:rPr/>
-                        <a:t>Row 4 Cell</a:t>
-                      </a:r>
-                    </a:p>
-                  </a:txBody>
-                </a:tc>
-                <a:tc>
-                  <a:txBody>
-                    <a:bodyPr/>
-                    <a:lstStyle/>
-                    <a:p>
-                      <a:pPr lvl="0" indent="0" marL="0">
-                        <a:buNone/>
-                      </a:pPr>
-                      <a:r>
-                        <a:rPr/>
-                        <a:t>Row 4 Cell</a:t>
-                      </a:r>
-                    </a:p>
-                  </a:txBody>
-                </a:tc>
-                <a:tc>
-                  <a:txBody>
-                    <a:bodyPr/>
-                    <a:lstStyle/>
-                    <a:p>
-                      <a:pPr lvl="0" indent="0" marL="0">
-                        <a:buNone/>
-                      </a:pPr>
-                      <a:r>
-                        <a:rPr/>
-                        <a:t>Row 4 Cell</a:t>
-                      </a:r>
-                    </a:p>
-                  </a:txBody>
-                </a:tc>
-              </a:tr>
-            </a:tbl>
-          </a:graphicData>
-        </a:graphic>
-      </p:graphicFrame>
+              <a:t>Three-column text slide</a:t>
+            </a:r>
+          </a:p>
+          <a:p>
+            <a:pPr lvl="0" indent="0" marL="0">
+              <a:buNone/>
+            </a:pPr>
+            <a:r>
+              <a:rPr b="1"/>
+              <a:t>Column 1</a:t>
+            </a:r>
+          </a:p>
+          <a:p>
+            <a:pPr lvl="0" indent="0" marL="0">
+              <a:buNone/>
+            </a:pPr>
+            <a:r>
+              <a:rPr/>
+              <a:t>Lorem ipsum dolor sit amet, consectetur adipiscing elit.</a:t>
+            </a:r>
+            <a:br/>
+            <a:r>
+              <a:rPr/>
+              <a:t>Vivamus lacinia odio vitae vestibulum vestibulum.</a:t>
+            </a:r>
+          </a:p>
+          <a:p>
+            <a:pPr lvl="0" indent="0" marL="0">
+              <a:buNone/>
+            </a:pPr>
+            <a:r>
+              <a:rPr b="1"/>
+              <a:t>Column 2</a:t>
+            </a:r>
+          </a:p>
+          <a:p>
+            <a:pPr lvl="0" indent="0" marL="0">
+              <a:buNone/>
+            </a:pPr>
+            <a:r>
+              <a:rPr/>
+              <a:t>Sed do eiusmod tempor incididunt ut labore et dolore magna aliqua.</a:t>
+            </a:r>
+            <a:br/>
+            <a:r>
+              <a:rPr/>
+              <a:t>Ut enim ad minim veniam, quis nostrud exercitation ullamco laboris.</a:t>
+            </a:r>
+          </a:p>
+          <a:p>
+            <a:pPr lvl="0" indent="0" marL="0">
+              <a:buNone/>
+            </a:pPr>
+            <a:r>
+              <a:rPr b="1"/>
+              <a:t>Column 3</a:t>
+            </a:r>
+          </a:p>
+          <a:p>
+            <a:pPr lvl="0" indent="0" marL="0">
+              <a:buNone/>
+            </a:pPr>
+            <a:r>
+              <a:rPr/>
+              <a:t>Duis aute irure dolor in reprehenderit in voluptate velit esse cillum dolore eu fugiat nulla pariatur.</a:t>
+            </a:r>
+          </a:p>
+        </p:txBody>
+      </p:sp>
     </p:spTree>
   </p:cSld>
 </p:sld>
@@ -7709,7 +8729,7 @@
             </a:pPr>
             <a:r>
               <a:rPr b="1"/>
-              <a:t>Complex table</a:t>
+              <a:t>Simple table</a:t>
             </a:r>
           </a:p>
         </p:txBody>
@@ -8005,12 +9025,12 @@
       </p:grpSpPr>
       <p:sp>
         <p:nvSpPr>
-          <p:cNvPr id="3" name="Content Placeholder 2"/>
-          <p:cNvSpPr>
-            <a:spLocks noGrp="1"/>
-          </p:cNvSpPr>
-          <p:nvPr>
-            <p:ph idx="1"/>
+          <p:cNvPr id="4" name="Text Placeholder 3"/>
+          <p:cNvSpPr>
+            <a:spLocks noGrp="1"/>
+          </p:cNvSpPr>
+          <p:nvPr>
+            <p:ph idx="2" sz="half" type="body"/>
           </p:nvPr>
         </p:nvSpPr>
         <p:spPr/>
@@ -8026,25 +9046,278 @@
             </a:pPr>
             <a:r>
               <a:rPr b="1"/>
-              <a:t>Task list</a:t>
-            </a:r>
-          </a:p>
-          <a:p>
-            <a:pPr lvl="0"/>
-            <a:r>
-              <a:rPr/>
-              <a:t>☒ Done</a:t>
-            </a:r>
-          </a:p>
-          <a:p>
-            <a:pPr lvl="0"/>
-            <a:r>
-              <a:rPr/>
-              <a:t>☐ To do</a:t>
-            </a:r>
-          </a:p>
-        </p:txBody>
-      </p:sp>
+              <a:t>Complex table</a:t>
+            </a:r>
+          </a:p>
+        </p:txBody>
+      </p:sp>
+      <p:graphicFrame>
+        <p:nvGraphicFramePr>
+          <p:cNvPr id="6" name="Content Placeholder 5"/>
+          <p:cNvGraphicFramePr>
+            <a:graphicFrameLocks noGrp="1"/>
+          </p:cNvGraphicFramePr>
+          <p:nvPr>
+            <p:ph idx="1"/>
+          </p:nvPr>
+        </p:nvGraphicFramePr>
+        <p:xfrm>
+          <a:off x="3568700" y="203200"/>
+          <a:ext cx="5105400" cy="4381500"/>
+        </p:xfrm>
+        <a:graphic>
+          <a:graphicData uri="http://schemas.openxmlformats.org/drawingml/2006/table">
+            <a:tbl>
+              <a:tblPr firstRow="1" bandRow="1">
+                <a:tableStyleId>{5C22544A-7EE6-4342-B048-85BDC9FD1C3A}</a:tableStyleId>
+              </a:tblPr>
+              <a:tblGrid>
+                <a:gridCol w="1701800"/>
+                <a:gridCol w="1701800"/>
+                <a:gridCol w="1701800"/>
+              </a:tblGrid>
+              <a:tr h="0">
+                <a:tc>
+                  <a:txBody>
+                    <a:bodyPr/>
+                    <a:lstStyle/>
+                    <a:p>
+                      <a:pPr lvl="0" indent="0" marL="0">
+                        <a:buNone/>
+                      </a:pPr>
+                      <a:r>
+                        <a:rPr/>
+                        <a:t>Column 1</a:t>
+                      </a:r>
+                    </a:p>
+                  </a:txBody>
+                  <a:tcPr/>
+                </a:tc>
+                <a:tc>
+                  <a:txBody>
+                    <a:bodyPr/>
+                    <a:lstStyle/>
+                    <a:p>
+                      <a:pPr lvl="0" indent="0" marL="0">
+                        <a:buNone/>
+                      </a:pPr>
+                      <a:r>
+                        <a:rPr/>
+                        <a:t>Column 2</a:t>
+                      </a:r>
+                    </a:p>
+                  </a:txBody>
+                  <a:tcPr/>
+                </a:tc>
+                <a:tc>
+                  <a:txBody>
+                    <a:bodyPr/>
+                    <a:lstStyle/>
+                    <a:p>
+                      <a:pPr lvl="0" indent="0" marL="0">
+                        <a:buNone/>
+                      </a:pPr>
+                      <a:r>
+                        <a:rPr/>
+                        <a:t>Column 3</a:t>
+                      </a:r>
+                    </a:p>
+                  </a:txBody>
+                  <a:tcPr/>
+                </a:tc>
+              </a:tr>
+              <a:tr h="0">
+                <a:tc>
+                  <a:txBody>
+                    <a:bodyPr/>
+                    <a:lstStyle/>
+                    <a:p>
+                      <a:pPr lvl="0" indent="0" marL="0">
+                        <a:buNone/>
+                      </a:pPr>
+                      <a:r>
+                        <a:rPr/>
+                        <a:t>Row 1 Cell</a:t>
+                      </a:r>
+                    </a:p>
+                  </a:txBody>
+                </a:tc>
+                <a:tc>
+                  <a:txBody>
+                    <a:bodyPr/>
+                    <a:lstStyle/>
+                    <a:p>
+                      <a:pPr lvl="0" indent="0" marL="0">
+                        <a:buNone/>
+                      </a:pPr>
+                      <a:r>
+                        <a:rPr/>
+                        <a:t>Row 1 Cell</a:t>
+                      </a:r>
+                    </a:p>
+                  </a:txBody>
+                </a:tc>
+                <a:tc>
+                  <a:txBody>
+                    <a:bodyPr/>
+                    <a:lstStyle/>
+                    <a:p>
+                      <a:pPr lvl="0" indent="0" marL="0">
+                        <a:buNone/>
+                      </a:pPr>
+                      <a:r>
+                        <a:rPr/>
+                        <a:t>Row 1 Cell</a:t>
+                      </a:r>
+                    </a:p>
+                  </a:txBody>
+                </a:tc>
+              </a:tr>
+              <a:tr h="0">
+                <a:tc>
+                  <a:txBody>
+                    <a:bodyPr/>
+                    <a:lstStyle/>
+                    <a:p>
+                      <a:pPr lvl="0" indent="0" marL="0">
+                        <a:buNone/>
+                      </a:pPr>
+                      <a:r>
+                        <a:rPr/>
+                        <a:t>Row 2 Cell</a:t>
+                      </a:r>
+                    </a:p>
+                  </a:txBody>
+                </a:tc>
+                <a:tc>
+                  <a:txBody>
+                    <a:bodyPr/>
+                    <a:lstStyle/>
+                    <a:p>
+                      <a:pPr lvl="0" indent="0" marL="0">
+                        <a:buNone/>
+                      </a:pPr>
+                      <a:r>
+                        <a:rPr/>
+                        <a:t>Row 2 Cell</a:t>
+                      </a:r>
+                    </a:p>
+                  </a:txBody>
+                </a:tc>
+                <a:tc>
+                  <a:txBody>
+                    <a:bodyPr/>
+                    <a:lstStyle/>
+                    <a:p>
+                      <a:pPr lvl="0" indent="0" marL="0">
+                        <a:buNone/>
+                      </a:pPr>
+                      <a:r>
+                        <a:rPr/>
+                        <a:t>Row 2 Cell</a:t>
+                      </a:r>
+                    </a:p>
+                  </a:txBody>
+                </a:tc>
+              </a:tr>
+              <a:tr h="0">
+                <a:tc>
+                  <a:txBody>
+                    <a:bodyPr/>
+                    <a:lstStyle/>
+                    <a:p>
+                      <a:pPr lvl="0" indent="0" marL="0">
+                        <a:buNone/>
+                      </a:pPr>
+                      <a:r>
+                        <a:rPr/>
+                        <a:t>Row 3 Cell</a:t>
+                      </a:r>
+                    </a:p>
+                  </a:txBody>
+                </a:tc>
+                <a:tc>
+                  <a:txBody>
+                    <a:bodyPr/>
+                    <a:lstStyle/>
+                    <a:p>
+                      <a:pPr lvl="0" indent="0" marL="0">
+                        <a:buNone/>
+                      </a:pPr>
+                      <a:r>
+                        <a:rPr/>
+                        <a:t>Row 3 Cell</a:t>
+                      </a:r>
+                    </a:p>
+                  </a:txBody>
+                </a:tc>
+                <a:tc>
+                  <a:txBody>
+                    <a:bodyPr/>
+                    <a:lstStyle/>
+                    <a:p>
+                      <a:pPr lvl="0" indent="0" marL="0">
+                        <a:buNone/>
+                      </a:pPr>
+                      <a:r>
+                        <a:rPr/>
+                        <a:t>Row 3 Cell</a:t>
+                      </a:r>
+                    </a:p>
+                  </a:txBody>
+                </a:tc>
+              </a:tr>
+              <a:tr h="0">
+                <a:tc>
+                  <a:txBody>
+                    <a:bodyPr/>
+                    <a:lstStyle/>
+                    <a:p>
+                      <a:pPr lvl="0" indent="0" marL="0">
+                        <a:buNone/>
+                      </a:pPr>
+                      <a:r>
+                        <a:rPr/>
+                        <a:t>Row 4 Cell</a:t>
+                      </a:r>
+                    </a:p>
+                  </a:txBody>
+                </a:tc>
+                <a:tc>
+                  <a:txBody>
+                    <a:bodyPr/>
+                    <a:lstStyle/>
+                    <a:p>
+                      <a:pPr lvl="0" indent="0" marL="0">
+                        <a:buNone/>
+                      </a:pPr>
+                      <a:r>
+                        <a:rPr/>
+                        <a:t>Row 4 Cell</a:t>
+                      </a:r>
+                    </a:p>
+                  </a:txBody>
+                </a:tc>
+                <a:tc>
+                  <a:txBody>
+                    <a:bodyPr/>
+                    <a:lstStyle/>
+                    <a:p>
+                      <a:pPr lvl="0" indent="0" marL="0">
+                        <a:buNone/>
+                      </a:pPr>
+                      <a:r>
+                        <a:rPr/>
+                        <a:t>Row 4 Cell</a:t>
+                      </a:r>
+                    </a:p>
+                  </a:txBody>
+                </a:tc>
+              </a:tr>
+            </a:tbl>
+          </a:graphicData>
+        </a:graphic>
+      </p:graphicFrame>
     </p:spTree>
   </p:cSld>
 </p:sld>
@@ -8090,16 +9363,21 @@
             </a:pPr>
             <a:r>
               <a:rPr b="1"/>
-              <a:t>Embedding videos</a:t>
-            </a:r>
-          </a:p>
-          <a:p>
-            <a:pPr lvl="0" indent="0" marL="0">
-              <a:buNone/>
-            </a:pPr>
-            <a:r>
-              <a:rPr/>
-              <a:t> </a:t>
+              <a:t>Task list</a:t>
+            </a:r>
+          </a:p>
+          <a:p>
+            <a:pPr lvl="0"/>
+            <a:r>
+              <a:rPr/>
+              <a:t>☒ Done</a:t>
+            </a:r>
+          </a:p>
+          <a:p>
+            <a:pPr lvl="0"/>
+            <a:r>
+              <a:rPr/>
+              <a:t>☐ To do</a:t>
             </a:r>
           </a:p>
         </p:txBody>
@@ -8110,6 +9388,65 @@
 </file>
 
 <file path=ppt/slides/slide47.xml><?xml version="1.0" encoding="utf-8"?>
+<p:sld xmlns:a="http://schemas.openxmlformats.org/drawingml/2006/main" xmlns:r="http://schemas.openxmlformats.org/officeDocument/2006/relationships" xmlns:p="http://schemas.openxmlformats.org/presentationml/2006/main">
+  <p:cSld>
+    <p:spTree>
+      <p:nvGrpSpPr>
+        <p:cNvPr id="1" name=""/>
+        <p:cNvGrpSpPr/>
+        <p:nvPr/>
+      </p:nvGrpSpPr>
+      <p:grpSpPr>
+        <a:xfrm>
+          <a:off x="0" y="0"/>
+          <a:ext cx="0" cy="0"/>
+          <a:chOff x="0" y="0"/>
+          <a:chExt cx="0" cy="0"/>
+        </a:xfrm>
+      </p:grpSpPr>
+      <p:sp>
+        <p:nvSpPr>
+          <p:cNvPr id="3" name="Content Placeholder 2"/>
+          <p:cNvSpPr>
+            <a:spLocks noGrp="1"/>
+          </p:cNvSpPr>
+          <p:nvPr>
+            <p:ph idx="1"/>
+          </p:nvPr>
+        </p:nvSpPr>
+        <p:spPr/>
+        <p:txBody>
+          <a:bodyPr/>
+          <a:lstStyle/>
+          <a:p>
+            <a:pPr lvl="0" indent="0" marL="0">
+              <a:spcBef>
+                <a:spcPts val="3000"/>
+              </a:spcBef>
+              <a:buNone/>
+            </a:pPr>
+            <a:r>
+              <a:rPr b="1"/>
+              <a:t>Embedding videos</a:t>
+            </a:r>
+          </a:p>
+          <a:p>
+            <a:pPr lvl="0" indent="0" marL="0">
+              <a:buNone/>
+            </a:pPr>
+            <a:r>
+              <a:rPr/>
+              <a:t> </a:t>
+            </a:r>
+          </a:p>
+        </p:txBody>
+      </p:sp>
+    </p:spTree>
+  </p:cSld>
+</p:sld>
+</file>
+
+<file path=ppt/slides/slide48.xml><?xml version="1.0" encoding="utf-8"?>
 <p:sld xmlns:a="http://schemas.openxmlformats.org/drawingml/2006/main" xmlns:r="http://schemas.openxmlformats.org/officeDocument/2006/relationships" xmlns:p="http://schemas.openxmlformats.org/presentationml/2006/main">
   <p:cSld>
     <p:spTree>
@@ -8375,164 +9712,6 @@
 </p:sld>
 </file>
 
-<file path=ppt/slides/slide48.xml><?xml version="1.0" encoding="utf-8"?>
-<p:sld xmlns:a="http://schemas.openxmlformats.org/drawingml/2006/main" xmlns:r="http://schemas.openxmlformats.org/officeDocument/2006/relationships" xmlns:p="http://schemas.openxmlformats.org/presentationml/2006/main">
-  <p:cSld>
-    <p:spTree>
-      <p:nvGrpSpPr>
-        <p:cNvPr id="1" name=""/>
-        <p:cNvGrpSpPr/>
-        <p:nvPr/>
-      </p:nvGrpSpPr>
-      <p:grpSpPr>
-        <a:xfrm>
-          <a:off x="0" y="0"/>
-          <a:ext cx="0" cy="0"/>
-          <a:chOff x="0" y="0"/>
-          <a:chExt cx="0" cy="0"/>
-        </a:xfrm>
-      </p:grpSpPr>
-      <p:sp>
-        <p:nvSpPr>
-          <p:cNvPr id="3" name="Content Placeholder 2"/>
-          <p:cNvSpPr>
-            <a:spLocks noGrp="1"/>
-          </p:cNvSpPr>
-          <p:nvPr>
-            <p:ph idx="1"/>
-          </p:nvPr>
-        </p:nvSpPr>
-        <p:spPr/>
-        <p:txBody>
-          <a:bodyPr/>
-          <a:lstStyle/>
-          <a:p>
-            <a:pPr lvl="0" indent="0" marL="0">
-              <a:spcBef>
-                <a:spcPts val="3000"/>
-              </a:spcBef>
-              <a:buNone/>
-            </a:pPr>
-            <a:r>
-              <a:rPr b="1"/>
-              <a:t>Attribution and license details</a:t>
-            </a:r>
-          </a:p>
-          <a:p>
-            <a:pPr lvl="0"/>
-            <a:r>
-              <a:rPr/>
-              <a:t>This slide should contain information about the license and attribution details of this current set of slides.</a:t>
-            </a:r>
-          </a:p>
-          <a:p>
-            <a:pPr lvl="0"/>
-            <a:r>
-              <a:rPr/>
-              <a:t>The default for the created materials is </a:t>
-            </a:r>
-            <a:r>
-              <a:rPr>
-                <a:hlinkClick r:id="rId2"/>
-              </a:rPr>
-              <a:t>CC-BY-SA 4.0</a:t>
-            </a:r>
-          </a:p>
-          <a:p>
-            <a:pPr lvl="1"/>
-            <a:r>
-              <a:rPr/>
-              <a:t>= Creative Commons license that allows others to </a:t>
-            </a:r>
-            <a:r>
-              <a:rPr b="1"/>
-              <a:t>share, adapt, and build upon</a:t>
-            </a:r>
-            <a:r>
-              <a:rPr/>
-              <a:t> the original work</a:t>
-            </a:r>
-          </a:p>
-          <a:p>
-            <a:pPr lvl="1"/>
-            <a:r>
-              <a:rPr b="1"/>
-              <a:t>only</a:t>
-            </a:r>
-            <a:r>
-              <a:rPr/>
-              <a:t> if they attribute the creator and also share their new work under the </a:t>
-            </a:r>
-            <a:r>
-              <a:rPr b="1"/>
-              <a:t>same terms</a:t>
-            </a:r>
-          </a:p>
-          <a:p>
-            <a:pPr lvl="1"/>
-            <a:r>
-              <a:rPr/>
-              <a:t>allows for both </a:t>
-            </a:r>
-            <a:r>
-              <a:rPr b="1"/>
-              <a:t>commercial and non-commercial</a:t>
-            </a:r>
-            <a:r>
-              <a:rPr/>
-              <a:t> use of the licensed material</a:t>
-            </a:r>
-          </a:p>
-          <a:p>
-            <a:pPr lvl="0"/>
-            <a:r>
-              <a:rPr/>
-              <a:t>Components of attributions:</a:t>
-            </a:r>
-          </a:p>
-          <a:p>
-            <a:pPr lvl="1"/>
-            <a:r>
-              <a:rPr>
-                <a:latin typeface="Courier"/>
-              </a:rPr>
-              <a:t>Title</a:t>
-            </a:r>
-          </a:p>
-          <a:p>
-            <a:pPr lvl="1"/>
-            <a:r>
-              <a:rPr>
-                <a:latin typeface="Courier"/>
-              </a:rPr>
-              <a:t>Author</a:t>
-            </a:r>
-          </a:p>
-          <a:p>
-            <a:pPr lvl="1"/>
-            <a:r>
-              <a:rPr>
-                <a:latin typeface="Courier"/>
-              </a:rPr>
-              <a:t>Source</a:t>
-            </a:r>
-          </a:p>
-          <a:p>
-            <a:pPr lvl="1"/>
-            <a:r>
-              <a:rPr>
-                <a:latin typeface="Courier"/>
-              </a:rPr>
-              <a:t>License</a:t>
-            </a:r>
-          </a:p>
-        </p:txBody>
-      </p:sp>
-    </p:spTree>
-  </p:cSld>
-</p:sld>
-</file>
-
 <file path=ppt/slides/slide49.xml><?xml version="1.0" encoding="utf-8"?>
 <p:sld xmlns:a="http://schemas.openxmlformats.org/drawingml/2006/main" xmlns:r="http://schemas.openxmlformats.org/officeDocument/2006/relationships" xmlns:p="http://schemas.openxmlformats.org/presentationml/2006/main">
   <p:cSld>
@@ -8573,36 +9752,115 @@
             </a:pPr>
             <a:r>
               <a:rPr b="1"/>
-              <a:t>Example attribution (for previous slide)</a:t>
-            </a:r>
-          </a:p>
-          <a:p>
-            <a:pPr lvl="0" indent="0" marL="0">
-              <a:buNone/>
-            </a:pPr>
-            <a:r>
-              <a:rPr/>
-              <a:t>“</a:t>
+              <a:t>Attribution and license details</a:t>
+            </a:r>
+          </a:p>
+          <a:p>
+            <a:pPr lvl="0"/>
+            <a:r>
+              <a:rPr/>
+              <a:t>This slide should contain information about the license and attribution details of this current set of slides.</a:t>
+            </a:r>
+          </a:p>
+          <a:p>
+            <a:pPr lvl="0"/>
+            <a:r>
+              <a:rPr/>
+              <a:t>The default for the created materials is </a:t>
             </a:r>
             <a:r>
               <a:rPr>
                 <a:hlinkClick r:id="rId2"/>
               </a:rPr>
-              <a:t>Tutorial template for student track</a:t>
-            </a:r>
-            <a:r>
-              <a:rPr/>
-              <a:t>” by Sarah von Grebmer is licensed under </a:t>
-            </a:r>
+              <a:t>CC-BY-SA 4.0</a:t>
+            </a:r>
+          </a:p>
+          <a:p>
+            <a:pPr lvl="1"/>
+            <a:r>
+              <a:rPr/>
+              <a:t>= Creative Commons license that allows others to </a:t>
+            </a:r>
+            <a:r>
+              <a:rPr b="1"/>
+              <a:t>share, adapt, and build upon</a:t>
+            </a:r>
+            <a:r>
+              <a:rPr/>
+              <a:t> the original work</a:t>
+            </a:r>
+          </a:p>
+          <a:p>
+            <a:pPr lvl="1"/>
+            <a:r>
+              <a:rPr b="1"/>
+              <a:t>only</a:t>
+            </a:r>
+            <a:r>
+              <a:rPr/>
+              <a:t> if they attribute the creator and also share their new work under the </a:t>
+            </a:r>
+            <a:r>
+              <a:rPr b="1"/>
+              <a:t>same terms</a:t>
+            </a:r>
+          </a:p>
+          <a:p>
+            <a:pPr lvl="1"/>
+            <a:r>
+              <a:rPr/>
+              <a:t>allows for both </a:t>
+            </a:r>
+            <a:r>
+              <a:rPr b="1"/>
+              <a:t>commercial and non-commercial</a:t>
+            </a:r>
+            <a:r>
+              <a:rPr/>
+              <a:t> use of the licensed material</a:t>
+            </a:r>
+          </a:p>
+          <a:p>
+            <a:pPr lvl="0"/>
+            <a:r>
+              <a:rPr/>
+              <a:t>Components of attributions:</a:t>
+            </a:r>
+          </a:p>
+          <a:p>
+            <a:pPr lvl="1"/>
             <a:r>
               <a:rPr>
-                <a:hlinkClick r:id="rId3"/>
+                <a:latin typeface="Courier"/>
               </a:rPr>
-              <a:t>CC-BY-SA 4.0</a:t>
-            </a:r>
-            <a:r>
-              <a:rPr/>
-              <a:t>.</a:t>
+              <a:t>Title</a:t>
+            </a:r>
+          </a:p>
+          <a:p>
+            <a:pPr lvl="1"/>
+            <a:r>
+              <a:rPr>
+                <a:latin typeface="Courier"/>
+              </a:rPr>
+              <a:t>Author</a:t>
+            </a:r>
+          </a:p>
+          <a:p>
+            <a:pPr lvl="1"/>
+            <a:r>
+              <a:rPr>
+                <a:latin typeface="Courier"/>
+              </a:rPr>
+              <a:t>Source</a:t>
+            </a:r>
+          </a:p>
+          <a:p>
+            <a:pPr lvl="1"/>
+            <a:r>
+              <a:rPr>
+                <a:latin typeface="Courier"/>
+              </a:rPr>
+              <a:t>License</a:t>
             </a:r>
           </a:p>
         </p:txBody>
@@ -8670,7 +9928,86 @@
             <a:pPr lvl="0"/>
             <a:r>
               <a:rPr/>
-              <a:t>Use free survey software such as or other survey software (particify, formR) to establish the following questions (shown on separate slides):</a:t>
+              <a:t>Use free survey software such as or other survey software (particify, formR) to establish the following questions (shown on separate slides).</a:t>
+            </a:r>
+          </a:p>
+        </p:txBody>
+      </p:sp>
+    </p:spTree>
+  </p:cSld>
+</p:sld>
+</file>
+
+<file path=ppt/slides/slide50.xml><?xml version="1.0" encoding="utf-8"?>
+<p:sld xmlns:a="http://schemas.openxmlformats.org/drawingml/2006/main" xmlns:r="http://schemas.openxmlformats.org/officeDocument/2006/relationships" xmlns:p="http://schemas.openxmlformats.org/presentationml/2006/main">
+  <p:cSld>
+    <p:spTree>
+      <p:nvGrpSpPr>
+        <p:cNvPr id="1" name=""/>
+        <p:cNvGrpSpPr/>
+        <p:nvPr/>
+      </p:nvGrpSpPr>
+      <p:grpSpPr>
+        <a:xfrm>
+          <a:off x="0" y="0"/>
+          <a:ext cx="0" cy="0"/>
+          <a:chOff x="0" y="0"/>
+          <a:chExt cx="0" cy="0"/>
+        </a:xfrm>
+      </p:grpSpPr>
+      <p:sp>
+        <p:nvSpPr>
+          <p:cNvPr id="3" name="Content Placeholder 2"/>
+          <p:cNvSpPr>
+            <a:spLocks noGrp="1"/>
+          </p:cNvSpPr>
+          <p:nvPr>
+            <p:ph idx="1"/>
+          </p:nvPr>
+        </p:nvSpPr>
+        <p:spPr/>
+        <p:txBody>
+          <a:bodyPr/>
+          <a:lstStyle/>
+          <a:p>
+            <a:pPr lvl="0" indent="0" marL="0">
+              <a:spcBef>
+                <a:spcPts val="3000"/>
+              </a:spcBef>
+              <a:buNone/>
+            </a:pPr>
+            <a:r>
+              <a:rPr b="1"/>
+              <a:t>Example attribution (for previous slide)</a:t>
+            </a:r>
+          </a:p>
+          <a:p>
+            <a:pPr lvl="0" indent="0" marL="0">
+              <a:buNone/>
+            </a:pPr>
+            <a:r>
+              <a:rPr/>
+              <a:t>“</a:t>
+            </a:r>
+            <a:r>
+              <a:rPr>
+                <a:hlinkClick r:id="rId2"/>
+              </a:rPr>
+              <a:t>Tutorial template for student track</a:t>
+            </a:r>
+            <a:r>
+              <a:rPr/>
+              <a:t>” by Sarah von Grebmer is licensed under </a:t>
+            </a:r>
+            <a:r>
+              <a:rPr>
+                <a:hlinkClick r:id="rId3"/>
+              </a:rPr>
+              <a:t>CC-BY-SA 4.0</a:t>
+            </a:r>
+            <a:r>
+              <a:rPr/>
+              <a:t>.</a:t>
             </a:r>
           </a:p>
         </p:txBody>

</xml_diff>

<commit_message>
Standardise Quarto speaker notes and instructor notes
</commit_message>
<xml_diff>
--- a/_site/materials/OS-template-module/OS-template-slides.pptx
+++ b/_site/materials/OS-template-module/OS-template-slides.pptx
@@ -5,7 +5,7 @@
     <p:sldMasterId id="2147483648" r:id="rId1"/>
   </p:sldMasterIdLst>
   <p:notesMasterIdLst>
-    <p:notesMasterId r:id="rId52"/>
+    <p:notesMasterId r:id="rId53"/>
   </p:notesMasterIdLst>
   <p:sldIdLst>
     <p:sldId id="256" r:id="rId2"/>
@@ -58,6 +58,7 @@
     <p:sldId id="303" r:id="rId49"/>
     <p:sldId id="304" r:id="rId50"/>
     <p:sldId id="305" r:id="rId51"/>
+    <p:sldId id="306" r:id="rId52"/>
   </p:sldIdLst>
   <p:sldSz cx="9144000" cy="5143500" type="screen16x9"/>
   <p:notesSz cx="6858000" cy="9144000"/>
@@ -572,12 +573,12 @@
               <a:buNone/>
             </a:pPr>
             <a:r>
-              <a:rPr i="1"/>
+              <a:rPr b="1"/>
               <a:t>Speaker Notes</a:t>
             </a:r>
             <a:r>
               <a:rPr/>
-              <a:t> These are the </a:t>
+              <a:t>: These are the </a:t>
             </a:r>
             <a:r>
               <a:rPr b="1"/>
@@ -598,12 +599,12 @@
               <a:buNone/>
             </a:pPr>
             <a:r>
-              <a:rPr i="1"/>
+              <a:rPr b="1"/>
               <a:t>Instructor Notes</a:t>
             </a:r>
             <a:r>
               <a:rPr/>
-              <a:t> There are also </a:t>
+              <a:t>: There are also </a:t>
             </a:r>
             <a:r>
               <a:rPr b="1"/>
@@ -612,6 +613,24 @@
             <a:r>
               <a:rPr/>
               <a:t>. For some slides, there will be pedagogical tips, suggestons for acitivities and troubleshooting tips for issues your audience might run into. You can find these notes underneath the speaker notes.</a:t>
+            </a:r>
+          </a:p>
+          <a:p>
+            <a:pPr lvl="0" indent="0" marL="0">
+              <a:buNone/>
+            </a:pPr>
+          </a:p>
+          <a:p>
+            <a:pPr lvl="0" indent="0" marL="0">
+              <a:buNone/>
+            </a:pPr>
+            <a:r>
+              <a:rPr b="1"/>
+              <a:t>Acessibility Tips</a:t>
+            </a:r>
+            <a:r>
+              <a:rPr/>
+              <a:t>: where applicable, this is a space to add any tips you may have to facilitate the accessibility of your slides and activities.</a:t>
             </a:r>
           </a:p>
         </p:txBody>
@@ -692,12 +711,12 @@
               <a:buNone/>
             </a:pPr>
             <a:r>
-              <a:rPr i="1"/>
-              <a:t>Speaker notes</a:t>
-            </a:r>
-            <a:r>
-              <a:rPr/>
-              <a:t> For a 90-minute lesson, the instructor should try to “lecture” for only 20 minutes, students should work in groups/pairs/on their own for at least 55 minutes of the lesson (+ a 15 minute break).</a:t>
+              <a:rPr b="1"/>
+              <a:t>Speaker Notes</a:t>
+            </a:r>
+            <a:r>
+              <a:rPr/>
+              <a:t>: Base yourself on conceptual change theory and examine exisiting concepts in relation to some key terms. Re-examine formation of new concepts at the end of the lesson.</a:t>
             </a:r>
           </a:p>
         </p:txBody>
@@ -778,12 +797,12 @@
               <a:buNone/>
             </a:pPr>
             <a:r>
-              <a:rPr i="1"/>
-              <a:t>Speaker Notes</a:t>
-            </a:r>
-            <a:r>
-              <a:rPr/>
-              <a:t> Script for the presentation here.</a:t>
+              <a:rPr b="1"/>
+              <a:t>Speaker notes</a:t>
+            </a:r>
+            <a:r>
+              <a:rPr/>
+              <a:t>: For a 90-minute lesson, the instructor should try to “lecture” for only 20 minutes, students should work in groups/pairs/on their own for at least 55 minutes of the lesson (+ a 15 minute break).</a:t>
             </a:r>
           </a:p>
         </p:txBody>
@@ -864,12 +883,12 @@
               <a:buNone/>
             </a:pPr>
             <a:r>
-              <a:rPr i="1"/>
+              <a:rPr b="1"/>
               <a:t>Speaker Notes</a:t>
             </a:r>
             <a:r>
               <a:rPr/>
-              <a:t> Script for the presentation here.</a:t>
+              <a:t>: Script for the presentation here.</a:t>
             </a:r>
           </a:p>
         </p:txBody>
@@ -950,12 +969,12 @@
               <a:buNone/>
             </a:pPr>
             <a:r>
-              <a:rPr i="1"/>
+              <a:rPr b="1"/>
               <a:t>Speaker Notes</a:t>
             </a:r>
             <a:r>
               <a:rPr/>
-              <a:t> Script for the presentation here.</a:t>
+              <a:t>: Script for the presentation here.</a:t>
             </a:r>
           </a:p>
         </p:txBody>
@@ -1036,12 +1055,12 @@
               <a:buNone/>
             </a:pPr>
             <a:r>
-              <a:rPr i="1"/>
+              <a:rPr b="1"/>
               <a:t>Speaker Notes</a:t>
             </a:r>
             <a:r>
               <a:rPr/>
-              <a:t> Script for the presentation here.</a:t>
+              <a:t>: Script for the presentation here.</a:t>
             </a:r>
           </a:p>
         </p:txBody>
@@ -1063,7 +1082,7 @@
           <a:p>
             <a:fld id="{18BDFEC3-8487-43E8-A154-7C12CBC1FFF2}" type="slidenum">
               <a:rPr lang="en-US"/>
-              <a:t>21</a:t>
+              <a:t>18</a:t>
             </a:fld>
             <a:endParaRPr lang="en-US"/>
           </a:p>
@@ -1122,12 +1141,12 @@
               <a:buNone/>
             </a:pPr>
             <a:r>
-              <a:rPr i="1"/>
-              <a:t>Speaker notes</a:t>
-            </a:r>
-            <a:r>
-              <a:rPr/>
-              <a:t> For students who advance faster: Prepare extra exercises.</a:t>
+              <a:rPr b="1"/>
+              <a:t>Speaker Notes</a:t>
+            </a:r>
+            <a:r>
+              <a:rPr/>
+              <a:t>: Script for the presentation here.</a:t>
             </a:r>
           </a:p>
         </p:txBody>
@@ -1208,12 +1227,12 @@
               <a:buNone/>
             </a:pPr>
             <a:r>
-              <a:rPr i="1"/>
+              <a:rPr b="1"/>
               <a:t>Speaker Notes</a:t>
             </a:r>
             <a:r>
               <a:rPr/>
-              <a:t> Script for the presentation here.</a:t>
+              <a:t>: Script for the presentation here.</a:t>
             </a:r>
           </a:p>
         </p:txBody>
@@ -1294,12 +1313,12 @@
               <a:buNone/>
             </a:pPr>
             <a:r>
-              <a:rPr i="1"/>
+              <a:rPr b="1"/>
               <a:t>Speaker Notes</a:t>
             </a:r>
             <a:r>
               <a:rPr/>
-              <a:t> Script for the presentation here.</a:t>
+              <a:t>: Script for the presentation here.</a:t>
             </a:r>
           </a:p>
         </p:txBody>
@@ -1380,12 +1399,12 @@
               <a:buNone/>
             </a:pPr>
             <a:r>
-              <a:rPr i="1"/>
+              <a:rPr b="1"/>
               <a:t>Speaker Notes</a:t>
             </a:r>
             <a:r>
               <a:rPr/>
-              <a:t> Script for the presentation here.</a:t>
+              <a:t>: Script for the presentation here.</a:t>
             </a:r>
           </a:p>
         </p:txBody>
@@ -1466,12 +1485,12 @@
               <a:buNone/>
             </a:pPr>
             <a:r>
-              <a:rPr i="1"/>
+              <a:rPr b="1"/>
               <a:t>Speaker Notes</a:t>
             </a:r>
             <a:r>
               <a:rPr/>
-              <a:t> Script for the presentation here.</a:t>
+              <a:t>: Script for the presentation here.</a:t>
             </a:r>
           </a:p>
         </p:txBody>
@@ -1552,12 +1571,12 @@
               <a:buNone/>
             </a:pPr>
             <a:r>
-              <a:rPr i="1"/>
+              <a:rPr b="1"/>
               <a:t>Speaker Notes</a:t>
             </a:r>
             <a:r>
               <a:rPr/>
-              <a:t> Script for the presentation here.</a:t>
+              <a:t>: Script for the presentation here.</a:t>
             </a:r>
           </a:p>
         </p:txBody>
@@ -1638,12 +1657,12 @@
               <a:buNone/>
             </a:pPr>
             <a:r>
-              <a:rPr i="1"/>
+              <a:rPr b="1"/>
               <a:t>Speaker Notes</a:t>
             </a:r>
             <a:r>
               <a:rPr/>
-              <a:t> Script for the presentation here.</a:t>
+              <a:t>: Script for the presentation here.</a:t>
             </a:r>
           </a:p>
         </p:txBody>
@@ -1665,7 +1684,7 @@
           <a:p>
             <a:fld id="{18BDFEC3-8487-43E8-A154-7C12CBC1FFF2}" type="slidenum">
               <a:rPr lang="en-US"/>
-              <a:t>30</a:t>
+              <a:t>27</a:t>
             </a:fld>
             <a:endParaRPr lang="en-US"/>
           </a:p>
@@ -1724,12 +1743,12 @@
               <a:buNone/>
             </a:pPr>
             <a:r>
-              <a:rPr i="1"/>
+              <a:rPr b="1"/>
               <a:t>Speaker Notes</a:t>
             </a:r>
             <a:r>
               <a:rPr/>
-              <a:t> Script for the presentation here.</a:t>
+              <a:t>: Script for the presentation here.</a:t>
             </a:r>
           </a:p>
         </p:txBody>
@@ -1752,6 +1771,92 @@
             <a:fld id="{18BDFEC3-8487-43E8-A154-7C12CBC1FFF2}" type="slidenum">
               <a:rPr lang="en-US"/>
               <a:t>31</a:t>
+            </a:fld>
+            <a:endParaRPr lang="en-US"/>
+          </a:p>
+        </p:txBody>
+      </p:sp>
+    </p:spTree>
+  </p:cSld>
+</p:notes>
+</file>
+
+<file path=ppt/notesSlides/notesSlide22.xml><?xml version="1.0" encoding="utf-8"?>
+<p:notes xmlns:a="http://schemas.openxmlformats.org/drawingml/2006/main" xmlns:r="http://schemas.openxmlformats.org/officeDocument/2006/relationships" xmlns:p="http://schemas.openxmlformats.org/presentationml/2006/main">
+  <p:cSld>
+    <p:spTree>
+      <p:nvGrpSpPr>
+        <p:cNvPr id="1" name=""/>
+        <p:cNvGrpSpPr/>
+        <p:nvPr/>
+      </p:nvGrpSpPr>
+      <p:grpSpPr>
+        <a:xfrm>
+          <a:off x="0" y="0"/>
+          <a:ext cx="0" cy="0"/>
+          <a:chOff x="0" y="0"/>
+          <a:chExt cx="0" cy="0"/>
+        </a:xfrm>
+      </p:grpSpPr>
+      <p:sp>
+        <p:nvSpPr>
+          <p:cNvPr id="2" name="Slide Image Placeholder 1"/>
+          <p:cNvSpPr>
+            <a:spLocks noGrp="1" noRot="1" noChangeAspect="1"/>
+          </p:cNvSpPr>
+          <p:nvPr>
+            <p:ph type="sldImg"/>
+          </p:nvPr>
+        </p:nvSpPr>
+        <p:spPr/>
+      </p:sp>
+      <p:sp>
+        <p:nvSpPr>
+          <p:cNvPr id="3" name="Notes Placeholder 2"/>
+          <p:cNvSpPr>
+            <a:spLocks noGrp="1"/>
+          </p:cNvSpPr>
+          <p:nvPr>
+            <p:ph type="body" idx="1"/>
+          </p:nvPr>
+        </p:nvSpPr>
+        <p:spPr/>
+        <p:txBody>
+          <a:bodyPr/>
+          <a:lstStyle/>
+          <a:p>
+            <a:pPr lvl="0" indent="0" marL="0">
+              <a:buNone/>
+            </a:pPr>
+            <a:r>
+              <a:rPr b="1"/>
+              <a:t>Speaker Notes</a:t>
+            </a:r>
+            <a:r>
+              <a:rPr/>
+              <a:t>: Script for the presentation here.</a:t>
+            </a:r>
+          </a:p>
+        </p:txBody>
+      </p:sp>
+      <p:sp>
+        <p:nvSpPr>
+          <p:cNvPr id="4" name="Slide Number Placeholder 3"/>
+          <p:cNvSpPr>
+            <a:spLocks noGrp="1"/>
+          </p:cNvSpPr>
+          <p:nvPr>
+            <p:ph type="sldNum" sz="quarter" idx="10"/>
+          </p:nvPr>
+        </p:nvSpPr>
+        <p:spPr/>
+        <p:txBody>
+          <a:bodyPr/>
+          <a:lstStyle/>
+          <a:p>
+            <a:fld id="{18BDFEC3-8487-43E8-A154-7C12CBC1FFF2}" type="slidenum">
+              <a:rPr lang="en-US"/>
+              <a:t>32</a:t>
             </a:fld>
             <a:endParaRPr lang="en-US"/>
           </a:p>
@@ -1810,12 +1915,12 @@
               <a:buNone/>
             </a:pPr>
             <a:r>
-              <a:rPr i="1"/>
+              <a:rPr b="1"/>
               <a:t>Speaker Notes</a:t>
             </a:r>
             <a:r>
               <a:rPr/>
-              <a:t> Script for the presentation here.</a:t>
+              <a:t>: Script for the presentation here.</a:t>
             </a:r>
           </a:p>
         </p:txBody>
@@ -1896,12 +2001,12 @@
               <a:buNone/>
             </a:pPr>
             <a:r>
-              <a:rPr i="1"/>
+              <a:rPr b="1"/>
               <a:t>Speaker Notes</a:t>
             </a:r>
             <a:r>
               <a:rPr/>
-              <a:t> Script for the presentation here.</a:t>
+              <a:t>: Script for the presentation here.</a:t>
             </a:r>
           </a:p>
         </p:txBody>
@@ -1982,12 +2087,12 @@
               <a:buNone/>
             </a:pPr>
             <a:r>
-              <a:rPr i="1"/>
+              <a:rPr b="1"/>
               <a:t>Speaker Notes</a:t>
             </a:r>
             <a:r>
               <a:rPr/>
-              <a:t> Make it clear to the group that there will be a similar post-submodule survey to examine understanding and learning progress.</a:t>
+              <a:t>: Script for the presentation here.</a:t>
             </a:r>
           </a:p>
         </p:txBody>
@@ -2009,7 +2114,7 @@
           <a:p>
             <a:fld id="{18BDFEC3-8487-43E8-A154-7C12CBC1FFF2}" type="slidenum">
               <a:rPr lang="en-US"/>
-              <a:t>9</a:t>
+              <a:t>6</a:t>
             </a:fld>
             <a:endParaRPr lang="en-US"/>
           </a:p>
@@ -2068,12 +2173,12 @@
               <a:buNone/>
             </a:pPr>
             <a:r>
-              <a:rPr i="1"/>
+              <a:rPr b="1"/>
               <a:t>Speaker Notes</a:t>
             </a:r>
             <a:r>
               <a:rPr/>
-              <a:t> Script for the presentation here.</a:t>
+              <a:t>: Script for the presentation here.</a:t>
             </a:r>
           </a:p>
         </p:txBody>
@@ -2154,12 +2259,12 @@
               <a:buNone/>
             </a:pPr>
             <a:r>
-              <a:rPr i="1"/>
+              <a:rPr b="1"/>
               <a:t>Speaker Notes</a:t>
             </a:r>
             <a:r>
               <a:rPr/>
-              <a:t> Script for the presentation here.</a:t>
+              <a:t>: Script for the presentation here.</a:t>
             </a:r>
           </a:p>
         </p:txBody>
@@ -2240,12 +2345,12 @@
               <a:buNone/>
             </a:pPr>
             <a:r>
-              <a:rPr i="1"/>
+              <a:rPr b="1"/>
               <a:t>Speaker Notes</a:t>
             </a:r>
             <a:r>
               <a:rPr/>
-              <a:t> Script for the presentation here.</a:t>
+              <a:t>: Script for the presentation here.</a:t>
             </a:r>
           </a:p>
         </p:txBody>
@@ -2326,12 +2431,12 @@
               <a:buNone/>
             </a:pPr>
             <a:r>
-              <a:rPr i="1"/>
-              <a:t>Speaker notes</a:t>
-            </a:r>
-            <a:r>
-              <a:rPr/>
-              <a:t> Base yourself on conceptual change theory and examine exisiting concepts in relation to some key terms. Re-examine formation of new concepts at the end of the lesson.</a:t>
+              <a:rPr b="1"/>
+              <a:t>Speaker Notes</a:t>
+            </a:r>
+            <a:r>
+              <a:rPr/>
+              <a:t>: Script for the presentation here.</a:t>
             </a:r>
           </a:p>
         </p:txBody>
@@ -5413,7 +5518,7 @@
             </a:pPr>
             <a:r>
               <a:rPr/>
-              <a:t>29/08/2025</a:t>
+              <a:t>03/09/2025</a:t>
             </a:r>
           </a:p>
         </p:txBody>
@@ -5463,25 +5568,25 @@
             </a:pPr>
             <a:r>
               <a:rPr b="1"/>
-              <a:t>Where are we at?</a:t>
+              <a:t>Discussion of survey results</a:t>
             </a:r>
           </a:p>
           <a:p>
             <a:pPr lvl="0"/>
             <a:r>
               <a:rPr b="1"/>
-              <a:t>Aim</a:t>
-            </a:r>
-            <a:r>
-              <a:rPr/>
-              <a:t>: Place the topic of the current submodule within a broader context.</a:t>
+              <a:t>Aim”</a:t>
+            </a:r>
+            <a:r>
+              <a:rPr/>
+              <a:t>: Briefly examine the answers given to each question interactively with the group.</a:t>
             </a:r>
           </a:p>
           <a:p>
             <a:pPr lvl="0"/>
             <a:r>
               <a:rPr/>
-              <a:t>Remind students what you are working towards and what the bigger picture is.</a:t>
+              <a:t>Use visuals from the survey to highlight specific answers.</a:t>
             </a:r>
           </a:p>
         </p:txBody>
@@ -5531,7 +5636,7 @@
             </a:pPr>
             <a:r>
               <a:rPr b="1"/>
-              <a:t>Learning goals</a:t>
+              <a:t>Where are we at?</a:t>
             </a:r>
           </a:p>
           <a:p>
@@ -5542,59 +5647,14 @@
             </a:r>
             <a:r>
               <a:rPr/>
-              <a:t>: Formulate specific, action-oriented goals learning goals which are measurable and observable in line with Bloom’s taxonomy (Anderson et al., 2001; Bloom et al., 1956)</a:t>
+              <a:t>: Place the topic of the current submodule within a broader context.</a:t>
             </a:r>
           </a:p>
           <a:p>
             <a:pPr lvl="0"/>
             <a:r>
               <a:rPr/>
-              <a:t>Place an emphasis on the </a:t>
-            </a:r>
-            <a:r>
-              <a:rPr b="1"/>
-              <a:t>verbs</a:t>
-            </a:r>
-            <a:r>
-              <a:rPr/>
-              <a:t> of the learning goals and choose verbs that align with the skills you want to develop or assess.</a:t>
-            </a:r>
-          </a:p>
-          <a:p>
-            <a:pPr lvl="0"/>
-            <a:r>
-              <a:rPr/>
-              <a:t>Examples:</a:t>
-            </a:r>
-          </a:p>
-          <a:p>
-            <a:pPr lvl="1"/>
-            <a:r>
-              <a:rPr/>
-              <a:t>Students will </a:t>
-            </a:r>
-            <a:r>
-              <a:rPr b="1"/>
-              <a:t>describe</a:t>
-            </a:r>
-            <a:r>
-              <a:rPr/>
-              <a:t> the process of photosynthesis or</a:t>
-            </a:r>
-          </a:p>
-          <a:p>
-            <a:pPr lvl="1"/>
-            <a:r>
-              <a:rPr/>
-              <a:t>Students will </a:t>
-            </a:r>
-            <a:r>
-              <a:rPr b="1"/>
-              <a:t>construct</a:t>
-            </a:r>
-            <a:r>
-              <a:rPr/>
-              <a:t> a diagram illustrating the process of photosynthesis</a:t>
+              <a:t>Remind students what you are working towards and what the bigger picture is.</a:t>
             </a:r>
           </a:p>
         </p:txBody>
@@ -5644,7 +5704,7 @@
             </a:pPr>
             <a:r>
               <a:rPr b="1"/>
-              <a:t>Covered in in this session</a:t>
+              <a:t>Learning goals</a:t>
             </a:r>
           </a:p>
           <a:p>
@@ -5655,28 +5715,59 @@
             </a:r>
             <a:r>
               <a:rPr/>
-              <a:t>: This slides serves as an overview of the topics that are discussed, presented as bullet point:</a:t>
+              <a:t>: Formulate specific, action-oriented goals learning goals which are measurable and observable in line with Bloom’s taxonomy (Anderson et al., 2001; Bloom et al., 1956)</a:t>
             </a:r>
           </a:p>
           <a:p>
             <a:pPr lvl="0"/>
             <a:r>
               <a:rPr/>
-              <a:t>Topic 1</a:t>
+              <a:t>Place an emphasis on the </a:t>
+            </a:r>
+            <a:r>
+              <a:rPr b="1"/>
+              <a:t>verbs</a:t>
+            </a:r>
+            <a:r>
+              <a:rPr/>
+              <a:t> of the learning goals and choose verbs that align with the skills you want to develop or assess.</a:t>
             </a:r>
           </a:p>
           <a:p>
             <a:pPr lvl="0"/>
             <a:r>
               <a:rPr/>
-              <a:t>Topic 2</a:t>
-            </a:r>
-          </a:p>
-          <a:p>
-            <a:pPr lvl="0"/>
-            <a:r>
-              <a:rPr/>
-              <a:t>Topic 3</a:t>
+              <a:t>Examples:</a:t>
+            </a:r>
+          </a:p>
+          <a:p>
+            <a:pPr lvl="1"/>
+            <a:r>
+              <a:rPr/>
+              <a:t>Students will </a:t>
+            </a:r>
+            <a:r>
+              <a:rPr b="1"/>
+              <a:t>describe</a:t>
+            </a:r>
+            <a:r>
+              <a:rPr/>
+              <a:t> the process of photosynthesis or</a:t>
+            </a:r>
+          </a:p>
+          <a:p>
+            <a:pPr lvl="1"/>
+            <a:r>
+              <a:rPr/>
+              <a:t>Students will </a:t>
+            </a:r>
+            <a:r>
+              <a:rPr b="1"/>
+              <a:t>construct</a:t>
+            </a:r>
+            <a:r>
+              <a:rPr/>
+              <a:t> a diagram illustrating the process of photosynthesis</a:t>
             </a:r>
           </a:p>
         </p:txBody>
@@ -5726,7 +5817,7 @@
             </a:pPr>
             <a:r>
               <a:rPr b="1"/>
-              <a:t>Key terms and definitions</a:t>
+              <a:t>Covered in in this session</a:t>
             </a:r>
           </a:p>
           <a:p>
@@ -5737,40 +5828,28 @@
             </a:r>
             <a:r>
               <a:rPr/>
-              <a:t>: Introduce key terms and definitions that students will come across throughout the session. </a:t>
+              <a:t>: This slides serves as an overview of the topics that are discussed, presented as bullet point:</a:t>
             </a:r>
           </a:p>
           <a:p>
             <a:pPr lvl="0"/>
             <a:r>
-              <a:rPr b="1"/>
-              <a:t>Key Term 1</a:t>
-            </a:r>
-            <a:r>
-              <a:rPr/>
-              <a:t>: Definition</a:t>
+              <a:rPr/>
+              <a:t>Topic 1</a:t>
             </a:r>
           </a:p>
           <a:p>
             <a:pPr lvl="0"/>
             <a:r>
-              <a:rPr b="1"/>
-              <a:t>Key Term 2</a:t>
-            </a:r>
-            <a:r>
-              <a:rPr/>
-              <a:t>: Definition</a:t>
+              <a:rPr/>
+              <a:t>Topic 2</a:t>
             </a:r>
           </a:p>
           <a:p>
             <a:pPr lvl="0"/>
             <a:r>
-              <a:rPr b="1"/>
-              <a:t>Key Term 3</a:t>
-            </a:r>
-            <a:r>
-              <a:rPr/>
-              <a:t>: Definition</a:t>
+              <a:rPr/>
+              <a:t>Topic 3</a:t>
             </a:r>
           </a:p>
         </p:txBody>
@@ -5820,7 +5899,7 @@
             </a:pPr>
             <a:r>
               <a:rPr b="1"/>
-              <a:t>Introduction of submodule topic</a:t>
+              <a:t>Key terms and definitions</a:t>
             </a:r>
           </a:p>
           <a:p>
@@ -5831,21 +5910,40 @@
             </a:r>
             <a:r>
               <a:rPr/>
-              <a:t>: Core theoretical introduction of submodule topic.</a:t>
+              <a:t>: Introduce key terms and definitions that students will come across throughout the session. </a:t>
             </a:r>
           </a:p>
           <a:p>
             <a:pPr lvl="0"/>
             <a:r>
-              <a:rPr/>
-              <a:t>Pair theoretical aspects with practical exercises and group discussions according to the Think-Pair-Share style and according to Cognitive Load Theory (Sweller, 1980).</a:t>
+              <a:rPr b="1"/>
+              <a:t>Key Term 1</a:t>
+            </a:r>
+            <a:r>
+              <a:rPr/>
+              <a:t>: Definition</a:t>
             </a:r>
           </a:p>
           <a:p>
             <a:pPr lvl="0"/>
             <a:r>
-              <a:rPr/>
-              <a:t>Use multiple slides for this part.</a:t>
+              <a:rPr b="1"/>
+              <a:t>Key Term 2</a:t>
+            </a:r>
+            <a:r>
+              <a:rPr/>
+              <a:t>: Definition</a:t>
+            </a:r>
+          </a:p>
+          <a:p>
+            <a:pPr lvl="0"/>
+            <a:r>
+              <a:rPr b="1"/>
+              <a:t>Key Term 3</a:t>
+            </a:r>
+            <a:r>
+              <a:rPr/>
+              <a:t>: Definition</a:t>
             </a:r>
           </a:p>
         </p:txBody>
@@ -5895,7 +5993,7 @@
             </a:pPr>
             <a:r>
               <a:rPr b="1"/>
-              <a:t>Submodule content slide</a:t>
+              <a:t>Introduction of submodule topic</a:t>
             </a:r>
           </a:p>
           <a:p>
@@ -5906,50 +6004,21 @@
             </a:r>
             <a:r>
               <a:rPr/>
-              <a:t>: Present relevant content</a:t>
+              <a:t>: Core theoretical introduction of submodule topic.</a:t>
             </a:r>
           </a:p>
           <a:p>
             <a:pPr lvl="0"/>
             <a:r>
               <a:rPr/>
-              <a:t>Highlight particularly important aspects with Quarto call-out boxes, for example:</a:t>
-            </a:r>
-          </a:p>
-          <a:p>
-            <a:pPr lvl="0" indent="0" marL="1270000">
-              <a:buNone/>
-            </a:pPr>
-            <a:r>
-              <a:rPr sz="2000" b="1"/>
-              <a:t>Important with Title</a:t>
-            </a:r>
-          </a:p>
-          <a:p>
-            <a:pPr lvl="0" indent="0" marL="1270000">
-              <a:buNone/>
-            </a:pPr>
-            <a:r>
-              <a:rPr sz="2000"/>
-              <a:t>This is an example of a callout box to highlight particularly important information.</a:t>
-            </a:r>
-          </a:p>
-          <a:p>
-            <a:pPr lvl="0" indent="0" marL="1270000">
-              <a:buNone/>
-            </a:pPr>
-            <a:r>
-              <a:rPr sz="2000" b="1"/>
-              <a:t>Tip with Title</a:t>
-            </a:r>
-          </a:p>
-          <a:p>
-            <a:pPr lvl="0" indent="0" marL="1270000">
-              <a:buNone/>
-            </a:pPr>
-            <a:r>
-              <a:rPr sz="2000"/>
-              <a:t>This is an example of a callout box to give important tips.</a:t>
+              <a:t>Pair theoretical aspects with practical exercises and group discussions according to the Think-Pair-Share style and according to Cognitive Load Theory (Sweller, 1980).</a:t>
+            </a:r>
+          </a:p>
+          <a:p>
+            <a:pPr lvl="0"/>
+            <a:r>
+              <a:rPr/>
+              <a:t>Use multiple slides for this part.</a:t>
             </a:r>
           </a:p>
         </p:txBody>
@@ -5999,7 +6068,7 @@
             </a:pPr>
             <a:r>
               <a:rPr b="1"/>
-              <a:t>Practical exercise 1</a:t>
+              <a:t>Submodule content slide</a:t>
             </a:r>
           </a:p>
           <a:p>
@@ -6010,42 +6079,50 @@
             </a:r>
             <a:r>
               <a:rPr/>
-              <a:t>: Design more practical exercises for students to apply the new skills in practise.</a:t>
+              <a:t>: Present relevant content</a:t>
             </a:r>
           </a:p>
           <a:p>
             <a:pPr lvl="0"/>
             <a:r>
               <a:rPr/>
-              <a:t>Depending on the topic, the exercises should be in accordance with the learning objective(s).</a:t>
-            </a:r>
-          </a:p>
-          <a:p>
-            <a:pPr lvl="0"/>
-            <a:r>
-              <a:rPr/>
-              <a:t>Add a description of the task, as well as a checklist as an overview of that your students need to be doing.</a:t>
-            </a:r>
-          </a:p>
-          <a:p>
-            <a:pPr lvl="0"/>
-            <a:r>
-              <a:rPr/>
-              <a:t>☒ Step 1</a:t>
-            </a:r>
-          </a:p>
-          <a:p>
-            <a:pPr lvl="0"/>
-            <a:r>
-              <a:rPr/>
-              <a:t>☐ Step 2</a:t>
-            </a:r>
-          </a:p>
-          <a:p>
-            <a:pPr lvl="0"/>
-            <a:r>
-              <a:rPr/>
-              <a:t>☐ Step 3</a:t>
+              <a:t>Highlight particularly important aspects with Quarto call-out boxes, for example:</a:t>
+            </a:r>
+          </a:p>
+          <a:p>
+            <a:pPr lvl="0" indent="0" marL="1270000">
+              <a:buNone/>
+            </a:pPr>
+            <a:r>
+              <a:rPr sz="2000" b="1"/>
+              <a:t>Important with Title</a:t>
+            </a:r>
+          </a:p>
+          <a:p>
+            <a:pPr lvl="0" indent="0" marL="1270000">
+              <a:buNone/>
+            </a:pPr>
+            <a:r>
+              <a:rPr sz="2000"/>
+              <a:t>This is an example of a callout box to highlight particularly important information.</a:t>
+            </a:r>
+          </a:p>
+          <a:p>
+            <a:pPr lvl="0" indent="0" marL="1270000">
+              <a:buNone/>
+            </a:pPr>
+            <a:r>
+              <a:rPr sz="2000" b="1"/>
+              <a:t>Tip with Title</a:t>
+            </a:r>
+          </a:p>
+          <a:p>
+            <a:pPr lvl="0" indent="0" marL="1270000">
+              <a:buNone/>
+            </a:pPr>
+            <a:r>
+              <a:rPr sz="2000"/>
+              <a:t>This is an example of a callout box to give important tips.</a:t>
             </a:r>
           </a:p>
         </p:txBody>
@@ -6095,7 +6172,7 @@
             </a:pPr>
             <a:r>
               <a:rPr b="1"/>
-              <a:t>Pre-break survey</a:t>
+              <a:t>Practical exercise 1</a:t>
             </a:r>
           </a:p>
           <a:p>
@@ -6106,14 +6183,42 @@
             </a:r>
             <a:r>
               <a:rPr/>
-              <a:t>: This pre-break survey serves to examine students’ current understanding of key concepts of the submodule</a:t>
+              <a:t>: Design more practical exercises for students to apply the new skills in practise.</a:t>
             </a:r>
           </a:p>
           <a:p>
             <a:pPr lvl="0"/>
             <a:r>
               <a:rPr/>
-              <a:t>Use free survey software such as or other survey software (particify, formR) to establish the following questions (shown on separate slides):</a:t>
+              <a:t>Depending on the topic, the exercises should be in accordance with the learning objective(s).</a:t>
+            </a:r>
+          </a:p>
+          <a:p>
+            <a:pPr lvl="0"/>
+            <a:r>
+              <a:rPr/>
+              <a:t>Add a description of the task, as well as a checklist as an overview of that your students need to be doing.</a:t>
+            </a:r>
+          </a:p>
+          <a:p>
+            <a:pPr lvl="0"/>
+            <a:r>
+              <a:rPr/>
+              <a:t>☒ Step 1</a:t>
+            </a:r>
+          </a:p>
+          <a:p>
+            <a:pPr lvl="0"/>
+            <a:r>
+              <a:rPr/>
+              <a:t>☐ Step 2</a:t>
+            </a:r>
+          </a:p>
+          <a:p>
+            <a:pPr lvl="0"/>
+            <a:r>
+              <a:rPr/>
+              <a:t>☐ Step 3</a:t>
             </a:r>
           </a:p>
         </p:txBody>
@@ -6156,51 +6261,32 @@
           <a:lstStyle/>
           <a:p>
             <a:pPr lvl="0" indent="0" marL="0">
-              <a:buNone/>
-            </a:pPr>
-            <a:r>
-              <a:rPr b="1"/>
-              <a:t>Which species is the largest type of penguin</a:t>
-            </a:r>
-            <a:r>
-              <a:rPr/>
-              <a:t>?</a:t>
-            </a:r>
-          </a:p>
-          <a:p>
-            <a:pPr lvl="0" indent="-342900" marL="342900">
-              <a:buAutoNum type="alphaLcPeriod"/>
-            </a:pPr>
-            <a:r>
-              <a:rPr/>
-              <a:t>Chinstrap Penguin</a:t>
-            </a:r>
-          </a:p>
-          <a:p>
-            <a:pPr lvl="0" indent="-342900" marL="342900">
-              <a:buAutoNum type="alphaLcPeriod"/>
-            </a:pPr>
-            <a:r>
-              <a:rPr/>
-              <a:t>Emperor Penguin ✅</a:t>
-            </a:r>
-          </a:p>
-          <a:p>
-            <a:pPr lvl="0" indent="-342900" marL="342900">
-              <a:buAutoNum type="alphaLcPeriod"/>
-            </a:pPr>
-            <a:r>
-              <a:rPr/>
-              <a:t>Adélie Penguin</a:t>
-            </a:r>
-          </a:p>
-          <a:p>
-            <a:pPr lvl="0" indent="-342900" marL="342900">
-              <a:buAutoNum type="alphaLcPeriod"/>
-            </a:pPr>
-            <a:r>
-              <a:rPr/>
-              <a:t>King Penguin</a:t>
+              <a:spcBef>
+                <a:spcPts val="3000"/>
+              </a:spcBef>
+              <a:buNone/>
+            </a:pPr>
+            <a:r>
+              <a:rPr b="1"/>
+              <a:t>Pre-break survey</a:t>
+            </a:r>
+          </a:p>
+          <a:p>
+            <a:pPr lvl="0"/>
+            <a:r>
+              <a:rPr b="1"/>
+              <a:t>Aim</a:t>
+            </a:r>
+            <a:r>
+              <a:rPr/>
+              <a:t>: This pre-break survey serves to examine students’ current understanding of key concepts of the submodule</a:t>
+            </a:r>
+          </a:p>
+          <a:p>
+            <a:pPr lvl="0"/>
+            <a:r>
+              <a:rPr/>
+              <a:t>Use free survey software such as or other survey software (particify, formR) to establish the following questions (shown on separate slides):</a:t>
             </a:r>
           </a:p>
         </p:txBody>
@@ -6247,7 +6333,11 @@
             </a:pPr>
             <a:r>
               <a:rPr b="1"/>
-              <a:t>What is the key biological feature that helps penguins swim efficiently?</a:t>
+              <a:t>Which species is the largest type of penguin</a:t>
+            </a:r>
+            <a:r>
+              <a:rPr/>
+              <a:t>?</a:t>
             </a:r>
           </a:p>
           <a:p>
@@ -6256,7 +6346,7 @@
             </a:pPr>
             <a:r>
               <a:rPr/>
-              <a:t>Hollow bones for buoyancy</a:t>
+              <a:t>Chinstrap Penguin</a:t>
             </a:r>
           </a:p>
           <a:p>
@@ -6265,7 +6355,7 @@
             </a:pPr>
             <a:r>
               <a:rPr/>
-              <a:t>Webbed feet for paddling</a:t>
+              <a:t>Emperor Penguin ✅</a:t>
             </a:r>
           </a:p>
           <a:p>
@@ -6274,7 +6364,7 @@
             </a:pPr>
             <a:r>
               <a:rPr/>
-              <a:t>Waterproof feathers and flipper-like wings ✅</a:t>
+              <a:t>Adélie Penguin</a:t>
             </a:r>
           </a:p>
           <a:p>
@@ -6283,7 +6373,7 @@
             </a:pPr>
             <a:r>
               <a:rPr/>
-              <a:t>Gills to breathe underwater</a:t>
+              <a:t>King Penguin</a:t>
             </a:r>
           </a:p>
         </p:txBody>
@@ -6333,17 +6423,13 @@
             </a:pPr>
             <a:r>
               <a:rPr b="1"/>
-              <a:t>Credit statement and licence</a:t>
+              <a:t>Contribution statement and licence</a:t>
             </a:r>
           </a:p>
           <a:p>
             <a:pPr lvl="0" indent="0" marL="0">
               <a:buNone/>
             </a:pPr>
-            <a:r>
-              <a:rPr/>
-              <a:t>Possible roles using the CRediT contribition system:</a:t>
-            </a:r>
           </a:p>
           <a:p>
             <a:pPr lvl="0" indent="0" marL="0">
@@ -6351,27 +6437,11 @@
             </a:pPr>
             <a:r>
               <a:rPr b="1"/>
-              <a:t>Name main content creator</a:t>
-            </a:r>
-            <a:r>
-              <a:rPr/>
-              <a:t>: Conceptualization, Software, Writing - Original Draft, Visualization. </a:t>
-            </a:r>
-            <a:r>
-              <a:rPr b="1"/>
-              <a:t>Sara Lil Middleton</a:t>
-            </a:r>
-            <a:r>
-              <a:rPr/>
-              <a:t>: Writing - Review &amp; Editing, Supervision. </a:t>
-            </a:r>
-            <a:r>
-              <a:rPr b="1"/>
-              <a:t>Sarah von Grebmer zu Wolfsthurn</a:t>
-            </a:r>
-            <a:r>
-              <a:rPr/>
-              <a:t>: Conceptualisation, Writing - Review &amp; Editing, Supervision, Project Administration, Validation.</a:t>
+              <a:t>Creator</a:t>
+            </a:r>
+            <a:r>
+              <a:rPr/>
+              <a:t>: Name, first name, (orcid)</a:t>
             </a:r>
           </a:p>
           <a:p>
@@ -6379,6 +6449,32 @@
               <a:buNone/>
             </a:pPr>
             <a:r>
+              <a:rPr b="1"/>
+              <a:t>Reviewer</a:t>
+            </a:r>
+            <a:r>
+              <a:rPr/>
+              <a:t>: Name, first name, (orcid)</a:t>
+            </a:r>
+          </a:p>
+          <a:p>
+            <a:pPr lvl="0" indent="0" marL="0">
+              <a:buNone/>
+            </a:pPr>
+            <a:r>
+              <a:rPr b="1"/>
+              <a:t>Acknowledgments</a:t>
+            </a:r>
+            <a:r>
+              <a:rPr/>
+              <a:t>: Name, first name, (orcid)</a:t>
+            </a:r>
+          </a:p>
+          <a:p>
+            <a:pPr lvl="0" indent="0" marL="0">
+              <a:buNone/>
+            </a:pPr>
+            <a:r>
               <a:rPr/>
               <a:t> </a:t>
             </a:r>
@@ -6389,7 +6485,7 @@
             </a:pPr>
             <a:r>
               <a:rPr/>
-              <a:t>This work by YYY XXX, Sara Lil Middleton and Sarah von Grebmer zu Wolfsthurn is licensed under a CC-BY 4.0 </a:t>
+              <a:t>This work by XXXX XXXX, Sara Lil Middleton and Sarah von Grebmer zu Wolfsthurn is licensed under a CC-BY 4.0 </a:t>
             </a:r>
             <a:r>
               <a:rPr>
@@ -6428,12 +6524,12 @@
       </p:grpSpPr>
       <p:sp>
         <p:nvSpPr>
-          <p:cNvPr id="2" name="Title 1"/>
-          <p:cNvSpPr>
-            <a:spLocks noGrp="1"/>
-          </p:cNvSpPr>
-          <p:nvPr>
-            <p:ph type="title"/>
+          <p:cNvPr id="3" name="Content Placeholder 2"/>
+          <p:cNvSpPr>
+            <a:spLocks noGrp="1"/>
+          </p:cNvSpPr>
+          <p:nvPr>
+            <p:ph idx="1"/>
           </p:nvPr>
         </p:nvSpPr>
         <p:spPr/>
@@ -6445,8 +6541,44 @@
               <a:buNone/>
             </a:pPr>
             <a:r>
-              <a:rPr/>
-              <a:t>Break! 15 minutes</a:t>
+              <a:rPr b="1"/>
+              <a:t>What is the key biological feature that helps penguins swim efficiently?</a:t>
+            </a:r>
+          </a:p>
+          <a:p>
+            <a:pPr lvl="0" indent="-342900" marL="342900">
+              <a:buAutoNum type="alphaLcPeriod"/>
+            </a:pPr>
+            <a:r>
+              <a:rPr/>
+              <a:t>Hollow bones for buoyancy</a:t>
+            </a:r>
+          </a:p>
+          <a:p>
+            <a:pPr lvl="0" indent="-342900" marL="342900">
+              <a:buAutoNum type="alphaLcPeriod"/>
+            </a:pPr>
+            <a:r>
+              <a:rPr/>
+              <a:t>Webbed feet for paddling</a:t>
+            </a:r>
+          </a:p>
+          <a:p>
+            <a:pPr lvl="0" indent="-342900" marL="342900">
+              <a:buAutoNum type="alphaLcPeriod"/>
+            </a:pPr>
+            <a:r>
+              <a:rPr/>
+              <a:t>Waterproof feathers and flipper-like wings ✅</a:t>
+            </a:r>
+          </a:p>
+          <a:p>
+            <a:pPr lvl="0" indent="-342900" marL="342900">
+              <a:buAutoNum type="alphaLcPeriod"/>
+            </a:pPr>
+            <a:r>
+              <a:rPr/>
+              <a:t>Gills to breathe underwater</a:t>
             </a:r>
           </a:p>
         </p:txBody>
@@ -6475,12 +6607,12 @@
       </p:grpSpPr>
       <p:sp>
         <p:nvSpPr>
-          <p:cNvPr id="3" name="Content Placeholder 2"/>
-          <p:cNvSpPr>
-            <a:spLocks noGrp="1"/>
-          </p:cNvSpPr>
-          <p:nvPr>
-            <p:ph idx="1"/>
+          <p:cNvPr id="2" name="Title 1"/>
+          <p:cNvSpPr>
+            <a:spLocks noGrp="1"/>
+          </p:cNvSpPr>
+          <p:nvPr>
+            <p:ph type="title"/>
           </p:nvPr>
         </p:nvSpPr>
         <p:spPr/>
@@ -6489,32 +6621,11 @@
           <a:lstStyle/>
           <a:p>
             <a:pPr lvl="0" indent="0" marL="0">
-              <a:spcBef>
-                <a:spcPts val="3000"/>
-              </a:spcBef>
-              <a:buNone/>
-            </a:pPr>
-            <a:r>
-              <a:rPr b="1"/>
-              <a:t>Post-break survey discussion</a:t>
-            </a:r>
-          </a:p>
-          <a:p>
-            <a:pPr lvl="0"/>
-            <a:r>
-              <a:rPr b="1"/>
-              <a:t>Aim</a:t>
-            </a:r>
-            <a:r>
-              <a:rPr/>
-              <a:t>: To clarify concepts and aspects that are not yet understood</a:t>
-            </a:r>
-          </a:p>
-          <a:p>
-            <a:pPr lvl="0"/>
-            <a:r>
-              <a:rPr/>
-              <a:t>Highlight specific answers given during the survey</a:t>
+              <a:buNone/>
+            </a:pPr>
+            <a:r>
+              <a:rPr/>
+              <a:t>Break! 15 minutes</a:t>
             </a:r>
           </a:p>
         </p:txBody>
@@ -6564,7 +6675,7 @@
             </a:pPr>
             <a:r>
               <a:rPr b="1"/>
-              <a:t>Practical exercise 2</a:t>
+              <a:t>Post-break survey discussion</a:t>
             </a:r>
           </a:p>
           <a:p>
@@ -6575,42 +6686,14 @@
             </a:r>
             <a:r>
               <a:rPr/>
-              <a:t>: Design more practical exercises for students to apply the new skills in practise.</a:t>
+              <a:t>: To clarify concepts and aspects that are not yet understood</a:t>
             </a:r>
           </a:p>
           <a:p>
             <a:pPr lvl="0"/>
             <a:r>
               <a:rPr/>
-              <a:t>Depending on the topic, the exercises should be in accordance with the learning objective(s).</a:t>
-            </a:r>
-          </a:p>
-          <a:p>
-            <a:pPr lvl="0"/>
-            <a:r>
-              <a:rPr/>
-              <a:t>Add a description of the task, as well as a checklist as an overview of that your students need to be doing.</a:t>
-            </a:r>
-          </a:p>
-          <a:p>
-            <a:pPr lvl="0"/>
-            <a:r>
-              <a:rPr/>
-              <a:t>☒ Step 1</a:t>
-            </a:r>
-          </a:p>
-          <a:p>
-            <a:pPr lvl="0"/>
-            <a:r>
-              <a:rPr/>
-              <a:t>☐ Step 2</a:t>
-            </a:r>
-          </a:p>
-          <a:p>
-            <a:pPr lvl="0"/>
-            <a:r>
-              <a:rPr/>
-              <a:t>☐ Step 3</a:t>
+              <a:t>Highlight specific answers given during the survey</a:t>
             </a:r>
           </a:p>
         </p:txBody>
@@ -6660,7 +6743,7 @@
             </a:pPr>
             <a:r>
               <a:rPr b="1"/>
-              <a:t>Relevance and implications</a:t>
+              <a:t>Practical exercise 2</a:t>
             </a:r>
           </a:p>
           <a:p>
@@ -6671,21 +6754,42 @@
             </a:r>
             <a:r>
               <a:rPr/>
-              <a:t>: To work out the relevance of the topic to your students.</a:t>
+              <a:t>: Design more practical exercises for students to apply the new skills in practise.</a:t>
             </a:r>
           </a:p>
           <a:p>
             <a:pPr lvl="0"/>
             <a:r>
               <a:rPr/>
-              <a:t>In an interactive setting, discuss how the new skills could be applied in practise with specific examples.</a:t>
+              <a:t>Depending on the topic, the exercises should be in accordance with the learning objective(s).</a:t>
             </a:r>
           </a:p>
           <a:p>
             <a:pPr lvl="0"/>
             <a:r>
               <a:rPr/>
-              <a:t>Examine downfalls and practical obstacles.</a:t>
+              <a:t>Add a description of the task, as well as a checklist as an overview of that your students need to be doing.</a:t>
+            </a:r>
+          </a:p>
+          <a:p>
+            <a:pPr lvl="0"/>
+            <a:r>
+              <a:rPr/>
+              <a:t>☒ Step 1</a:t>
+            </a:r>
+          </a:p>
+          <a:p>
+            <a:pPr lvl="0"/>
+            <a:r>
+              <a:rPr/>
+              <a:t>☐ Step 2</a:t>
+            </a:r>
+          </a:p>
+          <a:p>
+            <a:pPr lvl="0"/>
+            <a:r>
+              <a:rPr/>
+              <a:t>☐ Step 3</a:t>
             </a:r>
           </a:p>
         </p:txBody>
@@ -6735,38 +6839,32 @@
             </a:pPr>
             <a:r>
               <a:rPr b="1"/>
-              <a:t>Take-home message</a:t>
-            </a:r>
-          </a:p>
-          <a:p>
-            <a:pPr lvl="0" indent="0" marL="0">
-              <a:buNone/>
-            </a:pPr>
+              <a:t>Relevance and implications</a:t>
+            </a:r>
+          </a:p>
+          <a:p>
+            <a:pPr lvl="0"/>
             <a:r>
               <a:rPr b="1"/>
               <a:t>Aim</a:t>
             </a:r>
             <a:r>
               <a:rPr/>
-              <a:t>: End lesson on clear take-home message that are interactively compiled by students.</a:t>
-            </a:r>
-          </a:p>
-          <a:p>
-            <a:pPr lvl="0" indent="0" marL="1270000">
-              <a:buNone/>
-            </a:pPr>
-            <a:r>
-              <a:rPr sz="2000" b="1"/>
-              <a:t>Tip with Title</a:t>
-            </a:r>
-          </a:p>
-          <a:p>
-            <a:pPr lvl="0" indent="0" marL="1270000">
-              <a:buNone/>
-            </a:pPr>
-            <a:r>
-              <a:rPr sz="2000"/>
-              <a:t>Add one practical tips or take-home message.</a:t>
+              <a:t>: To work out the relevance of the topic to your students.</a:t>
+            </a:r>
+          </a:p>
+          <a:p>
+            <a:pPr lvl="0"/>
+            <a:r>
+              <a:rPr/>
+              <a:t>In an interactive setting, discuss how the new skills could be applied in practise with specific examples.</a:t>
+            </a:r>
+          </a:p>
+          <a:p>
+            <a:pPr lvl="0"/>
+            <a:r>
+              <a:rPr/>
+              <a:t>Examine downfalls and practical obstacles.</a:t>
             </a:r>
           </a:p>
         </p:txBody>
@@ -6816,39 +6914,38 @@
             </a:pPr>
             <a:r>
               <a:rPr b="1"/>
-              <a:t>Assignment</a:t>
-            </a:r>
-          </a:p>
-          <a:p>
-            <a:pPr lvl="0"/>
+              <a:t>Take-home message</a:t>
+            </a:r>
+          </a:p>
+          <a:p>
+            <a:pPr lvl="0" indent="0" marL="0">
+              <a:buNone/>
+            </a:pPr>
             <a:r>
               <a:rPr b="1"/>
               <a:t>Aim</a:t>
             </a:r>
             <a:r>
               <a:rPr/>
-              <a:t>: Explain the homework assignment and the rationale behind the homework.</a:t>
-            </a:r>
-          </a:p>
-          <a:p>
-            <a:pPr lvl="0"/>
-            <a:r>
-              <a:rPr/>
-              <a:t>Examine whether/how it will be assessed</a:t>
-            </a:r>
-          </a:p>
-          <a:p>
-            <a:pPr lvl="0"/>
-            <a:r>
-              <a:rPr/>
-              <a:t>Mention scoring rubrics, if applicable</a:t>
-            </a:r>
-          </a:p>
-          <a:p>
-            <a:pPr lvl="0"/>
-            <a:r>
-              <a:rPr/>
-              <a:t>Design a peer-review system for assignments to place students in role of reviewer and author</a:t>
+              <a:t>: End lesson on clear take-home message that are interactively compiled by students.</a:t>
+            </a:r>
+          </a:p>
+          <a:p>
+            <a:pPr lvl="0" indent="0" marL="1270000">
+              <a:buNone/>
+            </a:pPr>
+            <a:r>
+              <a:rPr sz="2000" b="1"/>
+              <a:t>Tip with Title</a:t>
+            </a:r>
+          </a:p>
+          <a:p>
+            <a:pPr lvl="0" indent="0" marL="1270000">
+              <a:buNone/>
+            </a:pPr>
+            <a:r>
+              <a:rPr sz="2000"/>
+              <a:t>Add one practical tips or take-home message.</a:t>
             </a:r>
           </a:p>
         </p:txBody>
@@ -6898,7 +6995,7 @@
             </a:pPr>
             <a:r>
               <a:rPr b="1"/>
-              <a:t>To conclude: Survey time!</a:t>
+              <a:t>Assignment</a:t>
             </a:r>
           </a:p>
           <a:p>
@@ -6909,14 +7006,28 @@
             </a:r>
             <a:r>
               <a:rPr/>
-              <a:t>: This post-submodule survey serves to examine students’ current knowledge about the sumodule’s topic.</a:t>
+              <a:t>: Explain the homework assignment and the rationale behind the homework.</a:t>
             </a:r>
           </a:p>
           <a:p>
             <a:pPr lvl="0"/>
             <a:r>
               <a:rPr/>
-              <a:t>Use free survey software such as or other survey software (particify, formR) to establish the following questions (shown on separate slides):</a:t>
+              <a:t>Examine whether/how it will be assessed</a:t>
+            </a:r>
+          </a:p>
+          <a:p>
+            <a:pPr lvl="0"/>
+            <a:r>
+              <a:rPr/>
+              <a:t>Mention scoring rubrics, if applicable</a:t>
+            </a:r>
+          </a:p>
+          <a:p>
+            <a:pPr lvl="0"/>
+            <a:r>
+              <a:rPr/>
+              <a:t>Design a peer-review system for assignments to place students in role of reviewer and author</a:t>
             </a:r>
           </a:p>
         </p:txBody>
@@ -6959,47 +7070,32 @@
           <a:lstStyle/>
           <a:p>
             <a:pPr lvl="0" indent="0" marL="0">
-              <a:buNone/>
-            </a:pPr>
-            <a:r>
-              <a:rPr b="1"/>
-              <a:t>What is your level of familiarity with [Topic] (e.g., basic concepts, terminology, or tools)?</a:t>
-            </a:r>
-          </a:p>
-          <a:p>
-            <a:pPr lvl="0" indent="-342900" marL="342900">
-              <a:buAutoNum type="alphaLcPeriod"/>
-            </a:pPr>
-            <a:r>
-              <a:rPr/>
-              <a:t>I have never heard of it before.</a:t>
-            </a:r>
-          </a:p>
-          <a:p>
-            <a:pPr lvl="0" indent="-342900" marL="342900">
-              <a:buAutoNum type="alphaLcPeriod"/>
-            </a:pPr>
-            <a:r>
-              <a:rPr/>
-              <a:t>I have heard of it but have never worked with it.</a:t>
-            </a:r>
-          </a:p>
-          <a:p>
-            <a:pPr lvl="0" indent="-342900" marL="342900">
-              <a:buAutoNum type="alphaLcPeriod"/>
-            </a:pPr>
-            <a:r>
-              <a:rPr/>
-              <a:t>I have basic understanding and experience with it.</a:t>
-            </a:r>
-          </a:p>
-          <a:p>
-            <a:pPr lvl="0" indent="-342900" marL="342900">
-              <a:buAutoNum type="alphaLcPeriod"/>
-            </a:pPr>
-            <a:r>
-              <a:rPr/>
-              <a:t>I am very familiar and have worked with it extensively.</a:t>
+              <a:spcBef>
+                <a:spcPts val="3000"/>
+              </a:spcBef>
+              <a:buNone/>
+            </a:pPr>
+            <a:r>
+              <a:rPr b="1"/>
+              <a:t>To conclude: Survey time!</a:t>
+            </a:r>
+          </a:p>
+          <a:p>
+            <a:pPr lvl="0"/>
+            <a:r>
+              <a:rPr b="1"/>
+              <a:t>Aim</a:t>
+            </a:r>
+            <a:r>
+              <a:rPr/>
+              <a:t>: This post-submodule survey serves to examine students’ current knowledge about the sumodule’s topic.</a:t>
+            </a:r>
+          </a:p>
+          <a:p>
+            <a:pPr lvl="0"/>
+            <a:r>
+              <a:rPr/>
+              <a:t>Use free survey software such as or other survey software (particify, formR) to establish the following questions (shown on separate slides):</a:t>
             </a:r>
           </a:p>
         </p:txBody>
@@ -7046,7 +7142,7 @@
             </a:pPr>
             <a:r>
               <a:rPr b="1"/>
-              <a:t>Which of the following concepts or skills do you feel most confident about in relation to [Topic]? (Select all that apply)</a:t>
+              <a:t>What is your level of familiarity with [Topic] (e.g., basic concepts, terminology, or tools)?</a:t>
             </a:r>
           </a:p>
           <a:p>
@@ -7055,7 +7151,7 @@
             </a:pPr>
             <a:r>
               <a:rPr/>
-              <a:t>Concept 1</a:t>
+              <a:t>I have never heard of it before.</a:t>
             </a:r>
           </a:p>
           <a:p>
@@ -7064,7 +7160,7 @@
             </a:pPr>
             <a:r>
               <a:rPr/>
-              <a:t>Concept 2</a:t>
+              <a:t>I have heard of it but have never worked with it.</a:t>
             </a:r>
           </a:p>
           <a:p>
@@ -7073,7 +7169,7 @@
             </a:pPr>
             <a:r>
               <a:rPr/>
-              <a:t>Concept 3</a:t>
+              <a:t>I have basic understanding and experience with it.</a:t>
             </a:r>
           </a:p>
           <a:p>
@@ -7082,16 +7178,7 @@
             </a:pPr>
             <a:r>
               <a:rPr/>
-              <a:t>Concept 4</a:t>
-            </a:r>
-          </a:p>
-          <a:p>
-            <a:pPr lvl="0" indent="-342900" marL="342900">
-              <a:buAutoNum type="alphaLcPeriod"/>
-            </a:pPr>
-            <a:r>
-              <a:rPr/>
-              <a:t>I am not sure about any of these concepts.</a:t>
+              <a:t>I am very familiar and have worked with it extensively.</a:t>
             </a:r>
           </a:p>
         </p:txBody>
@@ -7138,7 +7225,7 @@
             </a:pPr>
             <a:r>
               <a:rPr b="1"/>
-              <a:t>On a scale of 1 to 5, how comfortable are you with using [specific tool/technology] related to [Topic]? (1 = Not comfortable at all, 5 = Very comfortable)</a:t>
+              <a:t>Which of the following concepts or skills do you feel most confident about in relation to [Topic]? (Select all that apply)</a:t>
             </a:r>
           </a:p>
           <a:p>
@@ -7147,7 +7234,7 @@
             </a:pPr>
             <a:r>
               <a:rPr/>
-              <a:t>1</a:t>
+              <a:t>Concept 1</a:t>
             </a:r>
           </a:p>
           <a:p>
@@ -7156,7 +7243,7 @@
             </a:pPr>
             <a:r>
               <a:rPr/>
-              <a:t>2</a:t>
+              <a:t>Concept 2</a:t>
             </a:r>
           </a:p>
           <a:p>
@@ -7165,7 +7252,7 @@
             </a:pPr>
             <a:r>
               <a:rPr/>
-              <a:t>3</a:t>
+              <a:t>Concept 3</a:t>
             </a:r>
           </a:p>
           <a:p>
@@ -7174,7 +7261,7 @@
             </a:pPr>
             <a:r>
               <a:rPr/>
-              <a:t>4</a:t>
+              <a:t>Concept 4</a:t>
             </a:r>
           </a:p>
           <a:p>
@@ -7183,7 +7270,7 @@
             </a:pPr>
             <a:r>
               <a:rPr/>
-              <a:t>5</a:t>
+              <a:t>I am not sure about any of these concepts.</a:t>
             </a:r>
           </a:p>
         </p:txBody>
@@ -7233,7 +7320,7 @@
             </a:pPr>
             <a:r>
               <a:rPr b="1"/>
-              <a:t>Prerequisites</a:t>
+              <a:t>Prerequisites - table format</a:t>
             </a:r>
           </a:p>
           <a:p>
@@ -7469,32 +7556,56 @@
           <a:lstStyle/>
           <a:p>
             <a:pPr lvl="0" indent="0" marL="0">
-              <a:spcBef>
-                <a:spcPts val="3000"/>
-              </a:spcBef>
-              <a:buNone/>
-            </a:pPr>
-            <a:r>
-              <a:rPr b="1"/>
-              <a:t>Discussion of survey results</a:t>
-            </a:r>
-          </a:p>
-          <a:p>
-            <a:pPr lvl="0"/>
-            <a:r>
-              <a:rPr b="1"/>
-              <a:t>Aim</a:t>
-            </a:r>
-            <a:r>
-              <a:rPr/>
-              <a:t>: Briefly examine the answers given to each question interactively with the group.</a:t>
-            </a:r>
-          </a:p>
-          <a:p>
-            <a:pPr lvl="0"/>
-            <a:r>
-              <a:rPr/>
-              <a:t>Compare and highlight specific differences in answers between pre- and post-survey answers</a:t>
+              <a:buNone/>
+            </a:pPr>
+            <a:r>
+              <a:rPr b="1"/>
+              <a:t>On a scale of 1 to 5, how comfortable are you with using [specific tool/technology] related to [Topic]? (1 = Not comfortable at all, 5 = Very comfortable)</a:t>
+            </a:r>
+          </a:p>
+          <a:p>
+            <a:pPr lvl="0" indent="-342900" marL="342900">
+              <a:buAutoNum type="alphaLcPeriod"/>
+            </a:pPr>
+            <a:r>
+              <a:rPr/>
+              <a:t>1</a:t>
+            </a:r>
+          </a:p>
+          <a:p>
+            <a:pPr lvl="0" indent="-342900" marL="342900">
+              <a:buAutoNum type="alphaLcPeriod"/>
+            </a:pPr>
+            <a:r>
+              <a:rPr/>
+              <a:t>2</a:t>
+            </a:r>
+          </a:p>
+          <a:p>
+            <a:pPr lvl="0" indent="-342900" marL="342900">
+              <a:buAutoNum type="alphaLcPeriod"/>
+            </a:pPr>
+            <a:r>
+              <a:rPr/>
+              <a:t>3</a:t>
+            </a:r>
+          </a:p>
+          <a:p>
+            <a:pPr lvl="0" indent="-342900" marL="342900">
+              <a:buAutoNum type="alphaLcPeriod"/>
+            </a:pPr>
+            <a:r>
+              <a:rPr/>
+              <a:t>4</a:t>
+            </a:r>
+          </a:p>
+          <a:p>
+            <a:pPr lvl="0" indent="-342900" marL="342900">
+              <a:buAutoNum type="alphaLcPeriod"/>
+            </a:pPr>
+            <a:r>
+              <a:rPr/>
+              <a:t>5</a:t>
             </a:r>
           </a:p>
         </p:txBody>
@@ -7544,14 +7655,25 @@
             </a:pPr>
             <a:r>
               <a:rPr b="1"/>
-              <a:t>References</a:t>
+              <a:t>Discussion of survey results</a:t>
             </a:r>
           </a:p>
           <a:p>
             <a:pPr lvl="0"/>
             <a:r>
-              <a:rPr/>
-              <a:t>Provide literature you refer to throughout this lesson.</a:t>
+              <a:rPr b="1"/>
+              <a:t>Aim</a:t>
+            </a:r>
+            <a:r>
+              <a:rPr/>
+              <a:t>: Briefly examine the answers given to each question interactively with the group.</a:t>
+            </a:r>
+          </a:p>
+          <a:p>
+            <a:pPr lvl="0"/>
+            <a:r>
+              <a:rPr/>
+              <a:t>Compare and highlight specific differences in answers between pre- and post-survey answers</a:t>
             </a:r>
           </a:p>
         </p:txBody>
@@ -7580,12 +7702,12 @@
       </p:grpSpPr>
       <p:sp>
         <p:nvSpPr>
-          <p:cNvPr id="2" name="Title 1"/>
-          <p:cNvSpPr>
-            <a:spLocks noGrp="1"/>
-          </p:cNvSpPr>
-          <p:nvPr>
-            <p:ph type="title"/>
+          <p:cNvPr id="3" name="Content Placeholder 2"/>
+          <p:cNvSpPr>
+            <a:spLocks noGrp="1"/>
+          </p:cNvSpPr>
+          <p:nvPr>
+            <p:ph idx="1"/>
           </p:nvPr>
         </p:nvSpPr>
         <p:spPr/>
@@ -7594,36 +7716,21 @@
           <a:lstStyle/>
           <a:p>
             <a:pPr lvl="0" indent="0" marL="0">
-              <a:buNone/>
-            </a:pPr>
-            <a:r>
-              <a:rPr/>
-              <a:t>Thanks! </a:t>
-            </a:r>
-          </a:p>
-        </p:txBody>
-      </p:sp>
-      <p:sp>
-        <p:nvSpPr>
-          <p:cNvPr id="3" name="Content Placeholder 2"/>
-          <p:cNvSpPr>
-            <a:spLocks noGrp="1"/>
-          </p:cNvSpPr>
-          <p:nvPr>
-            <p:ph idx="1"/>
-          </p:nvPr>
-        </p:nvSpPr>
-        <p:spPr/>
-        <p:txBody>
-          <a:bodyPr/>
-          <a:lstStyle/>
-          <a:p>
-            <a:pPr lvl="0" indent="0" marL="0">
-              <a:buNone/>
-            </a:pPr>
-            <a:r>
-              <a:rPr/>
-              <a:t>See you next class :)</a:t>
+              <a:spcBef>
+                <a:spcPts val="3000"/>
+              </a:spcBef>
+              <a:buNone/>
+            </a:pPr>
+            <a:r>
+              <a:rPr b="1"/>
+              <a:t>References</a:t>
+            </a:r>
+          </a:p>
+          <a:p>
+            <a:pPr lvl="0"/>
+            <a:r>
+              <a:rPr/>
+              <a:t>Provide literature you refer to throughout this lesson.</a:t>
             </a:r>
           </a:p>
         </p:txBody>
@@ -7652,6 +7759,31 @@
       </p:grpSpPr>
       <p:sp>
         <p:nvSpPr>
+          <p:cNvPr id="2" name="Title 1"/>
+          <p:cNvSpPr>
+            <a:spLocks noGrp="1"/>
+          </p:cNvSpPr>
+          <p:nvPr>
+            <p:ph type="title"/>
+          </p:nvPr>
+        </p:nvSpPr>
+        <p:spPr/>
+        <p:txBody>
+          <a:bodyPr/>
+          <a:lstStyle/>
+          <a:p>
+            <a:pPr lvl="0" indent="0" marL="0">
+              <a:buNone/>
+            </a:pPr>
+            <a:r>
+              <a:rPr/>
+              <a:t>Thanks! </a:t>
+            </a:r>
+          </a:p>
+        </p:txBody>
+      </p:sp>
+      <p:sp>
+        <p:nvSpPr>
           <p:cNvPr id="3" name="Content Placeholder 2"/>
           <p:cNvSpPr>
             <a:spLocks noGrp="1"/>
@@ -7666,42 +7798,11 @@
           <a:lstStyle/>
           <a:p>
             <a:pPr lvl="0" indent="0" marL="0">
-              <a:spcBef>
-                <a:spcPts val="3000"/>
-              </a:spcBef>
-              <a:buNone/>
-            </a:pPr>
-            <a:r>
-              <a:rPr b="1"/>
-              <a:t>Pedagogical add-on tools for instructors</a:t>
-            </a:r>
-          </a:p>
-          <a:p>
-            <a:pPr lvl="0"/>
-            <a:r>
-              <a:rPr/>
-              <a:t>This section is dedicated to ideas on how to incorporate pedagogical tools into teaching for this specific submodule topic. This could mean:</a:t>
-            </a:r>
-          </a:p>
-          <a:p>
-            <a:pPr lvl="1"/>
-            <a:r>
-              <a:rPr/>
-              <a:t>Information about the scientific evidence on the theory of the pedagogical add-on tool and the evidence for its efficacy.</a:t>
-            </a:r>
-          </a:p>
-          <a:p>
-            <a:pPr lvl="1"/>
-            <a:r>
-              <a:rPr/>
-              <a:t>Discussion/reflection on how tools can be incorporated into the teaching for this particular content.</a:t>
-            </a:r>
-          </a:p>
-          <a:p>
-            <a:pPr lvl="1"/>
-            <a:r>
-              <a:rPr/>
-              <a:t>Extra exercises for faster students.</a:t>
+              <a:buNone/>
+            </a:pPr>
+            <a:r>
+              <a:rPr/>
+              <a:t>See you next class :)</a:t>
             </a:r>
           </a:p>
         </p:txBody>
@@ -7751,29 +7852,35 @@
             </a:pPr>
             <a:r>
               <a:rPr b="1"/>
-              <a:t>Additional literature for instructors</a:t>
+              <a:t>Pedagogical add-on tools for instructors</a:t>
             </a:r>
           </a:p>
           <a:p>
             <a:pPr lvl="0"/>
             <a:r>
               <a:rPr/>
-              <a:t>References for content</a:t>
-            </a:r>
-          </a:p>
-          <a:p>
-            <a:pPr lvl="0"/>
-            <a:r>
-              <a:rPr/>
-              <a:t>References for pedagogical add-on tools</a:t>
-            </a:r>
-            <a:br/>
-          </a:p>
-          <a:p>
-            <a:pPr lvl="0"/>
-            <a:r>
-              <a:rPr/>
-              <a:t>Other resources (videos etc.)</a:t>
+              <a:t>This section is dedicated to ideas on how to incorporate pedagogical tools into teaching for this specific submodule topic. This could mean:</a:t>
+            </a:r>
+          </a:p>
+          <a:p>
+            <a:pPr lvl="1"/>
+            <a:r>
+              <a:rPr/>
+              <a:t>Information about the scientific evidence on the theory of the pedagogical add-on tool and the evidence for its efficacy.</a:t>
+            </a:r>
+          </a:p>
+          <a:p>
+            <a:pPr lvl="1"/>
+            <a:r>
+              <a:rPr/>
+              <a:t>Discussion/reflection on how tools can be incorporated into the teaching for this particular content.</a:t>
+            </a:r>
+          </a:p>
+          <a:p>
+            <a:pPr lvl="1"/>
+            <a:r>
+              <a:rPr/>
+              <a:t>Extra exercises for faster students.</a:t>
             </a:r>
           </a:p>
         </p:txBody>
@@ -7802,12 +7909,12 @@
       </p:grpSpPr>
       <p:sp>
         <p:nvSpPr>
-          <p:cNvPr id="2" name="Title 1"/>
-          <p:cNvSpPr>
-            <a:spLocks noGrp="1"/>
-          </p:cNvSpPr>
-          <p:nvPr>
-            <p:ph type="title"/>
+          <p:cNvPr id="3" name="Content Placeholder 2"/>
+          <p:cNvSpPr>
+            <a:spLocks noGrp="1"/>
+          </p:cNvSpPr>
+          <p:nvPr>
+            <p:ph idx="1"/>
           </p:nvPr>
         </p:nvSpPr>
         <p:spPr/>
@@ -7816,38 +7923,36 @@
           <a:lstStyle/>
           <a:p>
             <a:pPr lvl="0" indent="0" marL="0">
-              <a:buNone/>
-            </a:pPr>
-            <a:r>
-              <a:rPr/>
-              <a:t>Formatting elements for instructors</a:t>
-            </a:r>
-          </a:p>
-        </p:txBody>
-      </p:sp>
-      <p:sp>
-        <p:nvSpPr>
-          <p:cNvPr id="3" name="Content Placeholder 2"/>
-          <p:cNvSpPr>
-            <a:spLocks noGrp="1"/>
-          </p:cNvSpPr>
-          <p:nvPr>
-            <p:ph idx="1"/>
-          </p:nvPr>
-        </p:nvSpPr>
-        <p:spPr/>
-        <p:txBody>
-          <a:bodyPr/>
-          <a:lstStyle/>
+              <a:spcBef>
+                <a:spcPts val="3000"/>
+              </a:spcBef>
+              <a:buNone/>
+            </a:pPr>
+            <a:r>
+              <a:rPr b="1"/>
+              <a:t>Additional literature for instructors</a:t>
+            </a:r>
+          </a:p>
           <a:p>
             <a:pPr lvl="0"/>
             <a:r>
-              <a:rPr b="1"/>
-              <a:t>Aim</a:t>
-            </a:r>
-            <a:r>
-              <a:rPr/>
-              <a:t>: This section contains templates for different formatting elements, which can be modified and adapted for the instructor’s individual purposes.</a:t>
+              <a:rPr/>
+              <a:t>References for content</a:t>
+            </a:r>
+          </a:p>
+          <a:p>
+            <a:pPr lvl="0"/>
+            <a:r>
+              <a:rPr/>
+              <a:t>References for pedagogical add-on tools</a:t>
+            </a:r>
+            <a:br/>
+          </a:p>
+          <a:p>
+            <a:pPr lvl="0"/>
+            <a:r>
+              <a:rPr/>
+              <a:t>Other resources (videos etc.)</a:t>
             </a:r>
           </a:p>
         </p:txBody>
@@ -7876,6 +7981,31 @@
       </p:grpSpPr>
       <p:sp>
         <p:nvSpPr>
+          <p:cNvPr id="2" name="Title 1"/>
+          <p:cNvSpPr>
+            <a:spLocks noGrp="1"/>
+          </p:cNvSpPr>
+          <p:nvPr>
+            <p:ph type="title"/>
+          </p:nvPr>
+        </p:nvSpPr>
+        <p:spPr/>
+        <p:txBody>
+          <a:bodyPr/>
+          <a:lstStyle/>
+          <a:p>
+            <a:pPr lvl="0" indent="0" marL="0">
+              <a:buNone/>
+            </a:pPr>
+            <a:r>
+              <a:rPr/>
+              <a:t>Formatting elements for instructors</a:t>
+            </a:r>
+          </a:p>
+        </p:txBody>
+      </p:sp>
+      <p:sp>
+        <p:nvSpPr>
           <p:cNvPr id="3" name="Content Placeholder 2"/>
           <p:cNvSpPr>
             <a:spLocks noGrp="1"/>
@@ -7889,51 +8019,14 @@
           <a:bodyPr/>
           <a:lstStyle/>
           <a:p>
-            <a:pPr lvl="0" indent="0" marL="0">
-              <a:spcBef>
-                <a:spcPts val="3000"/>
-              </a:spcBef>
-              <a:buNone/>
-            </a:pPr>
-            <a:r>
-              <a:rPr b="1"/>
-              <a:t>Text with example links</a:t>
-            </a:r>
-          </a:p>
-          <a:p>
             <a:pPr lvl="0"/>
             <a:r>
-              <a:rPr>
-                <a:hlinkClick r:id="rId2"/>
-              </a:rPr>
-              <a:t>Quarto Documentation</a:t>
-            </a:r>
-          </a:p>
-          <a:p>
-            <a:pPr lvl="0"/>
-            <a:r>
-              <a:rPr>
-                <a:hlinkClick r:id="rId3"/>
-              </a:rPr>
-              <a:t>Reveal.js Documentation</a:t>
-            </a:r>
-          </a:p>
-          <a:p>
-            <a:pPr lvl="0"/>
-            <a:r>
-              <a:rPr>
-                <a:hlinkClick r:id="rId4"/>
-              </a:rPr>
-              <a:t>Markdown Guide</a:t>
-            </a:r>
-          </a:p>
-          <a:p>
-            <a:pPr lvl="0"/>
-            <a:r>
-              <a:rPr>
-                <a:hlinkClick r:id="rId5"/>
-              </a:rPr>
-              <a:t>GitHub</a:t>
+              <a:rPr b="1"/>
+              <a:t>Aim</a:t>
+            </a:r>
+            <a:r>
+              <a:rPr/>
+              <a:t>: This section contains templates for different formatting elements, which can be modified and adapted for the instructor’s individual purposes.</a:t>
             </a:r>
           </a:p>
         </p:txBody>
@@ -7983,133 +8076,43 @@
             </a:pPr>
             <a:r>
               <a:rPr b="1"/>
-              <a:t>Basic text formatting</a:t>
+              <a:t>Text with example links</a:t>
             </a:r>
           </a:p>
           <a:p>
             <a:pPr lvl="0"/>
             <a:r>
-              <a:rPr b="1"/>
-              <a:t>Bold:</a:t>
-            </a:r>
-            <a:r>
-              <a:rPr/>
-              <a:t> </a:t>
-            </a:r>
-            <a:r>
               <a:rPr>
-                <a:latin typeface="Courier"/>
+                <a:hlinkClick r:id="rId2"/>
               </a:rPr>
-              <a:t>**bold**</a:t>
-            </a:r>
-            <a:r>
-              <a:rPr/>
-              <a:t> → </a:t>
-            </a:r>
-            <a:r>
-              <a:rPr b="1"/>
-              <a:t>bold</a:t>
+              <a:t>Quarto Documentation</a:t>
             </a:r>
           </a:p>
           <a:p>
             <a:pPr lvl="0"/>
             <a:r>
-              <a:rPr i="1"/>
-              <a:t>Italic:</a:t>
-            </a:r>
-            <a:r>
-              <a:rPr/>
-              <a:t> </a:t>
-            </a:r>
-            <a:r>
               <a:rPr>
-                <a:latin typeface="Courier"/>
+                <a:hlinkClick r:id="rId3"/>
               </a:rPr>
-              <a:t>*italic*</a:t>
-            </a:r>
-            <a:r>
-              <a:rPr/>
-              <a:t> → </a:t>
-            </a:r>
-            <a:r>
-              <a:rPr i="1"/>
-              <a:t>italic</a:t>
+              <a:t>Reveal.js Documentation</a:t>
             </a:r>
           </a:p>
           <a:p>
             <a:pPr lvl="0"/>
             <a:r>
-              <a:rPr strike="sngStrike"/>
-              <a:t>Strikethrough:</a:t>
-            </a:r>
-            <a:r>
-              <a:rPr/>
-              <a:t> </a:t>
-            </a:r>
-            <a:r>
               <a:rPr>
-                <a:latin typeface="Courier"/>
+                <a:hlinkClick r:id="rId4"/>
               </a:rPr>
-              <a:t>~~text~~</a:t>
-            </a:r>
-            <a:r>
-              <a:rPr/>
-              <a:t> → </a:t>
-            </a:r>
-            <a:r>
-              <a:rPr strike="sngStrike"/>
-              <a:t>text</a:t>
+              <a:t>Markdown Guide</a:t>
             </a:r>
           </a:p>
           <a:p>
             <a:pPr lvl="0"/>
             <a:r>
               <a:rPr>
-                <a:latin typeface="Courier"/>
+                <a:hlinkClick r:id="rId5"/>
               </a:rPr>
-              <a:t>Inline code:</a:t>
-            </a:r>
-            <a:r>
-              <a:rPr/>
-              <a:t> </a:t>
-            </a:r>
-            <a:r>
-              <a:rPr>
-                <a:latin typeface="Courier"/>
-              </a:rPr>
-              <a:t>`code`</a:t>
-            </a:r>
-            <a:r>
-              <a:rPr/>
-              <a:t> → </a:t>
-            </a:r>
-            <a:r>
-              <a:rPr>
-                <a:latin typeface="Courier"/>
-              </a:rPr>
-              <a:t>code</a:t>
-            </a:r>
-          </a:p>
-          <a:p>
-            <a:pPr lvl="0" indent="0" marL="1270000"/>
-            <a:r>
-              <a:rPr sz="2000"/>
-              <a:t>Blockquote: </a:t>
-            </a:r>
-            <a:r>
-              <a:rPr sz="2000">
-                <a:latin typeface="Courier"/>
-              </a:rPr>
-              <a:t>&gt; Quote</a:t>
-            </a:r>
-            <a:r>
-              <a:rPr sz="2000"/>
-              <a:t> →</a:t>
-            </a:r>
-            <a:br/>
-            <a:r>
-              <a:rPr sz="2000"/>
-              <a:t>“This is a quote”</a:t>
+              <a:t>GitHub</a:t>
             </a:r>
           </a:p>
         </p:txBody>
@@ -8159,28 +8162,133 @@
             </a:pPr>
             <a:r>
               <a:rPr b="1"/>
-              <a:t>Figure with caption</a:t>
+              <a:t>Basic text formatting</a:t>
             </a:r>
           </a:p>
           <a:p>
             <a:pPr lvl="0"/>
             <a:r>
-              <a:rPr/>
-              <a:t>Centered image and caption below in italics</a:t>
-            </a:r>
-          </a:p>
-          <a:p>
-            <a:pPr lvl="0" indent="0" marL="0">
-              <a:buNone/>
-            </a:pPr>
-          </a:p>
-          <a:p>
-            <a:pPr lvl="0" indent="0" marL="0">
-              <a:buNone/>
-            </a:pPr>
-            <a:r>
-              <a:rPr/>
-              <a:t>This is a Penguin.</a:t>
+              <a:rPr b="1"/>
+              <a:t>Bold:</a:t>
+            </a:r>
+            <a:r>
+              <a:rPr/>
+              <a:t> </a:t>
+            </a:r>
+            <a:r>
+              <a:rPr>
+                <a:latin typeface="Courier"/>
+              </a:rPr>
+              <a:t>**bold**</a:t>
+            </a:r>
+            <a:r>
+              <a:rPr/>
+              <a:t> → </a:t>
+            </a:r>
+            <a:r>
+              <a:rPr b="1"/>
+              <a:t>bold</a:t>
+            </a:r>
+          </a:p>
+          <a:p>
+            <a:pPr lvl="0"/>
+            <a:r>
+              <a:rPr i="1"/>
+              <a:t>Italic:</a:t>
+            </a:r>
+            <a:r>
+              <a:rPr/>
+              <a:t> </a:t>
+            </a:r>
+            <a:r>
+              <a:rPr>
+                <a:latin typeface="Courier"/>
+              </a:rPr>
+              <a:t>*italic*</a:t>
+            </a:r>
+            <a:r>
+              <a:rPr/>
+              <a:t> → </a:t>
+            </a:r>
+            <a:r>
+              <a:rPr i="1"/>
+              <a:t>italic</a:t>
+            </a:r>
+          </a:p>
+          <a:p>
+            <a:pPr lvl="0"/>
+            <a:r>
+              <a:rPr strike="sngStrike"/>
+              <a:t>Strikethrough:</a:t>
+            </a:r>
+            <a:r>
+              <a:rPr/>
+              <a:t> </a:t>
+            </a:r>
+            <a:r>
+              <a:rPr>
+                <a:latin typeface="Courier"/>
+              </a:rPr>
+              <a:t>~~text~~</a:t>
+            </a:r>
+            <a:r>
+              <a:rPr/>
+              <a:t> → </a:t>
+            </a:r>
+            <a:r>
+              <a:rPr strike="sngStrike"/>
+              <a:t>text</a:t>
+            </a:r>
+          </a:p>
+          <a:p>
+            <a:pPr lvl="0"/>
+            <a:r>
+              <a:rPr>
+                <a:latin typeface="Courier"/>
+              </a:rPr>
+              <a:t>Inline code:</a:t>
+            </a:r>
+            <a:r>
+              <a:rPr/>
+              <a:t> </a:t>
+            </a:r>
+            <a:r>
+              <a:rPr>
+                <a:latin typeface="Courier"/>
+              </a:rPr>
+              <a:t>`code`</a:t>
+            </a:r>
+            <a:r>
+              <a:rPr/>
+              <a:t> → </a:t>
+            </a:r>
+            <a:r>
+              <a:rPr>
+                <a:latin typeface="Courier"/>
+              </a:rPr>
+              <a:t>code</a:t>
+            </a:r>
+          </a:p>
+          <a:p>
+            <a:pPr lvl="0" indent="0" marL="1270000"/>
+            <a:r>
+              <a:rPr sz="2000"/>
+              <a:t>Blockquote: </a:t>
+            </a:r>
+            <a:r>
+              <a:rPr sz="2000">
+                <a:latin typeface="Courier"/>
+              </a:rPr>
+              <a:t>&gt; Quote</a:t>
+            </a:r>
+            <a:r>
+              <a:rPr sz="2000"/>
+              <a:t> →</a:t>
+            </a:r>
+            <a:br/>
+            <a:r>
+              <a:rPr sz="2000"/>
+              <a:t>“This is a quote”</a:t>
             </a:r>
           </a:p>
         </p:txBody>
@@ -8230,7 +8338,14 @@
             </a:pPr>
             <a:r>
               <a:rPr b="1"/>
-              <a:t>Figure with bullet points</a:t>
+              <a:t>Figure with caption</a:t>
+            </a:r>
+          </a:p>
+          <a:p>
+            <a:pPr lvl="0"/>
+            <a:r>
+              <a:rPr/>
+              <a:t>Centered image and caption below in italics</a:t>
             </a:r>
           </a:p>
           <a:p>
@@ -8239,24 +8354,12 @@
             </a:pPr>
           </a:p>
           <a:p>
-            <a:pPr lvl="0"/>
-            <a:r>
-              <a:rPr/>
-              <a:t>First bullet point</a:t>
-            </a:r>
-          </a:p>
-          <a:p>
-            <a:pPr lvl="0"/>
-            <a:r>
-              <a:rPr/>
-              <a:t>Second bullet point</a:t>
-            </a:r>
-          </a:p>
-          <a:p>
-            <a:pPr lvl="0"/>
-            <a:r>
-              <a:rPr/>
-              <a:t>Third bullet point</a:t>
+            <a:pPr lvl="0" indent="0" marL="0">
+              <a:buNone/>
+            </a:pPr>
+            <a:r>
+              <a:rPr/>
+              <a:t>This is a Penguin.</a:t>
             </a:r>
           </a:p>
         </p:txBody>
@@ -8306,7 +8409,25 @@
             </a:pPr>
             <a:r>
               <a:rPr b="1"/>
-              <a:t>Questions from previous submodule</a:t>
+              <a:t>Prerequisites - bullet points</a:t>
+            </a:r>
+          </a:p>
+          <a:p>
+            <a:pPr lvl="0" indent="0" marL="1270000">
+              <a:buNone/>
+            </a:pPr>
+            <a:r>
+              <a:rPr sz="2000" b="1"/>
+              <a:t>Important</a:t>
+            </a:r>
+          </a:p>
+          <a:p>
+            <a:pPr lvl="0" indent="0" marL="1270000">
+              <a:buNone/>
+            </a:pPr>
+            <a:r>
+              <a:rPr sz="2000"/>
+              <a:t>Before completing this submodule, please carefully read about the necessary prerequisites.</a:t>
             </a:r>
           </a:p>
           <a:p>
@@ -8317,28 +8438,7 @@
             </a:r>
             <a:r>
               <a:rPr/>
-              <a:t>: This first slide is dedicated to clarifying questions from the previous submodule and/or to discuss assignments.</a:t>
-            </a:r>
-          </a:p>
-          <a:p>
-            <a:pPr lvl="0"/>
-            <a:r>
-              <a:rPr/>
-              <a:t>Additional slides may need to be added depending on the nature of the homework assignments.</a:t>
-            </a:r>
-          </a:p>
-          <a:p>
-            <a:pPr lvl="0"/>
-            <a:r>
-              <a:rPr/>
-              <a:t>Critical for the learning process to ensure that students are on the same page and have been able to achieve the learning goals of the previous workshop.</a:t>
-            </a:r>
-          </a:p>
-          <a:p>
-            <a:pPr lvl="0"/>
-            <a:r>
-              <a:rPr/>
-              <a:t>Not applicable if this set of slides corresponds to the first submodule of a new module.</a:t>
+              <a:t>: Outline any essential prerequisites (software, tools, other submodules etc.) here in bullet point format.</a:t>
             </a:r>
           </a:p>
         </p:txBody>
@@ -8388,7 +8488,33 @@
             </a:pPr>
             <a:r>
               <a:rPr b="1"/>
-              <a:t>Side-by-side figures</a:t>
+              <a:t>Figure with bullet points</a:t>
+            </a:r>
+          </a:p>
+          <a:p>
+            <a:pPr lvl="0" indent="0" marL="0">
+              <a:buNone/>
+            </a:pPr>
+          </a:p>
+          <a:p>
+            <a:pPr lvl="0"/>
+            <a:r>
+              <a:rPr/>
+              <a:t>First bullet point</a:t>
+            </a:r>
+          </a:p>
+          <a:p>
+            <a:pPr lvl="0"/>
+            <a:r>
+              <a:rPr/>
+              <a:t>Second bullet point</a:t>
+            </a:r>
+          </a:p>
+          <a:p>
+            <a:pPr lvl="0"/>
+            <a:r>
+              <a:rPr/>
+              <a:t>Third bullet point</a:t>
             </a:r>
           </a:p>
         </p:txBody>
@@ -8438,33 +8564,7 @@
             </a:pPr>
             <a:r>
               <a:rPr b="1"/>
-              <a:t>Stacked figures with text</a:t>
-            </a:r>
-          </a:p>
-          <a:p>
-            <a:pPr lvl="0" indent="0" marL="0">
-              <a:buNone/>
-            </a:pPr>
-          </a:p>
-          <a:p>
-            <a:pPr lvl="0"/>
-            <a:r>
-              <a:rPr/>
-              <a:t>First bullet point</a:t>
-            </a:r>
-          </a:p>
-          <a:p>
-            <a:pPr lvl="0"/>
-            <a:r>
-              <a:rPr/>
-              <a:t>Second bullet point</a:t>
-            </a:r>
-          </a:p>
-          <a:p>
-            <a:pPr lvl="0"/>
-            <a:r>
-              <a:rPr/>
-              <a:t>Third bullet point</a:t>
+              <a:t>Side-by-side figures</a:t>
             </a:r>
           </a:p>
         </p:txBody>
@@ -8514,58 +8614,33 @@
             </a:pPr>
             <a:r>
               <a:rPr b="1"/>
-              <a:t>Two-column text slide</a:t>
+              <a:t>Stacked figures with text</a:t>
             </a:r>
           </a:p>
           <a:p>
             <a:pPr lvl="0" indent="0" marL="0">
               <a:buNone/>
             </a:pPr>
-            <a:r>
-              <a:rPr b="1"/>
-              <a:t>Column 1</a:t>
-            </a:r>
-          </a:p>
-          <a:p>
-            <a:pPr lvl="0" indent="0" marL="0">
-              <a:buNone/>
-            </a:pPr>
-            <a:r>
-              <a:rPr/>
-              <a:t>Lorem ipsum dolor sit amet, consectetur adipiscing elit.</a:t>
-            </a:r>
-            <a:br/>
-            <a:r>
-              <a:rPr/>
-              <a:t>Vivamus lacinia odio vitae vestibulum vestibulum.</a:t>
-            </a:r>
-            <a:br/>
-            <a:r>
-              <a:rPr/>
-              <a:t>Cras venenatis euismod malesuada.</a:t>
-            </a:r>
-          </a:p>
-          <a:p>
-            <a:pPr lvl="0" indent="0" marL="0">
-              <a:buNone/>
-            </a:pPr>
-            <a:r>
-              <a:rPr b="1"/>
-              <a:t>Column 2</a:t>
-            </a:r>
-          </a:p>
-          <a:p>
-            <a:pPr lvl="0" indent="0" marL="0">
-              <a:buNone/>
-            </a:pPr>
-            <a:r>
-              <a:rPr/>
-              <a:t>Sed do eiusmod tempor incididunt ut labore et dolore magna aliqua.</a:t>
-            </a:r>
-            <a:br/>
-            <a:r>
-              <a:rPr/>
-              <a:t>Ut enim ad minim veniam, quis nostrud exercitation ullamco laboris.</a:t>
+          </a:p>
+          <a:p>
+            <a:pPr lvl="0"/>
+            <a:r>
+              <a:rPr/>
+              <a:t>First bullet point</a:t>
+            </a:r>
+          </a:p>
+          <a:p>
+            <a:pPr lvl="0"/>
+            <a:r>
+              <a:rPr/>
+              <a:t>Second bullet point</a:t>
+            </a:r>
+          </a:p>
+          <a:p>
+            <a:pPr lvl="0"/>
+            <a:r>
+              <a:rPr/>
+              <a:t>Third bullet point</a:t>
             </a:r>
           </a:p>
         </p:txBody>
@@ -8615,7 +8690,7 @@
             </a:pPr>
             <a:r>
               <a:rPr b="1"/>
-              <a:t>Three-column text slide</a:t>
+              <a:t>Two-column text slide</a:t>
             </a:r>
           </a:p>
           <a:p>
@@ -8640,6 +8715,11 @@
               <a:rPr/>
               <a:t>Vivamus lacinia odio vitae vestibulum vestibulum.</a:t>
             </a:r>
+            <a:br/>
+            <a:r>
+              <a:rPr/>
+              <a:t>Cras venenatis euismod malesuada.</a:t>
+            </a:r>
           </a:p>
           <a:p>
             <a:pPr lvl="0" indent="0" marL="0">
@@ -8662,24 +8742,6 @@
             <a:r>
               <a:rPr/>
               <a:t>Ut enim ad minim veniam, quis nostrud exercitation ullamco laboris.</a:t>
-            </a:r>
-          </a:p>
-          <a:p>
-            <a:pPr lvl="0" indent="0" marL="0">
-              <a:buNone/>
-            </a:pPr>
-            <a:r>
-              <a:rPr b="1"/>
-              <a:t>Column 3</a:t>
-            </a:r>
-          </a:p>
-          <a:p>
-            <a:pPr lvl="0" indent="0" marL="0">
-              <a:buNone/>
-            </a:pPr>
-            <a:r>
-              <a:rPr/>
-              <a:t>Duis aute irure dolor in reprehenderit in voluptate velit esse cillum dolore eu fugiat nulla pariatur.</a:t>
             </a:r>
           </a:p>
         </p:txBody>
@@ -8708,12 +8770,12 @@
       </p:grpSpPr>
       <p:sp>
         <p:nvSpPr>
-          <p:cNvPr id="4" name="Text Placeholder 3"/>
-          <p:cNvSpPr>
-            <a:spLocks noGrp="1"/>
-          </p:cNvSpPr>
-          <p:nvPr>
-            <p:ph idx="2" sz="half" type="body"/>
+          <p:cNvPr id="3" name="Content Placeholder 2"/>
+          <p:cNvSpPr>
+            <a:spLocks noGrp="1"/>
+          </p:cNvSpPr>
+          <p:nvPr>
+            <p:ph idx="1"/>
           </p:nvPr>
         </p:nvSpPr>
         <p:spPr/>
@@ -8729,278 +8791,75 @@
             </a:pPr>
             <a:r>
               <a:rPr b="1"/>
-              <a:t>Simple table</a:t>
-            </a:r>
-          </a:p>
-        </p:txBody>
-      </p:sp>
-      <p:graphicFrame>
-        <p:nvGraphicFramePr>
-          <p:cNvPr id="6" name="Content Placeholder 5"/>
-          <p:cNvGraphicFramePr>
-            <a:graphicFrameLocks noGrp="1"/>
-          </p:cNvGraphicFramePr>
-          <p:nvPr>
-            <p:ph idx="1"/>
-          </p:nvPr>
-        </p:nvGraphicFramePr>
-        <p:xfrm>
-          <a:off x="3568700" y="203200"/>
-          <a:ext cx="5105400" cy="4381500"/>
-        </p:xfrm>
-        <a:graphic>
-          <a:graphicData uri="http://schemas.openxmlformats.org/drawingml/2006/table">
-            <a:tbl>
-              <a:tblPr firstRow="1" bandRow="1">
-                <a:tableStyleId>{5C22544A-7EE6-4342-B048-85BDC9FD1C3A}</a:tableStyleId>
-              </a:tblPr>
-              <a:tblGrid>
-                <a:gridCol w="1701800"/>
-                <a:gridCol w="1701800"/>
-                <a:gridCol w="1701800"/>
-              </a:tblGrid>
-              <a:tr h="0">
-                <a:tc>
-                  <a:txBody>
-                    <a:bodyPr/>
-                    <a:lstStyle/>
-                    <a:p>
-                      <a:pPr lvl="0" indent="0" marL="0">
-                        <a:buNone/>
-                      </a:pPr>
-                      <a:r>
-                        <a:rPr/>
-                        <a:t>Column 1</a:t>
-                      </a:r>
-                    </a:p>
-                  </a:txBody>
-                  <a:tcPr/>
-                </a:tc>
-                <a:tc>
-                  <a:txBody>
-                    <a:bodyPr/>
-                    <a:lstStyle/>
-                    <a:p>
-                      <a:pPr lvl="0" indent="0" marL="0">
-                        <a:buNone/>
-                      </a:pPr>
-                      <a:r>
-                        <a:rPr/>
-                        <a:t>Column 2</a:t>
-                      </a:r>
-                    </a:p>
-                  </a:txBody>
-                  <a:tcPr/>
-                </a:tc>
-                <a:tc>
-                  <a:txBody>
-                    <a:bodyPr/>
-                    <a:lstStyle/>
-                    <a:p>
-                      <a:pPr lvl="0" indent="0" marL="0">
-                        <a:buNone/>
-                      </a:pPr>
-                      <a:r>
-                        <a:rPr/>
-                        <a:t>Column 3</a:t>
-                      </a:r>
-                    </a:p>
-                  </a:txBody>
-                  <a:tcPr/>
-                </a:tc>
-              </a:tr>
-              <a:tr h="0">
-                <a:tc>
-                  <a:txBody>
-                    <a:bodyPr/>
-                    <a:lstStyle/>
-                    <a:p>
-                      <a:pPr lvl="0" indent="0" marL="0">
-                        <a:buNone/>
-                      </a:pPr>
-                      <a:r>
-                        <a:rPr/>
-                        <a:t>Row 1 Cell</a:t>
-                      </a:r>
-                    </a:p>
-                  </a:txBody>
-                </a:tc>
-                <a:tc>
-                  <a:txBody>
-                    <a:bodyPr/>
-                    <a:lstStyle/>
-                    <a:p>
-                      <a:pPr lvl="0" indent="0" marL="0">
-                        <a:buNone/>
-                      </a:pPr>
-                      <a:r>
-                        <a:rPr/>
-                        <a:t>Row 1 Cell</a:t>
-                      </a:r>
-                    </a:p>
-                  </a:txBody>
-                </a:tc>
-                <a:tc>
-                  <a:txBody>
-                    <a:bodyPr/>
-                    <a:lstStyle/>
-                    <a:p>
-                      <a:pPr lvl="0" indent="0" marL="0">
-                        <a:buNone/>
-                      </a:pPr>
-                      <a:r>
-                        <a:rPr/>
-                        <a:t>Row 1 Cell</a:t>
-                      </a:r>
-                    </a:p>
-                  </a:txBody>
-                </a:tc>
-              </a:tr>
-              <a:tr h="0">
-                <a:tc>
-                  <a:txBody>
-                    <a:bodyPr/>
-                    <a:lstStyle/>
-                    <a:p>
-                      <a:pPr lvl="0" indent="0" marL="0">
-                        <a:buNone/>
-                      </a:pPr>
-                      <a:r>
-                        <a:rPr/>
-                        <a:t>Row 2 Cell</a:t>
-                      </a:r>
-                    </a:p>
-                  </a:txBody>
-                </a:tc>
-                <a:tc>
-                  <a:txBody>
-                    <a:bodyPr/>
-                    <a:lstStyle/>
-                    <a:p>
-                      <a:pPr lvl="0" indent="0" marL="0">
-                        <a:buNone/>
-                      </a:pPr>
-                      <a:r>
-                        <a:rPr/>
-                        <a:t>Row 2 Cell</a:t>
-                      </a:r>
-                    </a:p>
-                  </a:txBody>
-                </a:tc>
-                <a:tc>
-                  <a:txBody>
-                    <a:bodyPr/>
-                    <a:lstStyle/>
-                    <a:p>
-                      <a:pPr lvl="0" indent="0" marL="0">
-                        <a:buNone/>
-                      </a:pPr>
-                      <a:r>
-                        <a:rPr/>
-                        <a:t>Row 2 Cell</a:t>
-                      </a:r>
-                    </a:p>
-                  </a:txBody>
-                </a:tc>
-              </a:tr>
-              <a:tr h="0">
-                <a:tc>
-                  <a:txBody>
-                    <a:bodyPr/>
-                    <a:lstStyle/>
-                    <a:p>
-                      <a:pPr lvl="0" indent="0" marL="0">
-                        <a:buNone/>
-                      </a:pPr>
-                      <a:r>
-                        <a:rPr/>
-                        <a:t>Row 3 Cell</a:t>
-                      </a:r>
-                    </a:p>
-                  </a:txBody>
-                </a:tc>
-                <a:tc>
-                  <a:txBody>
-                    <a:bodyPr/>
-                    <a:lstStyle/>
-                    <a:p>
-                      <a:pPr lvl="0" indent="0" marL="0">
-                        <a:buNone/>
-                      </a:pPr>
-                      <a:r>
-                        <a:rPr/>
-                        <a:t>Row 3 Cell</a:t>
-                      </a:r>
-                    </a:p>
-                  </a:txBody>
-                </a:tc>
-                <a:tc>
-                  <a:txBody>
-                    <a:bodyPr/>
-                    <a:lstStyle/>
-                    <a:p>
-                      <a:pPr lvl="0" indent="0" marL="0">
-                        <a:buNone/>
-                      </a:pPr>
-                      <a:r>
-                        <a:rPr/>
-                        <a:t>Row 3 Cell</a:t>
-                      </a:r>
-                    </a:p>
-                  </a:txBody>
-                </a:tc>
-              </a:tr>
-              <a:tr h="0">
-                <a:tc>
-                  <a:txBody>
-                    <a:bodyPr/>
-                    <a:lstStyle/>
-                    <a:p>
-                      <a:pPr lvl="0" indent="0" marL="0">
-                        <a:buNone/>
-                      </a:pPr>
-                      <a:r>
-                        <a:rPr/>
-                        <a:t>Row 4 Cell</a:t>
-                      </a:r>
-                    </a:p>
-                  </a:txBody>
-                </a:tc>
-                <a:tc>
-                  <a:txBody>
-                    <a:bodyPr/>
-                    <a:lstStyle/>
-                    <a:p>
-                      <a:pPr lvl="0" indent="0" marL="0">
-                        <a:buNone/>
-                      </a:pPr>
-                      <a:r>
-                        <a:rPr/>
-                        <a:t>Row 4 Cell</a:t>
-                      </a:r>
-                    </a:p>
-                  </a:txBody>
-                </a:tc>
-                <a:tc>
-                  <a:txBody>
-                    <a:bodyPr/>
-                    <a:lstStyle/>
-                    <a:p>
-                      <a:pPr lvl="0" indent="0" marL="0">
-                        <a:buNone/>
-                      </a:pPr>
-                      <a:r>
-                        <a:rPr/>
-                        <a:t>Row 4 Cell</a:t>
-                      </a:r>
-                    </a:p>
-                  </a:txBody>
-                </a:tc>
-              </a:tr>
-            </a:tbl>
-          </a:graphicData>
-        </a:graphic>
-      </p:graphicFrame>
+              <a:t>Three-column text slide</a:t>
+            </a:r>
+          </a:p>
+          <a:p>
+            <a:pPr lvl="0" indent="0" marL="0">
+              <a:buNone/>
+            </a:pPr>
+            <a:r>
+              <a:rPr b="1"/>
+              <a:t>Column 1</a:t>
+            </a:r>
+          </a:p>
+          <a:p>
+            <a:pPr lvl="0" indent="0" marL="0">
+              <a:buNone/>
+            </a:pPr>
+            <a:r>
+              <a:rPr/>
+              <a:t>Lorem ipsum dolor sit amet, consectetur adipiscing elit.</a:t>
+            </a:r>
+            <a:br/>
+            <a:r>
+              <a:rPr/>
+              <a:t>Vivamus lacinia odio vitae vestibulum vestibulum.</a:t>
+            </a:r>
+          </a:p>
+          <a:p>
+            <a:pPr lvl="0" indent="0" marL="0">
+              <a:buNone/>
+            </a:pPr>
+            <a:r>
+              <a:rPr b="1"/>
+              <a:t>Column 2</a:t>
+            </a:r>
+          </a:p>
+          <a:p>
+            <a:pPr lvl="0" indent="0" marL="0">
+              <a:buNone/>
+            </a:pPr>
+            <a:r>
+              <a:rPr/>
+              <a:t>Sed do eiusmod tempor incididunt ut labore et dolore magna aliqua.</a:t>
+            </a:r>
+            <a:br/>
+            <a:r>
+              <a:rPr/>
+              <a:t>Ut enim ad minim veniam, quis nostrud exercitation ullamco laboris.</a:t>
+            </a:r>
+          </a:p>
+          <a:p>
+            <a:pPr lvl="0" indent="0" marL="0">
+              <a:buNone/>
+            </a:pPr>
+            <a:r>
+              <a:rPr b="1"/>
+              <a:t>Column 3</a:t>
+            </a:r>
+          </a:p>
+          <a:p>
+            <a:pPr lvl="0" indent="0" marL="0">
+              <a:buNone/>
+            </a:pPr>
+            <a:r>
+              <a:rPr/>
+              <a:t>Duis aute irure dolor in reprehenderit in voluptate velit esse cillum dolore eu fugiat nulla pariatur.</a:t>
+            </a:r>
+          </a:p>
+        </p:txBody>
+      </p:sp>
     </p:spTree>
   </p:cSld>
 </p:sld>
@@ -9046,7 +8905,7 @@
             </a:pPr>
             <a:r>
               <a:rPr b="1"/>
-              <a:t>Complex table</a:t>
+              <a:t>Simple table</a:t>
             </a:r>
           </a:p>
         </p:txBody>
@@ -9342,12 +9201,12 @@
       </p:grpSpPr>
       <p:sp>
         <p:nvSpPr>
-          <p:cNvPr id="3" name="Content Placeholder 2"/>
-          <p:cNvSpPr>
-            <a:spLocks noGrp="1"/>
-          </p:cNvSpPr>
-          <p:nvPr>
-            <p:ph idx="1"/>
+          <p:cNvPr id="4" name="Text Placeholder 3"/>
+          <p:cNvSpPr>
+            <a:spLocks noGrp="1"/>
+          </p:cNvSpPr>
+          <p:nvPr>
+            <p:ph idx="2" sz="half" type="body"/>
           </p:nvPr>
         </p:nvSpPr>
         <p:spPr/>
@@ -9363,25 +9222,278 @@
             </a:pPr>
             <a:r>
               <a:rPr b="1"/>
-              <a:t>Task list</a:t>
-            </a:r>
-          </a:p>
-          <a:p>
-            <a:pPr lvl="0"/>
-            <a:r>
-              <a:rPr/>
-              <a:t>☒ Done</a:t>
-            </a:r>
-          </a:p>
-          <a:p>
-            <a:pPr lvl="0"/>
-            <a:r>
-              <a:rPr/>
-              <a:t>☐ To do</a:t>
-            </a:r>
-          </a:p>
-        </p:txBody>
-      </p:sp>
+              <a:t>Complex table</a:t>
+            </a:r>
+          </a:p>
+        </p:txBody>
+      </p:sp>
+      <p:graphicFrame>
+        <p:nvGraphicFramePr>
+          <p:cNvPr id="6" name="Content Placeholder 5"/>
+          <p:cNvGraphicFramePr>
+            <a:graphicFrameLocks noGrp="1"/>
+          </p:cNvGraphicFramePr>
+          <p:nvPr>
+            <p:ph idx="1"/>
+          </p:nvPr>
+        </p:nvGraphicFramePr>
+        <p:xfrm>
+          <a:off x="3568700" y="203200"/>
+          <a:ext cx="5105400" cy="4381500"/>
+        </p:xfrm>
+        <a:graphic>
+          <a:graphicData uri="http://schemas.openxmlformats.org/drawingml/2006/table">
+            <a:tbl>
+              <a:tblPr firstRow="1" bandRow="1">
+                <a:tableStyleId>{5C22544A-7EE6-4342-B048-85BDC9FD1C3A}</a:tableStyleId>
+              </a:tblPr>
+              <a:tblGrid>
+                <a:gridCol w="1701800"/>
+                <a:gridCol w="1701800"/>
+                <a:gridCol w="1701800"/>
+              </a:tblGrid>
+              <a:tr h="0">
+                <a:tc>
+                  <a:txBody>
+                    <a:bodyPr/>
+                    <a:lstStyle/>
+                    <a:p>
+                      <a:pPr lvl="0" indent="0" marL="0">
+                        <a:buNone/>
+                      </a:pPr>
+                      <a:r>
+                        <a:rPr/>
+                        <a:t>Column 1</a:t>
+                      </a:r>
+                    </a:p>
+                  </a:txBody>
+                  <a:tcPr/>
+                </a:tc>
+                <a:tc>
+                  <a:txBody>
+                    <a:bodyPr/>
+                    <a:lstStyle/>
+                    <a:p>
+                      <a:pPr lvl="0" indent="0" marL="0">
+                        <a:buNone/>
+                      </a:pPr>
+                      <a:r>
+                        <a:rPr/>
+                        <a:t>Column 2</a:t>
+                      </a:r>
+                    </a:p>
+                  </a:txBody>
+                  <a:tcPr/>
+                </a:tc>
+                <a:tc>
+                  <a:txBody>
+                    <a:bodyPr/>
+                    <a:lstStyle/>
+                    <a:p>
+                      <a:pPr lvl="0" indent="0" marL="0">
+                        <a:buNone/>
+                      </a:pPr>
+                      <a:r>
+                        <a:rPr/>
+                        <a:t>Column 3</a:t>
+                      </a:r>
+                    </a:p>
+                  </a:txBody>
+                  <a:tcPr/>
+                </a:tc>
+              </a:tr>
+              <a:tr h="0">
+                <a:tc>
+                  <a:txBody>
+                    <a:bodyPr/>
+                    <a:lstStyle/>
+                    <a:p>
+                      <a:pPr lvl="0" indent="0" marL="0">
+                        <a:buNone/>
+                      </a:pPr>
+                      <a:r>
+                        <a:rPr/>
+                        <a:t>Row 1 Cell</a:t>
+                      </a:r>
+                    </a:p>
+                  </a:txBody>
+                </a:tc>
+                <a:tc>
+                  <a:txBody>
+                    <a:bodyPr/>
+                    <a:lstStyle/>
+                    <a:p>
+                      <a:pPr lvl="0" indent="0" marL="0">
+                        <a:buNone/>
+                      </a:pPr>
+                      <a:r>
+                        <a:rPr/>
+                        <a:t>Row 1 Cell</a:t>
+                      </a:r>
+                    </a:p>
+                  </a:txBody>
+                </a:tc>
+                <a:tc>
+                  <a:txBody>
+                    <a:bodyPr/>
+                    <a:lstStyle/>
+                    <a:p>
+                      <a:pPr lvl="0" indent="0" marL="0">
+                        <a:buNone/>
+                      </a:pPr>
+                      <a:r>
+                        <a:rPr/>
+                        <a:t>Row 1 Cell</a:t>
+                      </a:r>
+                    </a:p>
+                  </a:txBody>
+                </a:tc>
+              </a:tr>
+              <a:tr h="0">
+                <a:tc>
+                  <a:txBody>
+                    <a:bodyPr/>
+                    <a:lstStyle/>
+                    <a:p>
+                      <a:pPr lvl="0" indent="0" marL="0">
+                        <a:buNone/>
+                      </a:pPr>
+                      <a:r>
+                        <a:rPr/>
+                        <a:t>Row 2 Cell</a:t>
+                      </a:r>
+                    </a:p>
+                  </a:txBody>
+                </a:tc>
+                <a:tc>
+                  <a:txBody>
+                    <a:bodyPr/>
+                    <a:lstStyle/>
+                    <a:p>
+                      <a:pPr lvl="0" indent="0" marL="0">
+                        <a:buNone/>
+                      </a:pPr>
+                      <a:r>
+                        <a:rPr/>
+                        <a:t>Row 2 Cell</a:t>
+                      </a:r>
+                    </a:p>
+                  </a:txBody>
+                </a:tc>
+                <a:tc>
+                  <a:txBody>
+                    <a:bodyPr/>
+                    <a:lstStyle/>
+                    <a:p>
+                      <a:pPr lvl="0" indent="0" marL="0">
+                        <a:buNone/>
+                      </a:pPr>
+                      <a:r>
+                        <a:rPr/>
+                        <a:t>Row 2 Cell</a:t>
+                      </a:r>
+                    </a:p>
+                  </a:txBody>
+                </a:tc>
+              </a:tr>
+              <a:tr h="0">
+                <a:tc>
+                  <a:txBody>
+                    <a:bodyPr/>
+                    <a:lstStyle/>
+                    <a:p>
+                      <a:pPr lvl="0" indent="0" marL="0">
+                        <a:buNone/>
+                      </a:pPr>
+                      <a:r>
+                        <a:rPr/>
+                        <a:t>Row 3 Cell</a:t>
+                      </a:r>
+                    </a:p>
+                  </a:txBody>
+                </a:tc>
+                <a:tc>
+                  <a:txBody>
+                    <a:bodyPr/>
+                    <a:lstStyle/>
+                    <a:p>
+                      <a:pPr lvl="0" indent="0" marL="0">
+                        <a:buNone/>
+                      </a:pPr>
+                      <a:r>
+                        <a:rPr/>
+                        <a:t>Row 3 Cell</a:t>
+                      </a:r>
+                    </a:p>
+                  </a:txBody>
+                </a:tc>
+                <a:tc>
+                  <a:txBody>
+                    <a:bodyPr/>
+                    <a:lstStyle/>
+                    <a:p>
+                      <a:pPr lvl="0" indent="0" marL="0">
+                        <a:buNone/>
+                      </a:pPr>
+                      <a:r>
+                        <a:rPr/>
+                        <a:t>Row 3 Cell</a:t>
+                      </a:r>
+                    </a:p>
+                  </a:txBody>
+                </a:tc>
+              </a:tr>
+              <a:tr h="0">
+                <a:tc>
+                  <a:txBody>
+                    <a:bodyPr/>
+                    <a:lstStyle/>
+                    <a:p>
+                      <a:pPr lvl="0" indent="0" marL="0">
+                        <a:buNone/>
+                      </a:pPr>
+                      <a:r>
+                        <a:rPr/>
+                        <a:t>Row 4 Cell</a:t>
+                      </a:r>
+                    </a:p>
+                  </a:txBody>
+                </a:tc>
+                <a:tc>
+                  <a:txBody>
+                    <a:bodyPr/>
+                    <a:lstStyle/>
+                    <a:p>
+                      <a:pPr lvl="0" indent="0" marL="0">
+                        <a:buNone/>
+                      </a:pPr>
+                      <a:r>
+                        <a:rPr/>
+                        <a:t>Row 4 Cell</a:t>
+                      </a:r>
+                    </a:p>
+                  </a:txBody>
+                </a:tc>
+                <a:tc>
+                  <a:txBody>
+                    <a:bodyPr/>
+                    <a:lstStyle/>
+                    <a:p>
+                      <a:pPr lvl="0" indent="0" marL="0">
+                        <a:buNone/>
+                      </a:pPr>
+                      <a:r>
+                        <a:rPr/>
+                        <a:t>Row 4 Cell</a:t>
+                      </a:r>
+                    </a:p>
+                  </a:txBody>
+                </a:tc>
+              </a:tr>
+            </a:tbl>
+          </a:graphicData>
+        </a:graphic>
+      </p:graphicFrame>
     </p:spTree>
   </p:cSld>
 </p:sld>
@@ -9427,16 +9539,21 @@
             </a:pPr>
             <a:r>
               <a:rPr b="1"/>
-              <a:t>Embedding videos</a:t>
-            </a:r>
-          </a:p>
-          <a:p>
-            <a:pPr lvl="0" indent="0" marL="0">
-              <a:buNone/>
-            </a:pPr>
-            <a:r>
-              <a:rPr/>
-              <a:t> </a:t>
+              <a:t>Task list</a:t>
+            </a:r>
+          </a:p>
+          <a:p>
+            <a:pPr lvl="0"/>
+            <a:r>
+              <a:rPr/>
+              <a:t>☒ Done</a:t>
+            </a:r>
+          </a:p>
+          <a:p>
+            <a:pPr lvl="0"/>
+            <a:r>
+              <a:rPr/>
+              <a:t>☐ To do</a:t>
             </a:r>
           </a:p>
         </p:txBody>
@@ -9447,6 +9564,65 @@
 </file>
 
 <file path=ppt/slides/slide48.xml><?xml version="1.0" encoding="utf-8"?>
+<p:sld xmlns:a="http://schemas.openxmlformats.org/drawingml/2006/main" xmlns:r="http://schemas.openxmlformats.org/officeDocument/2006/relationships" xmlns:p="http://schemas.openxmlformats.org/presentationml/2006/main">
+  <p:cSld>
+    <p:spTree>
+      <p:nvGrpSpPr>
+        <p:cNvPr id="1" name=""/>
+        <p:cNvGrpSpPr/>
+        <p:nvPr/>
+      </p:nvGrpSpPr>
+      <p:grpSpPr>
+        <a:xfrm>
+          <a:off x="0" y="0"/>
+          <a:ext cx="0" cy="0"/>
+          <a:chOff x="0" y="0"/>
+          <a:chExt cx="0" cy="0"/>
+        </a:xfrm>
+      </p:grpSpPr>
+      <p:sp>
+        <p:nvSpPr>
+          <p:cNvPr id="3" name="Content Placeholder 2"/>
+          <p:cNvSpPr>
+            <a:spLocks noGrp="1"/>
+          </p:cNvSpPr>
+          <p:nvPr>
+            <p:ph idx="1"/>
+          </p:nvPr>
+        </p:nvSpPr>
+        <p:spPr/>
+        <p:txBody>
+          <a:bodyPr/>
+          <a:lstStyle/>
+          <a:p>
+            <a:pPr lvl="0" indent="0" marL="0">
+              <a:spcBef>
+                <a:spcPts val="3000"/>
+              </a:spcBef>
+              <a:buNone/>
+            </a:pPr>
+            <a:r>
+              <a:rPr b="1"/>
+              <a:t>Embedding videos</a:t>
+            </a:r>
+          </a:p>
+          <a:p>
+            <a:pPr lvl="0" indent="0" marL="0">
+              <a:buNone/>
+            </a:pPr>
+            <a:r>
+              <a:rPr/>
+              <a:t> </a:t>
+            </a:r>
+          </a:p>
+        </p:txBody>
+      </p:sp>
+    </p:spTree>
+  </p:cSld>
+</p:sld>
+</file>
+
+<file path=ppt/slides/slide49.xml><?xml version="1.0" encoding="utf-8"?>
 <p:sld xmlns:a="http://schemas.openxmlformats.org/drawingml/2006/main" xmlns:r="http://schemas.openxmlformats.org/officeDocument/2006/relationships" xmlns:p="http://schemas.openxmlformats.org/presentationml/2006/main">
   <p:cSld>
     <p:spTree>
@@ -9712,164 +9888,6 @@
 </p:sld>
 </file>
 
-<file path=ppt/slides/slide49.xml><?xml version="1.0" encoding="utf-8"?>
-<p:sld xmlns:a="http://schemas.openxmlformats.org/drawingml/2006/main" xmlns:r="http://schemas.openxmlformats.org/officeDocument/2006/relationships" xmlns:p="http://schemas.openxmlformats.org/presentationml/2006/main">
-  <p:cSld>
-    <p:spTree>
-      <p:nvGrpSpPr>
-        <p:cNvPr id="1" name=""/>
-        <p:cNvGrpSpPr/>
-        <p:nvPr/>
-      </p:nvGrpSpPr>
-      <p:grpSpPr>
-        <a:xfrm>
-          <a:off x="0" y="0"/>
-          <a:ext cx="0" cy="0"/>
-          <a:chOff x="0" y="0"/>
-          <a:chExt cx="0" cy="0"/>
-        </a:xfrm>
-      </p:grpSpPr>
-      <p:sp>
-        <p:nvSpPr>
-          <p:cNvPr id="3" name="Content Placeholder 2"/>
-          <p:cNvSpPr>
-            <a:spLocks noGrp="1"/>
-          </p:cNvSpPr>
-          <p:nvPr>
-            <p:ph idx="1"/>
-          </p:nvPr>
-        </p:nvSpPr>
-        <p:spPr/>
-        <p:txBody>
-          <a:bodyPr/>
-          <a:lstStyle/>
-          <a:p>
-            <a:pPr lvl="0" indent="0" marL="0">
-              <a:spcBef>
-                <a:spcPts val="3000"/>
-              </a:spcBef>
-              <a:buNone/>
-            </a:pPr>
-            <a:r>
-              <a:rPr b="1"/>
-              <a:t>Attribution and license details</a:t>
-            </a:r>
-          </a:p>
-          <a:p>
-            <a:pPr lvl="0"/>
-            <a:r>
-              <a:rPr/>
-              <a:t>This slide should contain information about the license and attribution details of this current set of slides.</a:t>
-            </a:r>
-          </a:p>
-          <a:p>
-            <a:pPr lvl="0"/>
-            <a:r>
-              <a:rPr/>
-              <a:t>The default for the created materials is </a:t>
-            </a:r>
-            <a:r>
-              <a:rPr>
-                <a:hlinkClick r:id="rId2"/>
-              </a:rPr>
-              <a:t>CC-BY-SA 4.0</a:t>
-            </a:r>
-          </a:p>
-          <a:p>
-            <a:pPr lvl="1"/>
-            <a:r>
-              <a:rPr/>
-              <a:t>= Creative Commons license that allows others to </a:t>
-            </a:r>
-            <a:r>
-              <a:rPr b="1"/>
-              <a:t>share, adapt, and build upon</a:t>
-            </a:r>
-            <a:r>
-              <a:rPr/>
-              <a:t> the original work</a:t>
-            </a:r>
-          </a:p>
-          <a:p>
-            <a:pPr lvl="1"/>
-            <a:r>
-              <a:rPr b="1"/>
-              <a:t>only</a:t>
-            </a:r>
-            <a:r>
-              <a:rPr/>
-              <a:t> if they attribute the creator and also share their new work under the </a:t>
-            </a:r>
-            <a:r>
-              <a:rPr b="1"/>
-              <a:t>same terms</a:t>
-            </a:r>
-          </a:p>
-          <a:p>
-            <a:pPr lvl="1"/>
-            <a:r>
-              <a:rPr/>
-              <a:t>allows for both </a:t>
-            </a:r>
-            <a:r>
-              <a:rPr b="1"/>
-              <a:t>commercial and non-commercial</a:t>
-            </a:r>
-            <a:r>
-              <a:rPr/>
-              <a:t> use of the licensed material</a:t>
-            </a:r>
-          </a:p>
-          <a:p>
-            <a:pPr lvl="0"/>
-            <a:r>
-              <a:rPr/>
-              <a:t>Components of attributions:</a:t>
-            </a:r>
-          </a:p>
-          <a:p>
-            <a:pPr lvl="1"/>
-            <a:r>
-              <a:rPr>
-                <a:latin typeface="Courier"/>
-              </a:rPr>
-              <a:t>Title</a:t>
-            </a:r>
-          </a:p>
-          <a:p>
-            <a:pPr lvl="1"/>
-            <a:r>
-              <a:rPr>
-                <a:latin typeface="Courier"/>
-              </a:rPr>
-              <a:t>Author</a:t>
-            </a:r>
-          </a:p>
-          <a:p>
-            <a:pPr lvl="1"/>
-            <a:r>
-              <a:rPr>
-                <a:latin typeface="Courier"/>
-              </a:rPr>
-              <a:t>Source</a:t>
-            </a:r>
-          </a:p>
-          <a:p>
-            <a:pPr lvl="1"/>
-            <a:r>
-              <a:rPr>
-                <a:latin typeface="Courier"/>
-              </a:rPr>
-              <a:t>License</a:t>
-            </a:r>
-          </a:p>
-        </p:txBody>
-      </p:sp>
-    </p:spTree>
-  </p:cSld>
-</p:sld>
-</file>
-
 <file path=ppt/slides/slide5.xml><?xml version="1.0" encoding="utf-8"?>
 <p:sld xmlns:a="http://schemas.openxmlformats.org/drawingml/2006/main" xmlns:r="http://schemas.openxmlformats.org/officeDocument/2006/relationships" xmlns:p="http://schemas.openxmlformats.org/presentationml/2006/main">
   <p:cSld>
@@ -9910,7 +9928,7 @@
             </a:pPr>
             <a:r>
               <a:rPr b="1"/>
-              <a:t>Before we start: Survey time!</a:t>
+              <a:t>Questions from previous submodule</a:t>
             </a:r>
           </a:p>
           <a:p>
@@ -9921,14 +9939,28 @@
             </a:r>
             <a:r>
               <a:rPr/>
-              <a:t>: The pre-submodule survey serves to examine students’ prior knowledge about the sumodule’s topic.</a:t>
+              <a:t>: This first slide is dedicated to clarifying questions from the previous submodule and/or to discuss assignments.</a:t>
             </a:r>
           </a:p>
           <a:p>
             <a:pPr lvl="0"/>
             <a:r>
               <a:rPr/>
-              <a:t>Use free survey software such as or other survey software (particify, formR) to establish the following questions (shown on separate slides).</a:t>
+              <a:t>Additional slides may need to be added depending on the nature of the homework assignments.</a:t>
+            </a:r>
+          </a:p>
+          <a:p>
+            <a:pPr lvl="0"/>
+            <a:r>
+              <a:rPr/>
+              <a:t>Critical for the learning process to ensure that students are on the same page and have been able to achieve the learning goals of the previous workshop.</a:t>
+            </a:r>
+          </a:p>
+          <a:p>
+            <a:pPr lvl="0"/>
+            <a:r>
+              <a:rPr/>
+              <a:t>Not applicable if this set of slides corresponds to the first submodule of a new module.</a:t>
             </a:r>
           </a:p>
         </p:txBody>
@@ -9978,36 +10010,203 @@
             </a:pPr>
             <a:r>
               <a:rPr b="1"/>
-              <a:t>Example attribution (for previous slide)</a:t>
-            </a:r>
-          </a:p>
-          <a:p>
-            <a:pPr lvl="0" indent="0" marL="0">
-              <a:buNone/>
-            </a:pPr>
-            <a:r>
-              <a:rPr/>
-              <a:t>“</a:t>
+              <a:t>Attribution and license details</a:t>
+            </a:r>
+          </a:p>
+          <a:p>
+            <a:pPr lvl="0"/>
+            <a:r>
+              <a:rPr/>
+              <a:t>This slide should contain information about the license and attribution details of this current set of slides.</a:t>
+            </a:r>
+          </a:p>
+          <a:p>
+            <a:pPr lvl="0"/>
+            <a:r>
+              <a:rPr/>
+              <a:t>The default for the created materials is </a:t>
             </a:r>
             <a:r>
               <a:rPr>
                 <a:hlinkClick r:id="rId2"/>
               </a:rPr>
-              <a:t>Tutorial template for student track</a:t>
-            </a:r>
-            <a:r>
-              <a:rPr/>
-              <a:t>” by Sarah von Grebmer is licensed under </a:t>
-            </a:r>
+              <a:t>CC-BY-SA 4.0</a:t>
+            </a:r>
+          </a:p>
+          <a:p>
+            <a:pPr lvl="1"/>
+            <a:r>
+              <a:rPr/>
+              <a:t>= Creative Commons license that allows others to </a:t>
+            </a:r>
+            <a:r>
+              <a:rPr b="1"/>
+              <a:t>share, adapt, and build upon</a:t>
+            </a:r>
+            <a:r>
+              <a:rPr/>
+              <a:t> the original work</a:t>
+            </a:r>
+          </a:p>
+          <a:p>
+            <a:pPr lvl="1"/>
+            <a:r>
+              <a:rPr b="1"/>
+              <a:t>only</a:t>
+            </a:r>
+            <a:r>
+              <a:rPr/>
+              <a:t> if they attribute the creator and also share their new work under the </a:t>
+            </a:r>
+            <a:r>
+              <a:rPr b="1"/>
+              <a:t>same terms</a:t>
+            </a:r>
+          </a:p>
+          <a:p>
+            <a:pPr lvl="1"/>
+            <a:r>
+              <a:rPr/>
+              <a:t>allows for both </a:t>
+            </a:r>
+            <a:r>
+              <a:rPr b="1"/>
+              <a:t>commercial and non-commercial</a:t>
+            </a:r>
+            <a:r>
+              <a:rPr/>
+              <a:t> use of the licensed material</a:t>
+            </a:r>
+          </a:p>
+          <a:p>
+            <a:pPr lvl="0"/>
+            <a:r>
+              <a:rPr/>
+              <a:t>Components of attributions:</a:t>
+            </a:r>
+          </a:p>
+          <a:p>
+            <a:pPr lvl="1"/>
             <a:r>
               <a:rPr>
-                <a:hlinkClick r:id="rId3"/>
+                <a:latin typeface="Courier"/>
               </a:rPr>
-              <a:t>CC-BY-SA 4.0</a:t>
-            </a:r>
-            <a:r>
-              <a:rPr/>
-              <a:t>.</a:t>
+              <a:t>Title</a:t>
+            </a:r>
+          </a:p>
+          <a:p>
+            <a:pPr lvl="1"/>
+            <a:r>
+              <a:rPr>
+                <a:latin typeface="Courier"/>
+              </a:rPr>
+              <a:t>Author</a:t>
+            </a:r>
+          </a:p>
+          <a:p>
+            <a:pPr lvl="1"/>
+            <a:r>
+              <a:rPr>
+                <a:latin typeface="Courier"/>
+              </a:rPr>
+              <a:t>Source</a:t>
+            </a:r>
+          </a:p>
+          <a:p>
+            <a:pPr lvl="1"/>
+            <a:r>
+              <a:rPr>
+                <a:latin typeface="Courier"/>
+              </a:rPr>
+              <a:t>License</a:t>
+            </a:r>
+          </a:p>
+        </p:txBody>
+      </p:sp>
+    </p:spTree>
+  </p:cSld>
+</p:sld>
+</file>
+
+<file path=ppt/slides/slide51.xml><?xml version="1.0" encoding="utf-8"?>
+<p:sld xmlns:a="http://schemas.openxmlformats.org/drawingml/2006/main" xmlns:r="http://schemas.openxmlformats.org/officeDocument/2006/relationships" xmlns:p="http://schemas.openxmlformats.org/presentationml/2006/main">
+  <p:cSld>
+    <p:spTree>
+      <p:nvGrpSpPr>
+        <p:cNvPr id="1" name=""/>
+        <p:cNvGrpSpPr/>
+        <p:nvPr/>
+      </p:nvGrpSpPr>
+      <p:grpSpPr>
+        <a:xfrm>
+          <a:off x="0" y="0"/>
+          <a:ext cx="0" cy="0"/>
+          <a:chOff x="0" y="0"/>
+          <a:chExt cx="0" cy="0"/>
+        </a:xfrm>
+      </p:grpSpPr>
+      <p:sp>
+        <p:nvSpPr>
+          <p:cNvPr id="3" name="Content Placeholder 2"/>
+          <p:cNvSpPr>
+            <a:spLocks noGrp="1"/>
+          </p:cNvSpPr>
+          <p:nvPr>
+            <p:ph idx="1"/>
+          </p:nvPr>
+        </p:nvSpPr>
+        <p:spPr/>
+        <p:txBody>
+          <a:bodyPr/>
+          <a:lstStyle/>
+          <a:p>
+            <a:pPr lvl="0" indent="0" marL="0">
+              <a:spcBef>
+                <a:spcPts val="3000"/>
+              </a:spcBef>
+              <a:buNone/>
+            </a:pPr>
+            <a:r>
+              <a:rPr b="1"/>
+              <a:t>Credit Statement</a:t>
+            </a:r>
+          </a:p>
+          <a:p>
+            <a:pPr lvl="0" indent="0" marL="0">
+              <a:buNone/>
+            </a:pPr>
+            <a:r>
+              <a:rPr/>
+              <a:t>Possible roles using the CRediT contribition system:</a:t>
+            </a:r>
+          </a:p>
+          <a:p>
+            <a:pPr lvl="0" indent="0" marL="0">
+              <a:buNone/>
+            </a:pPr>
+            <a:r>
+              <a:rPr b="1"/>
+              <a:t>Name main content creator</a:t>
+            </a:r>
+            <a:r>
+              <a:rPr/>
+              <a:t>: Conceptualization, Software, Writing - Original Draft, Visualization. </a:t>
+            </a:r>
+            <a:r>
+              <a:rPr b="1"/>
+              <a:t>Sara Lil Middleton</a:t>
+            </a:r>
+            <a:r>
+              <a:rPr/>
+              <a:t>: Writing - Review &amp; Editing, Supervision. </a:t>
+            </a:r>
+            <a:r>
+              <a:rPr b="1"/>
+              <a:t>Sarah von Grebmer zu Wolfsthurn</a:t>
+            </a:r>
+            <a:r>
+              <a:rPr/>
+              <a:t>: Conceptualisation, Writing - Review &amp; Editing, Supervision, Project Administration, Validation.</a:t>
             </a:r>
           </a:p>
         </p:txBody>
@@ -10050,47 +10249,32 @@
           <a:lstStyle/>
           <a:p>
             <a:pPr lvl="0" indent="0" marL="0">
-              <a:buNone/>
-            </a:pPr>
-            <a:r>
-              <a:rPr b="1"/>
-              <a:t>What is your level of familiarity with [Topic] (e.g., basic concepts, terminology, or tools)?</a:t>
-            </a:r>
-          </a:p>
-          <a:p>
-            <a:pPr lvl="0" indent="-342900" marL="342900">
-              <a:buAutoNum type="alphaLcPeriod"/>
-            </a:pPr>
-            <a:r>
-              <a:rPr/>
-              <a:t>I have never heard of it before.</a:t>
-            </a:r>
-          </a:p>
-          <a:p>
-            <a:pPr lvl="0" indent="-342900" marL="342900">
-              <a:buAutoNum type="alphaLcPeriod"/>
-            </a:pPr>
-            <a:r>
-              <a:rPr/>
-              <a:t>I have heard of it but have never worked with it.</a:t>
-            </a:r>
-          </a:p>
-          <a:p>
-            <a:pPr lvl="0" indent="-342900" marL="342900">
-              <a:buAutoNum type="alphaLcPeriod"/>
-            </a:pPr>
-            <a:r>
-              <a:rPr/>
-              <a:t>I have basic understanding and experience with it.</a:t>
-            </a:r>
-          </a:p>
-          <a:p>
-            <a:pPr lvl="0" indent="-342900" marL="342900">
-              <a:buAutoNum type="alphaLcPeriod"/>
-            </a:pPr>
-            <a:r>
-              <a:rPr/>
-              <a:t>I am very familiar and have worked with it extensively.</a:t>
+              <a:spcBef>
+                <a:spcPts val="3000"/>
+              </a:spcBef>
+              <a:buNone/>
+            </a:pPr>
+            <a:r>
+              <a:rPr b="1"/>
+              <a:t>Before we start: Survey time!</a:t>
+            </a:r>
+          </a:p>
+          <a:p>
+            <a:pPr lvl="0"/>
+            <a:r>
+              <a:rPr b="1"/>
+              <a:t>Aim</a:t>
+            </a:r>
+            <a:r>
+              <a:rPr/>
+              <a:t>: The pre-submodule survey serves to examine students’ prior knowledge about the sumodule’s topic.</a:t>
+            </a:r>
+          </a:p>
+          <a:p>
+            <a:pPr lvl="0"/>
+            <a:r>
+              <a:rPr/>
+              <a:t>Use free survey software such as or other survey software (particify, formR) to establish the following questions (shown on separate slides).</a:t>
             </a:r>
           </a:p>
         </p:txBody>
@@ -10137,7 +10321,7 @@
             </a:pPr>
             <a:r>
               <a:rPr b="1"/>
-              <a:t>Which of the following concepts or skills do you feel most confident about in relation to [Topic]? (Select all that apply)</a:t>
+              <a:t>What is your level of familiarity with [Topic] (e.g., basic concepts, terminology, or tools)?</a:t>
             </a:r>
           </a:p>
           <a:p>
@@ -10146,7 +10330,7 @@
             </a:pPr>
             <a:r>
               <a:rPr/>
-              <a:t>Concept 1</a:t>
+              <a:t>I have never heard of it before.</a:t>
             </a:r>
           </a:p>
           <a:p>
@@ -10155,7 +10339,7 @@
             </a:pPr>
             <a:r>
               <a:rPr/>
-              <a:t>Concept 2</a:t>
+              <a:t>I have heard of it but have never worked with it.</a:t>
             </a:r>
           </a:p>
           <a:p>
@@ -10164,7 +10348,7 @@
             </a:pPr>
             <a:r>
               <a:rPr/>
-              <a:t>Concept 3</a:t>
+              <a:t>I have basic understanding and experience with it.</a:t>
             </a:r>
           </a:p>
           <a:p>
@@ -10173,16 +10357,7 @@
             </a:pPr>
             <a:r>
               <a:rPr/>
-              <a:t>Concept 4</a:t>
-            </a:r>
-          </a:p>
-          <a:p>
-            <a:pPr lvl="0" indent="-342900" marL="342900">
-              <a:buAutoNum type="alphaLcPeriod"/>
-            </a:pPr>
-            <a:r>
-              <a:rPr/>
-              <a:t>I am not sure about any of these concepts.</a:t>
+              <a:t>I am very familiar and have worked with it extensively.</a:t>
             </a:r>
           </a:p>
         </p:txBody>
@@ -10229,7 +10404,7 @@
             </a:pPr>
             <a:r>
               <a:rPr b="1"/>
-              <a:t>On a scale of 1 to 5, how comfortable are you with using [specific tool/technology] related to [Topic]? (1 = Not comfortable at all, 5 = Very comfortable)</a:t>
+              <a:t>Which of the following concepts or skills do you feel most confident about in relation to [Topic]? (Select all that apply)</a:t>
             </a:r>
           </a:p>
           <a:p>
@@ -10238,7 +10413,7 @@
             </a:pPr>
             <a:r>
               <a:rPr/>
-              <a:t>1</a:t>
+              <a:t>Concept 1</a:t>
             </a:r>
           </a:p>
           <a:p>
@@ -10247,7 +10422,7 @@
             </a:pPr>
             <a:r>
               <a:rPr/>
-              <a:t>2</a:t>
+              <a:t>Concept 2</a:t>
             </a:r>
           </a:p>
           <a:p>
@@ -10256,7 +10431,7 @@
             </a:pPr>
             <a:r>
               <a:rPr/>
-              <a:t>3</a:t>
+              <a:t>Concept 3</a:t>
             </a:r>
           </a:p>
           <a:p>
@@ -10265,7 +10440,7 @@
             </a:pPr>
             <a:r>
               <a:rPr/>
-              <a:t>4</a:t>
+              <a:t>Concept 4</a:t>
             </a:r>
           </a:p>
           <a:p>
@@ -10274,7 +10449,7 @@
             </a:pPr>
             <a:r>
               <a:rPr/>
-              <a:t>5</a:t>
+              <a:t>I am not sure about any of these concepts.</a:t>
             </a:r>
           </a:p>
         </p:txBody>
@@ -10317,32 +10492,56 @@
           <a:lstStyle/>
           <a:p>
             <a:pPr lvl="0" indent="0" marL="0">
-              <a:spcBef>
-                <a:spcPts val="3000"/>
-              </a:spcBef>
-              <a:buNone/>
-            </a:pPr>
-            <a:r>
-              <a:rPr b="1"/>
-              <a:t>Discussion of survey results</a:t>
-            </a:r>
-          </a:p>
-          <a:p>
-            <a:pPr lvl="0"/>
-            <a:r>
-              <a:rPr b="1"/>
-              <a:t>Aim”</a:t>
-            </a:r>
-            <a:r>
-              <a:rPr/>
-              <a:t>: Briefly examine the answers given to each question interactively with the group.</a:t>
-            </a:r>
-          </a:p>
-          <a:p>
-            <a:pPr lvl="0"/>
-            <a:r>
-              <a:rPr/>
-              <a:t>Use visuals from the survey to highlight specific answers.</a:t>
+              <a:buNone/>
+            </a:pPr>
+            <a:r>
+              <a:rPr b="1"/>
+              <a:t>On a scale of 1 to 5, how comfortable are you with using [specific tool/technology] related to [Topic]? (1 = Not comfortable at all, 5 = Very comfortable)</a:t>
+            </a:r>
+          </a:p>
+          <a:p>
+            <a:pPr lvl="0" indent="-342900" marL="342900">
+              <a:buAutoNum type="alphaLcPeriod"/>
+            </a:pPr>
+            <a:r>
+              <a:rPr/>
+              <a:t>1</a:t>
+            </a:r>
+          </a:p>
+          <a:p>
+            <a:pPr lvl="0" indent="-342900" marL="342900">
+              <a:buAutoNum type="alphaLcPeriod"/>
+            </a:pPr>
+            <a:r>
+              <a:rPr/>
+              <a:t>2</a:t>
+            </a:r>
+          </a:p>
+          <a:p>
+            <a:pPr lvl="0" indent="-342900" marL="342900">
+              <a:buAutoNum type="alphaLcPeriod"/>
+            </a:pPr>
+            <a:r>
+              <a:rPr/>
+              <a:t>3</a:t>
+            </a:r>
+          </a:p>
+          <a:p>
+            <a:pPr lvl="0" indent="-342900" marL="342900">
+              <a:buAutoNum type="alphaLcPeriod"/>
+            </a:pPr>
+            <a:r>
+              <a:rPr/>
+              <a:t>4</a:t>
+            </a:r>
+          </a:p>
+          <a:p>
+            <a:pPr lvl="0" indent="-342900" marL="342900">
+              <a:buAutoNum type="alphaLcPeriod"/>
+            </a:pPr>
+            <a:r>
+              <a:rPr/>
+              <a:t>5</a:t>
             </a:r>
           </a:p>
         </p:txBody>

</xml_diff>